<commit_message>
Code documentaion and restructure
</commit_message>
<xml_diff>
--- a/Presentation1.pptx
+++ b/Presentation1.pptx
@@ -6,6 +6,7 @@
   </p:sldMasterIdLst>
   <p:sldIdLst>
     <p:sldId id="256" r:id="rId2"/>
+    <p:sldId id="257" r:id="rId3"/>
   </p:sldIdLst>
   <p:sldSz cx="6858000" cy="12192000"/>
   <p:notesSz cx="6858000" cy="9144000"/>
@@ -2979,7 +2980,7 @@
         </p:nvSpPr>
         <p:spPr>
           <a:xfrm>
-            <a:off x="2373087" y="849086"/>
+            <a:off x="2491130" y="849086"/>
             <a:ext cx="729044" cy="250586"/>
           </a:xfrm>
           <a:prstGeom prst="flowChartTerminator">
@@ -3032,7 +3033,7 @@
         </p:nvSpPr>
         <p:spPr>
           <a:xfrm>
-            <a:off x="1879537" y="1451088"/>
+            <a:off x="1997580" y="1451088"/>
             <a:ext cx="1716144" cy="598841"/>
           </a:xfrm>
           <a:prstGeom prst="flowChartDecision">
@@ -3107,7 +3108,7 @@
         </p:nvCxnSpPr>
         <p:spPr>
           <a:xfrm>
-            <a:off x="2737609" y="1099672"/>
+            <a:off x="2855652" y="1099672"/>
             <a:ext cx="0" cy="351416"/>
           </a:xfrm>
           <a:prstGeom prst="straightConnector1">
@@ -3196,8 +3197,8 @@
         </p:nvCxnSpPr>
         <p:spPr>
           <a:xfrm>
-            <a:off x="3595681" y="1750509"/>
-            <a:ext cx="784849" cy="12353"/>
+            <a:off x="3713724" y="1750509"/>
+            <a:ext cx="666806" cy="12353"/>
           </a:xfrm>
           <a:prstGeom prst="straightConnector1">
             <a:avLst/>
@@ -3259,7 +3260,7 @@
         </p:nvSpPr>
         <p:spPr>
           <a:xfrm>
-            <a:off x="1801603" y="2952581"/>
+            <a:off x="1919646" y="2952581"/>
             <a:ext cx="1872012" cy="879190"/>
           </a:xfrm>
           <a:prstGeom prst="flowChartProcess">
@@ -3318,11 +3319,6 @@
               </a:rPr>
               <a:t>Set size of</a:t>
             </a:r>
-            <a:endParaRPr lang="en-US" sz="1050" dirty="0">
-              <a:solidFill>
-                <a:schemeClr val="tx1"/>
-              </a:solidFill>
-            </a:endParaRPr>
           </a:p>
           <a:p>
             <a:r>
@@ -3368,7 +3364,7 @@
         </p:nvCxnSpPr>
         <p:spPr>
           <a:xfrm>
-            <a:off x="2737609" y="2049929"/>
+            <a:off x="2855652" y="2049929"/>
             <a:ext cx="0" cy="902652"/>
           </a:xfrm>
           <a:prstGeom prst="straightConnector1">
@@ -3434,8 +3430,8 @@
         </p:nvCxnSpPr>
         <p:spPr>
           <a:xfrm rot="5400000">
-            <a:off x="3681650" y="1988960"/>
-            <a:ext cx="1395182" cy="1411251"/>
+            <a:off x="3740671" y="2047981"/>
+            <a:ext cx="1395182" cy="1293208"/>
           </a:xfrm>
           <a:prstGeom prst="bentConnector2">
             <a:avLst/>
@@ -3467,8 +3463,8 @@
         </p:nvSpPr>
         <p:spPr>
           <a:xfrm>
-            <a:off x="339632" y="5122436"/>
-            <a:ext cx="1236617" cy="612648"/>
+            <a:off x="339632" y="5122435"/>
+            <a:ext cx="1236617" cy="486279"/>
           </a:xfrm>
           <a:prstGeom prst="flowChartInputOutput">
             <a:avLst/>
@@ -3555,67 +3551,6 @@
                 </a:solidFill>
               </a:rPr>
               <a:t>Manual input</a:t>
-            </a:r>
-            <a:endParaRPr lang="sv-SE" sz="1100" dirty="0">
-              <a:solidFill>
-                <a:schemeClr val="tx1"/>
-              </a:solidFill>
-            </a:endParaRPr>
-          </a:p>
-        </p:txBody>
-      </p:sp>
-      <p:sp>
-        <p:nvSpPr>
-          <p:cNvPr id="21" name="Flödesschema: Kort 20"/>
-          <p:cNvSpPr/>
-          <p:nvPr/>
-        </p:nvSpPr>
-        <p:spPr>
-          <a:xfrm>
-            <a:off x="500740" y="5826413"/>
-            <a:ext cx="914400" cy="804672"/>
-          </a:xfrm>
-          <a:prstGeom prst="flowChartPunchedCard">
-            <a:avLst/>
-          </a:prstGeom>
-          <a:noFill/>
-        </p:spPr>
-        <p:style>
-          <a:lnRef idx="2">
-            <a:schemeClr val="accent1">
-              <a:shade val="50000"/>
-            </a:schemeClr>
-          </a:lnRef>
-          <a:fillRef idx="1">
-            <a:schemeClr val="accent1"/>
-          </a:fillRef>
-          <a:effectRef idx="0">
-            <a:schemeClr val="accent1"/>
-          </a:effectRef>
-          <a:fontRef idx="minor">
-            <a:schemeClr val="lt1"/>
-          </a:fontRef>
-        </p:style>
-        <p:txBody>
-          <a:bodyPr rtlCol="0" anchor="ctr"/>
-          <a:lstStyle/>
-          <a:p>
-            <a:pPr algn="ctr"/>
-            <a:r>
-              <a:rPr lang="sv-SE" sz="1100" dirty="0" smtClean="0">
-                <a:solidFill>
-                  <a:schemeClr val="tx1"/>
-                </a:solidFill>
-              </a:rPr>
-              <a:t>Class </a:t>
-            </a:r>
-            <a:r>
-              <a:rPr lang="sv-SE" sz="1100" dirty="0" err="1" smtClean="0">
-                <a:solidFill>
-                  <a:schemeClr val="tx1"/>
-                </a:solidFill>
-              </a:rPr>
-              <a:t>attributes</a:t>
             </a:r>
             <a:endParaRPr lang="sv-SE" sz="1100" dirty="0">
               <a:solidFill>
@@ -3694,7 +3629,7 @@
         <p:spPr>
           <a:xfrm>
             <a:off x="1443340" y="3043673"/>
-            <a:ext cx="358263" cy="348503"/>
+            <a:ext cx="476306" cy="348503"/>
           </a:xfrm>
           <a:prstGeom prst="bentConnector3">
             <a:avLst>
@@ -3785,7 +3720,7 @@
         <p:spPr>
           <a:xfrm flipV="1">
             <a:off x="1234954" y="3392176"/>
-            <a:ext cx="566649" cy="4239"/>
+            <a:ext cx="684692" cy="4239"/>
           </a:xfrm>
           <a:prstGeom prst="straightConnector1">
             <a:avLst/>
@@ -3809,125 +3744,19 @@
           </a:fontRef>
         </p:style>
       </p:cxnSp>
-      <p:sp>
-        <p:nvSpPr>
-          <p:cNvPr id="34" name="Flödesschema: Manuella indata 33"/>
-          <p:cNvSpPr/>
-          <p:nvPr/>
-        </p:nvSpPr>
-        <p:spPr>
-          <a:xfrm>
-            <a:off x="1345476" y="7257009"/>
-            <a:ext cx="1027611" cy="722811"/>
-          </a:xfrm>
-          <a:prstGeom prst="flowChartManualInput">
-            <a:avLst/>
-          </a:prstGeom>
-          <a:noFill/>
-        </p:spPr>
-        <p:style>
-          <a:lnRef idx="2">
-            <a:schemeClr val="accent1">
-              <a:shade val="50000"/>
-            </a:schemeClr>
-          </a:lnRef>
-          <a:fillRef idx="1">
-            <a:schemeClr val="accent1"/>
-          </a:fillRef>
-          <a:effectRef idx="0">
-            <a:schemeClr val="accent1"/>
-          </a:effectRef>
-          <a:fontRef idx="minor">
-            <a:schemeClr val="lt1"/>
-          </a:fontRef>
-        </p:style>
-        <p:txBody>
-          <a:bodyPr rtlCol="0" anchor="ctr"/>
-          <a:lstStyle/>
-          <a:p>
-            <a:pPr algn="ctr"/>
-            <a:r>
-              <a:rPr lang="sv-SE" sz="1100" dirty="0" smtClean="0">
-                <a:solidFill>
-                  <a:schemeClr val="tx1"/>
-                </a:solidFill>
-              </a:rPr>
-              <a:t>Manual input</a:t>
-            </a:r>
-            <a:endParaRPr lang="sv-SE" sz="1100" dirty="0">
-              <a:solidFill>
-                <a:schemeClr val="tx1"/>
-              </a:solidFill>
-            </a:endParaRPr>
-          </a:p>
-        </p:txBody>
-      </p:sp>
-      <p:sp>
-        <p:nvSpPr>
-          <p:cNvPr id="35" name="Flödesschema: Kort 34"/>
-          <p:cNvSpPr/>
-          <p:nvPr/>
-        </p:nvSpPr>
-        <p:spPr>
-          <a:xfrm>
-            <a:off x="272338" y="3717179"/>
-            <a:ext cx="1185000" cy="301110"/>
-          </a:xfrm>
-          <a:prstGeom prst="flowChartPunchedCard">
-            <a:avLst/>
-          </a:prstGeom>
-          <a:noFill/>
-        </p:spPr>
-        <p:style>
-          <a:lnRef idx="2">
-            <a:schemeClr val="accent1">
-              <a:shade val="50000"/>
-            </a:schemeClr>
-          </a:lnRef>
-          <a:fillRef idx="1">
-            <a:schemeClr val="accent1"/>
-          </a:fillRef>
-          <a:effectRef idx="0">
-            <a:schemeClr val="accent1"/>
-          </a:effectRef>
-          <a:fontRef idx="minor">
-            <a:schemeClr val="lt1"/>
-          </a:fontRef>
-        </p:style>
-        <p:txBody>
-          <a:bodyPr rtlCol="0" anchor="t"/>
-          <a:lstStyle/>
-          <a:p>
-            <a:pPr algn="ctr"/>
-            <a:r>
-              <a:rPr lang="sv-SE" sz="1100" dirty="0" err="1">
-                <a:solidFill>
-                  <a:schemeClr val="tx1"/>
-                </a:solidFill>
-              </a:rPr>
-              <a:t>TitleBarHeight</a:t>
-            </a:r>
-            <a:endParaRPr lang="sv-SE" sz="1100" dirty="0">
-              <a:solidFill>
-                <a:schemeClr val="tx1"/>
-              </a:solidFill>
-            </a:endParaRPr>
-          </a:p>
-        </p:txBody>
-      </p:sp>
       <p:cxnSp>
         <p:nvCxnSpPr>
           <p:cNvPr id="37" name="Rak pilkoppling 36"/>
           <p:cNvCxnSpPr>
-            <a:stCxn id="35" idx="3"/>
+            <a:stCxn id="46" idx="3"/>
             <a:endCxn id="10" idx="1"/>
           </p:cNvCxnSpPr>
           <p:nvPr/>
         </p:nvCxnSpPr>
         <p:spPr>
           <a:xfrm flipV="1">
-            <a:off x="1457338" y="3392176"/>
-            <a:ext cx="344265" cy="475558"/>
+            <a:off x="1415140" y="3392176"/>
+            <a:ext cx="504506" cy="464966"/>
           </a:xfrm>
           <a:prstGeom prst="bentConnector3">
             <a:avLst>
@@ -3954,10 +3783,1573 @@
           </a:fontRef>
         </p:style>
       </p:cxnSp>
+      <p:sp>
+        <p:nvSpPr>
+          <p:cNvPr id="23" name="Flödesschema: Process 22"/>
+          <p:cNvSpPr/>
+          <p:nvPr/>
+        </p:nvSpPr>
+        <p:spPr>
+          <a:xfrm>
+            <a:off x="2044351" y="4220534"/>
+            <a:ext cx="1622602" cy="508991"/>
+          </a:xfrm>
+          <a:prstGeom prst="flowChartProcess">
+            <a:avLst/>
+          </a:prstGeom>
+          <a:noFill/>
+        </p:spPr>
+        <p:style>
+          <a:lnRef idx="2">
+            <a:schemeClr val="accent1">
+              <a:shade val="50000"/>
+            </a:schemeClr>
+          </a:lnRef>
+          <a:fillRef idx="1">
+            <a:schemeClr val="accent1"/>
+          </a:fillRef>
+          <a:effectRef idx="0">
+            <a:schemeClr val="accent1"/>
+          </a:effectRef>
+          <a:fontRef idx="minor">
+            <a:schemeClr val="lt1"/>
+          </a:fontRef>
+        </p:style>
+        <p:txBody>
+          <a:bodyPr rtlCol="0" anchor="t"/>
+          <a:lstStyle/>
+          <a:p>
+            <a:r>
+              <a:rPr lang="sv-SE" sz="1100" dirty="0" smtClean="0">
+                <a:solidFill>
+                  <a:schemeClr val="tx1"/>
+                </a:solidFill>
+              </a:rPr>
+              <a:t>Clear </a:t>
+            </a:r>
+            <a:r>
+              <a:rPr lang="sv-SE" sz="1100" dirty="0" err="1" smtClean="0">
+                <a:solidFill>
+                  <a:schemeClr val="tx1"/>
+                </a:solidFill>
+              </a:rPr>
+              <a:t>bitmaplList</a:t>
+            </a:r>
+            <a:endParaRPr lang="sv-SE" sz="1100" dirty="0" smtClean="0">
+              <a:solidFill>
+                <a:schemeClr val="tx1"/>
+              </a:solidFill>
+            </a:endParaRPr>
+          </a:p>
+          <a:p>
+            <a:r>
+              <a:rPr lang="sv-SE" sz="1100" dirty="0" smtClean="0">
+                <a:solidFill>
+                  <a:schemeClr val="tx1"/>
+                </a:solidFill>
+              </a:rPr>
+              <a:t>Read all </a:t>
+            </a:r>
+            <a:r>
+              <a:rPr lang="sv-SE" sz="1100" dirty="0" err="1" smtClean="0">
+                <a:solidFill>
+                  <a:schemeClr val="tx1"/>
+                </a:solidFill>
+              </a:rPr>
+              <a:t>lines</a:t>
+            </a:r>
+            <a:r>
+              <a:rPr lang="sv-SE" sz="1100" dirty="0" smtClean="0">
+                <a:solidFill>
+                  <a:schemeClr val="tx1"/>
+                </a:solidFill>
+              </a:rPr>
+              <a:t> from Sd </a:t>
+            </a:r>
+            <a:r>
+              <a:rPr lang="sv-SE" sz="1100" dirty="0" err="1" smtClean="0">
+                <a:solidFill>
+                  <a:schemeClr val="tx1"/>
+                </a:solidFill>
+              </a:rPr>
+              <a:t>file</a:t>
+            </a:r>
+            <a:endParaRPr lang="sv-SE" sz="1100" dirty="0">
+              <a:solidFill>
+                <a:schemeClr val="tx1"/>
+              </a:solidFill>
+            </a:endParaRPr>
+          </a:p>
+        </p:txBody>
+      </p:sp>
+      <p:sp>
+        <p:nvSpPr>
+          <p:cNvPr id="2" name="Flödesschema: Magnetskiva 1"/>
+          <p:cNvSpPr/>
+          <p:nvPr/>
+        </p:nvSpPr>
+        <p:spPr>
+          <a:xfrm>
+            <a:off x="622689" y="4333344"/>
+            <a:ext cx="652007" cy="283369"/>
+          </a:xfrm>
+          <a:prstGeom prst="flowChartMagneticDisk">
+            <a:avLst/>
+          </a:prstGeom>
+          <a:noFill/>
+        </p:spPr>
+        <p:style>
+          <a:lnRef idx="2">
+            <a:schemeClr val="accent1">
+              <a:shade val="50000"/>
+            </a:schemeClr>
+          </a:lnRef>
+          <a:fillRef idx="1">
+            <a:schemeClr val="accent1"/>
+          </a:fillRef>
+          <a:effectRef idx="0">
+            <a:schemeClr val="accent1"/>
+          </a:effectRef>
+          <a:fontRef idx="minor">
+            <a:schemeClr val="lt1"/>
+          </a:fontRef>
+        </p:style>
+        <p:txBody>
+          <a:bodyPr rtlCol="0" anchor="ctr"/>
+          <a:lstStyle/>
+          <a:p>
+            <a:pPr algn="ctr"/>
+            <a:r>
+              <a:rPr lang="sv-SE" sz="1100" dirty="0" smtClean="0">
+                <a:solidFill>
+                  <a:schemeClr val="tx1"/>
+                </a:solidFill>
+              </a:rPr>
+              <a:t>Sd </a:t>
+            </a:r>
+            <a:r>
+              <a:rPr lang="sv-SE" sz="1100" dirty="0" err="1" smtClean="0">
+                <a:solidFill>
+                  <a:schemeClr val="tx1"/>
+                </a:solidFill>
+              </a:rPr>
+              <a:t>file</a:t>
+            </a:r>
+            <a:endParaRPr lang="sv-SE" sz="1100" dirty="0">
+              <a:solidFill>
+                <a:schemeClr val="tx1"/>
+              </a:solidFill>
+            </a:endParaRPr>
+          </a:p>
+        </p:txBody>
+      </p:sp>
+      <p:cxnSp>
+        <p:nvCxnSpPr>
+          <p:cNvPr id="12" name="Rak pilkoppling 11"/>
+          <p:cNvCxnSpPr>
+            <a:stCxn id="2" idx="4"/>
+            <a:endCxn id="23" idx="1"/>
+          </p:cNvCxnSpPr>
+          <p:nvPr/>
+        </p:nvCxnSpPr>
+        <p:spPr>
+          <a:xfrm>
+            <a:off x="1274696" y="4475029"/>
+            <a:ext cx="769655" cy="1"/>
+          </a:xfrm>
+          <a:prstGeom prst="straightConnector1">
+            <a:avLst/>
+          </a:prstGeom>
+          <a:ln>
+            <a:tailEnd type="triangle"/>
+          </a:ln>
+        </p:spPr>
+        <p:style>
+          <a:lnRef idx="1">
+            <a:schemeClr val="accent1"/>
+          </a:lnRef>
+          <a:fillRef idx="0">
+            <a:schemeClr val="accent1"/>
+          </a:fillRef>
+          <a:effectRef idx="0">
+            <a:schemeClr val="accent1"/>
+          </a:effectRef>
+          <a:fontRef idx="minor">
+            <a:schemeClr val="tx1"/>
+          </a:fontRef>
+        </p:style>
+      </p:cxnSp>
+      <p:cxnSp>
+        <p:nvCxnSpPr>
+          <p:cNvPr id="28" name="Rak pilkoppling 27"/>
+          <p:cNvCxnSpPr>
+            <a:stCxn id="10" idx="2"/>
+            <a:endCxn id="23" idx="0"/>
+          </p:cNvCxnSpPr>
+          <p:nvPr/>
+        </p:nvCxnSpPr>
+        <p:spPr>
+          <a:xfrm>
+            <a:off x="2855652" y="3831771"/>
+            <a:ext cx="0" cy="388763"/>
+          </a:xfrm>
+          <a:prstGeom prst="straightConnector1">
+            <a:avLst/>
+          </a:prstGeom>
+          <a:ln>
+            <a:tailEnd type="triangle"/>
+          </a:ln>
+        </p:spPr>
+        <p:style>
+          <a:lnRef idx="1">
+            <a:schemeClr val="accent1"/>
+          </a:lnRef>
+          <a:fillRef idx="0">
+            <a:schemeClr val="accent1"/>
+          </a:fillRef>
+          <a:effectRef idx="0">
+            <a:schemeClr val="accent1"/>
+          </a:effectRef>
+          <a:fontRef idx="minor">
+            <a:schemeClr val="tx1"/>
+          </a:fontRef>
+        </p:style>
+      </p:cxnSp>
+      <p:sp>
+        <p:nvSpPr>
+          <p:cNvPr id="38" name="Flödesschema: Process 37"/>
+          <p:cNvSpPr/>
+          <p:nvPr/>
+        </p:nvSpPr>
+        <p:spPr>
+          <a:xfrm>
+            <a:off x="2267740" y="5099724"/>
+            <a:ext cx="1175823" cy="273059"/>
+          </a:xfrm>
+          <a:prstGeom prst="flowChartProcess">
+            <a:avLst/>
+          </a:prstGeom>
+          <a:noFill/>
+        </p:spPr>
+        <p:style>
+          <a:lnRef idx="2">
+            <a:schemeClr val="accent1">
+              <a:shade val="50000"/>
+            </a:schemeClr>
+          </a:lnRef>
+          <a:fillRef idx="1">
+            <a:schemeClr val="accent1"/>
+          </a:fillRef>
+          <a:effectRef idx="0">
+            <a:schemeClr val="accent1"/>
+          </a:effectRef>
+          <a:fontRef idx="minor">
+            <a:schemeClr val="lt1"/>
+          </a:fontRef>
+        </p:style>
+        <p:txBody>
+          <a:bodyPr rtlCol="0" anchor="t"/>
+          <a:lstStyle/>
+          <a:p>
+            <a:r>
+              <a:rPr lang="sv-SE" sz="1100" b="1" u="sng" dirty="0" err="1">
+                <a:solidFill>
+                  <a:srgbClr val="000000"/>
+                </a:solidFill>
+                <a:latin typeface="Consolas" panose="020B0609020204030204" pitchFamily="49" charset="0"/>
+              </a:rPr>
+              <a:t>createSdLines</a:t>
+            </a:r>
+            <a:endParaRPr lang="sv-SE" sz="1100" b="1" u="sng" dirty="0">
+              <a:solidFill>
+                <a:schemeClr val="tx1"/>
+              </a:solidFill>
+            </a:endParaRPr>
+          </a:p>
+        </p:txBody>
+      </p:sp>
+      <p:cxnSp>
+        <p:nvCxnSpPr>
+          <p:cNvPr id="39" name="Rak pilkoppling 38"/>
+          <p:cNvCxnSpPr>
+            <a:stCxn id="23" idx="2"/>
+            <a:endCxn id="38" idx="0"/>
+          </p:cNvCxnSpPr>
+          <p:nvPr/>
+        </p:nvCxnSpPr>
+        <p:spPr>
+          <a:xfrm>
+            <a:off x="2855652" y="4729525"/>
+            <a:ext cx="0" cy="370199"/>
+          </a:xfrm>
+          <a:prstGeom prst="straightConnector1">
+            <a:avLst/>
+          </a:prstGeom>
+          <a:ln>
+            <a:tailEnd type="triangle"/>
+          </a:ln>
+        </p:spPr>
+        <p:style>
+          <a:lnRef idx="1">
+            <a:schemeClr val="accent1"/>
+          </a:lnRef>
+          <a:fillRef idx="0">
+            <a:schemeClr val="accent1"/>
+          </a:fillRef>
+          <a:effectRef idx="0">
+            <a:schemeClr val="accent1"/>
+          </a:effectRef>
+          <a:fontRef idx="minor">
+            <a:schemeClr val="tx1"/>
+          </a:fontRef>
+        </p:style>
+      </p:cxnSp>
+      <p:sp>
+        <p:nvSpPr>
+          <p:cNvPr id="45" name="Flödesschema: Intern lagring 44"/>
+          <p:cNvSpPr/>
+          <p:nvPr/>
+        </p:nvSpPr>
+        <p:spPr>
+          <a:xfrm>
+            <a:off x="400751" y="5939803"/>
+            <a:ext cx="928174" cy="612648"/>
+          </a:xfrm>
+          <a:prstGeom prst="flowChartInternalStorage">
+            <a:avLst/>
+          </a:prstGeom>
+          <a:noFill/>
+          <a:ln w="6350">
+            <a:solidFill>
+              <a:schemeClr val="tx1"/>
+            </a:solidFill>
+          </a:ln>
+        </p:spPr>
+        <p:style>
+          <a:lnRef idx="2">
+            <a:schemeClr val="accent1">
+              <a:shade val="50000"/>
+            </a:schemeClr>
+          </a:lnRef>
+          <a:fillRef idx="1">
+            <a:schemeClr val="accent1"/>
+          </a:fillRef>
+          <a:effectRef idx="0">
+            <a:schemeClr val="accent1"/>
+          </a:effectRef>
+          <a:fontRef idx="minor">
+            <a:schemeClr val="lt1"/>
+          </a:fontRef>
+        </p:style>
+        <p:txBody>
+          <a:bodyPr rtlCol="0" anchor="ctr"/>
+          <a:lstStyle/>
+          <a:p>
+            <a:pPr algn="ctr"/>
+            <a:r>
+              <a:rPr lang="sv-SE" sz="1100" dirty="0" smtClean="0">
+                <a:solidFill>
+                  <a:schemeClr val="tx1"/>
+                </a:solidFill>
+              </a:rPr>
+              <a:t>Intern lagring</a:t>
+            </a:r>
+            <a:endParaRPr lang="sv-SE" sz="1100" dirty="0">
+              <a:solidFill>
+                <a:schemeClr val="tx1"/>
+              </a:solidFill>
+            </a:endParaRPr>
+          </a:p>
+        </p:txBody>
+      </p:sp>
+      <p:sp>
+        <p:nvSpPr>
+          <p:cNvPr id="46" name="Flödesschema: Intern lagring 45"/>
+          <p:cNvSpPr/>
+          <p:nvPr/>
+        </p:nvSpPr>
+        <p:spPr>
+          <a:xfrm>
+            <a:off x="267154" y="3715540"/>
+            <a:ext cx="1147986" cy="283203"/>
+          </a:xfrm>
+          <a:prstGeom prst="flowChartInternalStorage">
+            <a:avLst/>
+          </a:prstGeom>
+          <a:noFill/>
+          <a:ln w="6350">
+            <a:solidFill>
+              <a:schemeClr val="tx1"/>
+            </a:solidFill>
+          </a:ln>
+        </p:spPr>
+        <p:style>
+          <a:lnRef idx="2">
+            <a:schemeClr val="accent1">
+              <a:shade val="50000"/>
+            </a:schemeClr>
+          </a:lnRef>
+          <a:fillRef idx="1">
+            <a:schemeClr val="accent1"/>
+          </a:fillRef>
+          <a:effectRef idx="0">
+            <a:schemeClr val="accent1"/>
+          </a:effectRef>
+          <a:fontRef idx="minor">
+            <a:schemeClr val="lt1"/>
+          </a:fontRef>
+        </p:style>
+        <p:txBody>
+          <a:bodyPr rtlCol="0" anchor="ctr"/>
+          <a:lstStyle/>
+          <a:p>
+            <a:pPr algn="ctr"/>
+            <a:r>
+              <a:rPr lang="sv-SE" sz="1100" dirty="0" err="1">
+                <a:solidFill>
+                  <a:schemeClr val="tx1"/>
+                </a:solidFill>
+              </a:rPr>
+              <a:t>TitleBarHeight</a:t>
+            </a:r>
+            <a:endParaRPr lang="sv-SE" sz="1100" dirty="0">
+              <a:solidFill>
+                <a:schemeClr val="tx1"/>
+              </a:solidFill>
+            </a:endParaRPr>
+          </a:p>
+        </p:txBody>
+      </p:sp>
+      <p:sp>
+        <p:nvSpPr>
+          <p:cNvPr id="48" name="Flödesschema: Beslut 47"/>
+          <p:cNvSpPr/>
+          <p:nvPr/>
+        </p:nvSpPr>
+        <p:spPr>
+          <a:xfrm>
+            <a:off x="1593372" y="6484978"/>
+            <a:ext cx="1716144" cy="598841"/>
+          </a:xfrm>
+          <a:prstGeom prst="flowChartDecision">
+            <a:avLst/>
+          </a:prstGeom>
+          <a:noFill/>
+        </p:spPr>
+        <p:style>
+          <a:lnRef idx="2">
+            <a:schemeClr val="accent1">
+              <a:shade val="50000"/>
+            </a:schemeClr>
+          </a:lnRef>
+          <a:fillRef idx="1">
+            <a:schemeClr val="accent1"/>
+          </a:fillRef>
+          <a:effectRef idx="0">
+            <a:schemeClr val="accent1"/>
+          </a:effectRef>
+          <a:fontRef idx="minor">
+            <a:schemeClr val="lt1"/>
+          </a:fontRef>
+        </p:style>
+        <p:txBody>
+          <a:bodyPr lIns="36000" rIns="36000" rtlCol="0" anchor="ctr"/>
+          <a:lstStyle/>
+          <a:p>
+            <a:pPr algn="ctr"/>
+            <a:r>
+              <a:rPr lang="sv-SE" sz="1100" dirty="0" err="1" smtClean="0">
+                <a:solidFill>
+                  <a:schemeClr val="tx1"/>
+                </a:solidFill>
+              </a:rPr>
+              <a:t>Desicion</a:t>
+            </a:r>
+            <a:endParaRPr lang="sv-SE" sz="1100" dirty="0">
+              <a:solidFill>
+                <a:schemeClr val="tx1"/>
+              </a:solidFill>
+            </a:endParaRPr>
+          </a:p>
+        </p:txBody>
+      </p:sp>
     </p:spTree>
     <p:extLst>
       <p:ext uri="{BB962C8B-B14F-4D97-AF65-F5344CB8AC3E}">
         <p14:creationId xmlns:p14="http://schemas.microsoft.com/office/powerpoint/2010/main" val="1333567554"/>
+      </p:ext>
+    </p:extLst>
+  </p:cSld>
+  <p:clrMapOvr>
+    <a:masterClrMapping/>
+  </p:clrMapOvr>
+</p:sld>
+</file>
+
+<file path=ppt/slides/slide2.xml><?xml version="1.0" encoding="utf-8"?>
+<p:sld xmlns:a="http://schemas.openxmlformats.org/drawingml/2006/main" xmlns:r="http://schemas.openxmlformats.org/officeDocument/2006/relationships" xmlns:p="http://schemas.openxmlformats.org/presentationml/2006/main">
+  <p:cSld>
+    <p:spTree>
+      <p:nvGrpSpPr>
+        <p:cNvPr id="1" name=""/>
+        <p:cNvGrpSpPr/>
+        <p:nvPr/>
+      </p:nvGrpSpPr>
+      <p:grpSpPr>
+        <a:xfrm>
+          <a:off x="0" y="0"/>
+          <a:ext cx="0" cy="0"/>
+          <a:chOff x="0" y="0"/>
+          <a:chExt cx="0" cy="0"/>
+        </a:xfrm>
+      </p:grpSpPr>
+      <p:sp>
+        <p:nvSpPr>
+          <p:cNvPr id="2" name="Flödesschema: Data 1"/>
+          <p:cNvSpPr/>
+          <p:nvPr/>
+        </p:nvSpPr>
+        <p:spPr>
+          <a:xfrm>
+            <a:off x="339632" y="5122435"/>
+            <a:ext cx="1236617" cy="486279"/>
+          </a:xfrm>
+          <a:prstGeom prst="flowChartInputOutput">
+            <a:avLst/>
+          </a:prstGeom>
+          <a:noFill/>
+        </p:spPr>
+        <p:style>
+          <a:lnRef idx="2">
+            <a:schemeClr val="accent1">
+              <a:shade val="50000"/>
+            </a:schemeClr>
+          </a:lnRef>
+          <a:fillRef idx="1">
+            <a:schemeClr val="accent1"/>
+          </a:fillRef>
+          <a:effectRef idx="0">
+            <a:schemeClr val="accent1"/>
+          </a:effectRef>
+          <a:fontRef idx="minor">
+            <a:schemeClr val="lt1"/>
+          </a:fontRef>
+        </p:style>
+        <p:txBody>
+          <a:bodyPr rtlCol="0" anchor="ctr"/>
+          <a:lstStyle/>
+          <a:p>
+            <a:pPr algn="ctr"/>
+            <a:r>
+              <a:rPr lang="sv-SE" sz="1100" dirty="0" smtClean="0">
+                <a:solidFill>
+                  <a:schemeClr val="tx1"/>
+                </a:solidFill>
+              </a:rPr>
+              <a:t>Settings</a:t>
+            </a:r>
+          </a:p>
+          <a:p>
+            <a:pPr algn="ctr"/>
+            <a:endParaRPr lang="sv-SE" dirty="0"/>
+          </a:p>
+        </p:txBody>
+      </p:sp>
+      <p:sp>
+        <p:nvSpPr>
+          <p:cNvPr id="3" name="Flödesschema: Manuella indata 2"/>
+          <p:cNvSpPr/>
+          <p:nvPr/>
+        </p:nvSpPr>
+        <p:spPr>
+          <a:xfrm>
+            <a:off x="557345" y="6722414"/>
+            <a:ext cx="1027611" cy="722811"/>
+          </a:xfrm>
+          <a:prstGeom prst="flowChartManualInput">
+            <a:avLst/>
+          </a:prstGeom>
+          <a:noFill/>
+        </p:spPr>
+        <p:style>
+          <a:lnRef idx="2">
+            <a:schemeClr val="accent1">
+              <a:shade val="50000"/>
+            </a:schemeClr>
+          </a:lnRef>
+          <a:fillRef idx="1">
+            <a:schemeClr val="accent1"/>
+          </a:fillRef>
+          <a:effectRef idx="0">
+            <a:schemeClr val="accent1"/>
+          </a:effectRef>
+          <a:fontRef idx="minor">
+            <a:schemeClr val="lt1"/>
+          </a:fontRef>
+        </p:style>
+        <p:txBody>
+          <a:bodyPr rtlCol="0" anchor="ctr"/>
+          <a:lstStyle/>
+          <a:p>
+            <a:pPr algn="ctr"/>
+            <a:r>
+              <a:rPr lang="sv-SE" sz="1100" dirty="0" smtClean="0">
+                <a:solidFill>
+                  <a:schemeClr val="tx1"/>
+                </a:solidFill>
+              </a:rPr>
+              <a:t>Manual input</a:t>
+            </a:r>
+            <a:endParaRPr lang="sv-SE" sz="1100" dirty="0">
+              <a:solidFill>
+                <a:schemeClr val="tx1"/>
+              </a:solidFill>
+            </a:endParaRPr>
+          </a:p>
+        </p:txBody>
+      </p:sp>
+      <p:sp>
+        <p:nvSpPr>
+          <p:cNvPr id="5" name="Flödesschema: Process 4"/>
+          <p:cNvSpPr/>
+          <p:nvPr/>
+        </p:nvSpPr>
+        <p:spPr>
+          <a:xfrm>
+            <a:off x="1948935" y="1165668"/>
+            <a:ext cx="1692762" cy="505666"/>
+          </a:xfrm>
+          <a:prstGeom prst="flowChartProcess">
+            <a:avLst/>
+          </a:prstGeom>
+          <a:noFill/>
+        </p:spPr>
+        <p:style>
+          <a:lnRef idx="2">
+            <a:schemeClr val="accent1">
+              <a:shade val="50000"/>
+            </a:schemeClr>
+          </a:lnRef>
+          <a:fillRef idx="1">
+            <a:schemeClr val="accent1"/>
+          </a:fillRef>
+          <a:effectRef idx="0">
+            <a:schemeClr val="accent1"/>
+          </a:effectRef>
+          <a:fontRef idx="minor">
+            <a:schemeClr val="lt1"/>
+          </a:fontRef>
+        </p:style>
+        <p:txBody>
+          <a:bodyPr rtlCol="0" anchor="t"/>
+          <a:lstStyle/>
+          <a:p>
+            <a:r>
+              <a:rPr lang="sv-SE" sz="1100" dirty="0" smtClean="0">
+                <a:solidFill>
+                  <a:srgbClr val="000000"/>
+                </a:solidFill>
+                <a:latin typeface="Consolas" panose="020B0609020204030204" pitchFamily="49" charset="0"/>
+              </a:rPr>
+              <a:t>Clear </a:t>
+            </a:r>
+            <a:r>
+              <a:rPr lang="sv-SE" sz="1100" dirty="0" err="1" smtClean="0">
+                <a:solidFill>
+                  <a:srgbClr val="000000"/>
+                </a:solidFill>
+                <a:latin typeface="Consolas" panose="020B0609020204030204" pitchFamily="49" charset="0"/>
+              </a:rPr>
+              <a:t>sdLines</a:t>
+            </a:r>
+            <a:endParaRPr lang="sv-SE" sz="1100" dirty="0" smtClean="0">
+              <a:solidFill>
+                <a:srgbClr val="000000"/>
+              </a:solidFill>
+              <a:latin typeface="Consolas" panose="020B0609020204030204" pitchFamily="49" charset="0"/>
+            </a:endParaRPr>
+          </a:p>
+          <a:p>
+            <a:r>
+              <a:rPr lang="en-US" sz="1100" dirty="0" err="1">
+                <a:solidFill>
+                  <a:schemeClr val="tx1"/>
+                </a:solidFill>
+              </a:rPr>
+              <a:t>numberOfEmptyLines</a:t>
+            </a:r>
+            <a:r>
+              <a:rPr lang="en-US" sz="1100" dirty="0">
+                <a:solidFill>
+                  <a:schemeClr val="tx1"/>
+                </a:solidFill>
+              </a:rPr>
+              <a:t> = 0</a:t>
+            </a:r>
+            <a:r>
+              <a:rPr lang="en-US" sz="1100" dirty="0" smtClean="0">
+                <a:solidFill>
+                  <a:schemeClr val="tx1"/>
+                </a:solidFill>
+              </a:rPr>
+              <a:t>;</a:t>
+            </a:r>
+            <a:endParaRPr lang="en-US" sz="1100" dirty="0">
+              <a:solidFill>
+                <a:schemeClr val="tx1"/>
+              </a:solidFill>
+            </a:endParaRPr>
+          </a:p>
+        </p:txBody>
+      </p:sp>
+      <p:sp>
+        <p:nvSpPr>
+          <p:cNvPr id="6" name="Flödesschema: Intern lagring 5"/>
+          <p:cNvSpPr/>
+          <p:nvPr/>
+        </p:nvSpPr>
+        <p:spPr>
+          <a:xfrm>
+            <a:off x="400751" y="5939803"/>
+            <a:ext cx="928174" cy="612648"/>
+          </a:xfrm>
+          <a:prstGeom prst="flowChartInternalStorage">
+            <a:avLst/>
+          </a:prstGeom>
+          <a:noFill/>
+          <a:ln w="6350">
+            <a:solidFill>
+              <a:schemeClr val="tx1"/>
+            </a:solidFill>
+          </a:ln>
+        </p:spPr>
+        <p:style>
+          <a:lnRef idx="2">
+            <a:schemeClr val="accent1">
+              <a:shade val="50000"/>
+            </a:schemeClr>
+          </a:lnRef>
+          <a:fillRef idx="1">
+            <a:schemeClr val="accent1"/>
+          </a:fillRef>
+          <a:effectRef idx="0">
+            <a:schemeClr val="accent1"/>
+          </a:effectRef>
+          <a:fontRef idx="minor">
+            <a:schemeClr val="lt1"/>
+          </a:fontRef>
+        </p:style>
+        <p:txBody>
+          <a:bodyPr rtlCol="0" anchor="ctr"/>
+          <a:lstStyle/>
+          <a:p>
+            <a:pPr algn="ctr"/>
+            <a:r>
+              <a:rPr lang="sv-SE" sz="1100" dirty="0" smtClean="0">
+                <a:solidFill>
+                  <a:schemeClr val="tx1"/>
+                </a:solidFill>
+              </a:rPr>
+              <a:t>Intern lagring</a:t>
+            </a:r>
+            <a:endParaRPr lang="sv-SE" sz="1100" dirty="0">
+              <a:solidFill>
+                <a:schemeClr val="tx1"/>
+              </a:solidFill>
+            </a:endParaRPr>
+          </a:p>
+        </p:txBody>
+      </p:sp>
+      <p:sp>
+        <p:nvSpPr>
+          <p:cNvPr id="7" name="Flödesschema: Process 6"/>
+          <p:cNvSpPr/>
+          <p:nvPr/>
+        </p:nvSpPr>
+        <p:spPr>
+          <a:xfrm>
+            <a:off x="104843" y="4469583"/>
+            <a:ext cx="1408671" cy="468264"/>
+          </a:xfrm>
+          <a:prstGeom prst="flowChartProcess">
+            <a:avLst/>
+          </a:prstGeom>
+          <a:noFill/>
+        </p:spPr>
+        <p:style>
+          <a:lnRef idx="2">
+            <a:schemeClr val="accent1">
+              <a:shade val="50000"/>
+            </a:schemeClr>
+          </a:lnRef>
+          <a:fillRef idx="1">
+            <a:schemeClr val="accent1"/>
+          </a:fillRef>
+          <a:effectRef idx="0">
+            <a:schemeClr val="accent1"/>
+          </a:effectRef>
+          <a:fontRef idx="minor">
+            <a:schemeClr val="lt1"/>
+          </a:fontRef>
+        </p:style>
+        <p:txBody>
+          <a:bodyPr rtlCol="0" anchor="ctr"/>
+          <a:lstStyle/>
+          <a:p>
+            <a:pPr algn="ctr"/>
+            <a:r>
+              <a:rPr lang="sv-SE" sz="1100" dirty="0" smtClean="0">
+                <a:solidFill>
+                  <a:schemeClr val="tx1"/>
+                </a:solidFill>
+              </a:rPr>
+              <a:t>process</a:t>
+            </a:r>
+            <a:endParaRPr lang="sv-SE" sz="1100" dirty="0">
+              <a:solidFill>
+                <a:schemeClr val="tx1"/>
+              </a:solidFill>
+            </a:endParaRPr>
+          </a:p>
+        </p:txBody>
+      </p:sp>
+      <p:sp>
+        <p:nvSpPr>
+          <p:cNvPr id="8" name="Flödesschema: Process 7"/>
+          <p:cNvSpPr/>
+          <p:nvPr/>
+        </p:nvSpPr>
+        <p:spPr>
+          <a:xfrm>
+            <a:off x="2014060" y="1823477"/>
+            <a:ext cx="1408671" cy="236509"/>
+          </a:xfrm>
+          <a:prstGeom prst="flowChartProcess">
+            <a:avLst/>
+          </a:prstGeom>
+          <a:noFill/>
+        </p:spPr>
+        <p:style>
+          <a:lnRef idx="2">
+            <a:schemeClr val="accent1">
+              <a:shade val="50000"/>
+            </a:schemeClr>
+          </a:lnRef>
+          <a:fillRef idx="1">
+            <a:schemeClr val="accent1"/>
+          </a:fillRef>
+          <a:effectRef idx="0">
+            <a:schemeClr val="accent1"/>
+          </a:effectRef>
+          <a:fontRef idx="minor">
+            <a:schemeClr val="lt1"/>
+          </a:fontRef>
+        </p:style>
+        <p:txBody>
+          <a:bodyPr rtlCol="0" anchor="ctr"/>
+          <a:lstStyle/>
+          <a:p>
+            <a:pPr algn="ctr"/>
+            <a:r>
+              <a:rPr lang="sv-SE" sz="1100" dirty="0" smtClean="0">
+                <a:solidFill>
+                  <a:schemeClr val="tx1"/>
+                </a:solidFill>
+              </a:rPr>
+              <a:t>Set i=0</a:t>
+            </a:r>
+            <a:endParaRPr lang="sv-SE" sz="1100" dirty="0">
+              <a:solidFill>
+                <a:schemeClr val="tx1"/>
+              </a:solidFill>
+            </a:endParaRPr>
+          </a:p>
+        </p:txBody>
+      </p:sp>
+      <p:sp>
+        <p:nvSpPr>
+          <p:cNvPr id="9" name="Flödesschema: Process 8"/>
+          <p:cNvSpPr/>
+          <p:nvPr/>
+        </p:nvSpPr>
+        <p:spPr>
+          <a:xfrm>
+            <a:off x="2014060" y="2870049"/>
+            <a:ext cx="1408671" cy="379583"/>
+          </a:xfrm>
+          <a:prstGeom prst="flowChartProcess">
+            <a:avLst/>
+          </a:prstGeom>
+          <a:noFill/>
+        </p:spPr>
+        <p:style>
+          <a:lnRef idx="2">
+            <a:schemeClr val="accent1">
+              <a:shade val="50000"/>
+            </a:schemeClr>
+          </a:lnRef>
+          <a:fillRef idx="1">
+            <a:schemeClr val="accent1"/>
+          </a:fillRef>
+          <a:effectRef idx="0">
+            <a:schemeClr val="accent1"/>
+          </a:effectRef>
+          <a:fontRef idx="minor">
+            <a:schemeClr val="lt1"/>
+          </a:fontRef>
+        </p:style>
+        <p:txBody>
+          <a:bodyPr rtlCol="0" anchor="ctr"/>
+          <a:lstStyle/>
+          <a:p>
+            <a:pPr algn="ctr"/>
+            <a:r>
+              <a:rPr lang="sv-SE" sz="1100" dirty="0" smtClean="0">
+                <a:solidFill>
+                  <a:schemeClr val="tx1"/>
+                </a:solidFill>
+              </a:rPr>
+              <a:t>i += 1</a:t>
+            </a:r>
+            <a:endParaRPr lang="sv-SE" sz="1100" dirty="0">
+              <a:solidFill>
+                <a:schemeClr val="tx1"/>
+              </a:solidFill>
+            </a:endParaRPr>
+          </a:p>
+        </p:txBody>
+      </p:sp>
+      <p:sp>
+        <p:nvSpPr>
+          <p:cNvPr id="10" name="Flödesschema: Beslut 9"/>
+          <p:cNvSpPr/>
+          <p:nvPr/>
+        </p:nvSpPr>
+        <p:spPr>
+          <a:xfrm>
+            <a:off x="213078" y="7502745"/>
+            <a:ext cx="1716144" cy="598841"/>
+          </a:xfrm>
+          <a:prstGeom prst="flowChartDecision">
+            <a:avLst/>
+          </a:prstGeom>
+          <a:noFill/>
+        </p:spPr>
+        <p:style>
+          <a:lnRef idx="2">
+            <a:schemeClr val="accent1">
+              <a:shade val="50000"/>
+            </a:schemeClr>
+          </a:lnRef>
+          <a:fillRef idx="1">
+            <a:schemeClr val="accent1"/>
+          </a:fillRef>
+          <a:effectRef idx="0">
+            <a:schemeClr val="accent1"/>
+          </a:effectRef>
+          <a:fontRef idx="minor">
+            <a:schemeClr val="lt1"/>
+          </a:fontRef>
+        </p:style>
+        <p:txBody>
+          <a:bodyPr lIns="36000" rIns="36000" rtlCol="0" anchor="ctr"/>
+          <a:lstStyle/>
+          <a:p>
+            <a:pPr algn="ctr"/>
+            <a:r>
+              <a:rPr lang="sv-SE" sz="1100" dirty="0" err="1" smtClean="0">
+                <a:solidFill>
+                  <a:schemeClr val="tx1"/>
+                </a:solidFill>
+              </a:rPr>
+              <a:t>Desicion</a:t>
+            </a:r>
+            <a:endParaRPr lang="sv-SE" sz="1100" dirty="0">
+              <a:solidFill>
+                <a:schemeClr val="tx1"/>
+              </a:solidFill>
+            </a:endParaRPr>
+          </a:p>
+        </p:txBody>
+      </p:sp>
+      <p:sp useBgFill="1">
+        <p:nvSpPr>
+          <p:cNvPr id="11" name="Flödesschema: Beslut 10"/>
+          <p:cNvSpPr/>
+          <p:nvPr/>
+        </p:nvSpPr>
+        <p:spPr>
+          <a:xfrm>
+            <a:off x="1860323" y="3493537"/>
+            <a:ext cx="1716144" cy="598841"/>
+          </a:xfrm>
+          <a:prstGeom prst="flowChartDecision">
+            <a:avLst/>
+          </a:prstGeom>
+        </p:spPr>
+        <p:style>
+          <a:lnRef idx="2">
+            <a:schemeClr val="accent1">
+              <a:shade val="50000"/>
+            </a:schemeClr>
+          </a:lnRef>
+          <a:fillRef idx="1">
+            <a:schemeClr val="accent1"/>
+          </a:fillRef>
+          <a:effectRef idx="0">
+            <a:schemeClr val="accent1"/>
+          </a:effectRef>
+          <a:fontRef idx="minor">
+            <a:schemeClr val="lt1"/>
+          </a:fontRef>
+        </p:style>
+        <p:txBody>
+          <a:bodyPr lIns="36000" rIns="36000" rtlCol="0" anchor="ctr"/>
+          <a:lstStyle/>
+          <a:p>
+            <a:pPr algn="ctr"/>
+            <a:r>
+              <a:rPr lang="sv-SE" sz="1100" dirty="0">
+                <a:solidFill>
+                  <a:schemeClr val="tx1"/>
+                </a:solidFill>
+              </a:rPr>
+              <a:t>i</a:t>
+            </a:r>
+            <a:r>
+              <a:rPr lang="sv-SE" sz="1100" dirty="0" smtClean="0">
+                <a:solidFill>
+                  <a:schemeClr val="tx1"/>
+                </a:solidFill>
+              </a:rPr>
+              <a:t> &lt; </a:t>
+            </a:r>
+            <a:r>
+              <a:rPr lang="sv-SE" sz="1100" dirty="0" err="1" smtClean="0">
+                <a:solidFill>
+                  <a:schemeClr val="tx1"/>
+                </a:solidFill>
+              </a:rPr>
+              <a:t>number</a:t>
+            </a:r>
+            <a:r>
+              <a:rPr lang="sv-SE" sz="1100" dirty="0" smtClean="0">
+                <a:solidFill>
+                  <a:schemeClr val="tx1"/>
+                </a:solidFill>
+              </a:rPr>
+              <a:t> </a:t>
+            </a:r>
+            <a:r>
+              <a:rPr lang="sv-SE" sz="1100" dirty="0" err="1" smtClean="0">
+                <a:solidFill>
+                  <a:schemeClr val="tx1"/>
+                </a:solidFill>
+              </a:rPr>
+              <a:t>of</a:t>
+            </a:r>
+            <a:r>
+              <a:rPr lang="sv-SE" sz="1100" dirty="0" smtClean="0">
+                <a:solidFill>
+                  <a:schemeClr val="tx1"/>
+                </a:solidFill>
+              </a:rPr>
+              <a:t> </a:t>
+            </a:r>
+            <a:r>
+              <a:rPr lang="sv-SE" sz="1100" dirty="0" err="1" smtClean="0">
+                <a:solidFill>
+                  <a:schemeClr val="tx1"/>
+                </a:solidFill>
+              </a:rPr>
+              <a:t>sdLines</a:t>
+            </a:r>
+            <a:r>
+              <a:rPr lang="sv-SE" sz="1100" dirty="0" smtClean="0">
+                <a:solidFill>
+                  <a:schemeClr val="tx1"/>
+                </a:solidFill>
+              </a:rPr>
+              <a:t>?</a:t>
+            </a:r>
+            <a:endParaRPr lang="sv-SE" sz="1100" dirty="0">
+              <a:solidFill>
+                <a:schemeClr val="tx1"/>
+              </a:solidFill>
+            </a:endParaRPr>
+          </a:p>
+        </p:txBody>
+      </p:sp>
+      <p:sp>
+        <p:nvSpPr>
+          <p:cNvPr id="12" name="Flödesschema: Process 11"/>
+          <p:cNvSpPr/>
+          <p:nvPr/>
+        </p:nvSpPr>
+        <p:spPr>
+          <a:xfrm>
+            <a:off x="2014060" y="2292989"/>
+            <a:ext cx="1408671" cy="379583"/>
+          </a:xfrm>
+          <a:prstGeom prst="flowChartProcess">
+            <a:avLst/>
+          </a:prstGeom>
+          <a:noFill/>
+        </p:spPr>
+        <p:style>
+          <a:lnRef idx="2">
+            <a:schemeClr val="accent1">
+              <a:shade val="50000"/>
+            </a:schemeClr>
+          </a:lnRef>
+          <a:fillRef idx="1">
+            <a:schemeClr val="accent1"/>
+          </a:fillRef>
+          <a:effectRef idx="0">
+            <a:schemeClr val="accent1"/>
+          </a:effectRef>
+          <a:fontRef idx="minor">
+            <a:schemeClr val="lt1"/>
+          </a:fontRef>
+        </p:style>
+        <p:txBody>
+          <a:bodyPr rtlCol="0" anchor="ctr"/>
+          <a:lstStyle/>
+          <a:p>
+            <a:pPr algn="ctr"/>
+            <a:r>
+              <a:rPr lang="sv-SE" sz="1100" dirty="0" smtClean="0">
+                <a:solidFill>
+                  <a:schemeClr val="tx1"/>
+                </a:solidFill>
+              </a:rPr>
+              <a:t>Process </a:t>
+            </a:r>
+            <a:r>
+              <a:rPr lang="sv-SE" sz="1100" dirty="0" err="1" smtClean="0">
+                <a:solidFill>
+                  <a:schemeClr val="tx1"/>
+                </a:solidFill>
+              </a:rPr>
+              <a:t>line</a:t>
+            </a:r>
+            <a:r>
+              <a:rPr lang="sv-SE" sz="1100" dirty="0" smtClean="0">
+                <a:solidFill>
+                  <a:schemeClr val="tx1"/>
+                </a:solidFill>
+              </a:rPr>
+              <a:t> i</a:t>
+            </a:r>
+            <a:endParaRPr lang="sv-SE" sz="1100" dirty="0">
+              <a:solidFill>
+                <a:schemeClr val="tx1"/>
+              </a:solidFill>
+            </a:endParaRPr>
+          </a:p>
+        </p:txBody>
+      </p:sp>
+      <p:cxnSp>
+        <p:nvCxnSpPr>
+          <p:cNvPr id="14" name="Rak pilkoppling 13"/>
+          <p:cNvCxnSpPr>
+            <a:stCxn id="5" idx="2"/>
+            <a:endCxn id="8" idx="0"/>
+          </p:cNvCxnSpPr>
+          <p:nvPr/>
+        </p:nvCxnSpPr>
+        <p:spPr>
+          <a:xfrm flipH="1">
+            <a:off x="2718396" y="1671334"/>
+            <a:ext cx="76920" cy="152143"/>
+          </a:xfrm>
+          <a:prstGeom prst="straightConnector1">
+            <a:avLst/>
+          </a:prstGeom>
+          <a:ln>
+            <a:tailEnd type="triangle"/>
+          </a:ln>
+        </p:spPr>
+        <p:style>
+          <a:lnRef idx="1">
+            <a:schemeClr val="accent1"/>
+          </a:lnRef>
+          <a:fillRef idx="0">
+            <a:schemeClr val="accent1"/>
+          </a:fillRef>
+          <a:effectRef idx="0">
+            <a:schemeClr val="accent1"/>
+          </a:effectRef>
+          <a:fontRef idx="minor">
+            <a:schemeClr val="tx1"/>
+          </a:fontRef>
+        </p:style>
+      </p:cxnSp>
+      <p:cxnSp>
+        <p:nvCxnSpPr>
+          <p:cNvPr id="17" name="Rak pilkoppling 16"/>
+          <p:cNvCxnSpPr/>
+          <p:nvPr/>
+        </p:nvCxnSpPr>
+        <p:spPr>
+          <a:xfrm>
+            <a:off x="2718395" y="2059986"/>
+            <a:ext cx="0" cy="233003"/>
+          </a:xfrm>
+          <a:prstGeom prst="straightConnector1">
+            <a:avLst/>
+          </a:prstGeom>
+          <a:ln>
+            <a:tailEnd type="triangle"/>
+          </a:ln>
+        </p:spPr>
+        <p:style>
+          <a:lnRef idx="1">
+            <a:schemeClr val="accent1"/>
+          </a:lnRef>
+          <a:fillRef idx="0">
+            <a:schemeClr val="accent1"/>
+          </a:fillRef>
+          <a:effectRef idx="0">
+            <a:schemeClr val="accent1"/>
+          </a:effectRef>
+          <a:fontRef idx="minor">
+            <a:schemeClr val="tx1"/>
+          </a:fontRef>
+        </p:style>
+      </p:cxnSp>
+      <p:cxnSp>
+        <p:nvCxnSpPr>
+          <p:cNvPr id="20" name="Rak pilkoppling 19"/>
+          <p:cNvCxnSpPr/>
+          <p:nvPr/>
+        </p:nvCxnSpPr>
+        <p:spPr>
+          <a:xfrm>
+            <a:off x="2718395" y="2672572"/>
+            <a:ext cx="0" cy="197477"/>
+          </a:xfrm>
+          <a:prstGeom prst="straightConnector1">
+            <a:avLst/>
+          </a:prstGeom>
+          <a:ln>
+            <a:tailEnd type="triangle"/>
+          </a:ln>
+        </p:spPr>
+        <p:style>
+          <a:lnRef idx="1">
+            <a:schemeClr val="accent1"/>
+          </a:lnRef>
+          <a:fillRef idx="0">
+            <a:schemeClr val="accent1"/>
+          </a:fillRef>
+          <a:effectRef idx="0">
+            <a:schemeClr val="accent1"/>
+          </a:effectRef>
+          <a:fontRef idx="minor">
+            <a:schemeClr val="tx1"/>
+          </a:fontRef>
+        </p:style>
+      </p:cxnSp>
+      <p:cxnSp>
+        <p:nvCxnSpPr>
+          <p:cNvPr id="24" name="Rak pilkoppling 23"/>
+          <p:cNvCxnSpPr/>
+          <p:nvPr/>
+        </p:nvCxnSpPr>
+        <p:spPr>
+          <a:xfrm flipH="1">
+            <a:off x="2718395" y="3249632"/>
+            <a:ext cx="1" cy="243905"/>
+          </a:xfrm>
+          <a:prstGeom prst="straightConnector1">
+            <a:avLst/>
+          </a:prstGeom>
+          <a:ln>
+            <a:tailEnd type="triangle"/>
+          </a:ln>
+        </p:spPr>
+        <p:style>
+          <a:lnRef idx="1">
+            <a:schemeClr val="accent1"/>
+          </a:lnRef>
+          <a:fillRef idx="0">
+            <a:schemeClr val="accent1"/>
+          </a:fillRef>
+          <a:effectRef idx="0">
+            <a:schemeClr val="accent1"/>
+          </a:effectRef>
+          <a:fontRef idx="minor">
+            <a:schemeClr val="tx1"/>
+          </a:fontRef>
+        </p:style>
+      </p:cxnSp>
+      <p:cxnSp>
+        <p:nvCxnSpPr>
+          <p:cNvPr id="27" name="Vinklad koppling 26"/>
+          <p:cNvCxnSpPr>
+            <a:stCxn id="11" idx="3"/>
+            <a:endCxn id="12" idx="3"/>
+          </p:cNvCxnSpPr>
+          <p:nvPr/>
+        </p:nvCxnSpPr>
+        <p:spPr>
+          <a:xfrm flipH="1" flipV="1">
+            <a:off x="3422731" y="2482781"/>
+            <a:ext cx="153736" cy="1310177"/>
+          </a:xfrm>
+          <a:prstGeom prst="bentConnector3">
+            <a:avLst>
+              <a:gd name="adj1" fmla="val -148696"/>
+            </a:avLst>
+          </a:prstGeom>
+          <a:ln>
+            <a:tailEnd type="triangle"/>
+          </a:ln>
+        </p:spPr>
+        <p:style>
+          <a:lnRef idx="1">
+            <a:schemeClr val="accent1"/>
+          </a:lnRef>
+          <a:fillRef idx="0">
+            <a:schemeClr val="accent1"/>
+          </a:fillRef>
+          <a:effectRef idx="0">
+            <a:schemeClr val="accent1"/>
+          </a:effectRef>
+          <a:fontRef idx="minor">
+            <a:schemeClr val="tx1"/>
+          </a:fontRef>
+        </p:style>
+      </p:cxnSp>
+      <p:cxnSp>
+        <p:nvCxnSpPr>
+          <p:cNvPr id="33" name="Rak pilkoppling 32"/>
+          <p:cNvCxnSpPr>
+            <a:stCxn id="11" idx="2"/>
+            <a:endCxn id="35" idx="0"/>
+          </p:cNvCxnSpPr>
+          <p:nvPr/>
+        </p:nvCxnSpPr>
+        <p:spPr>
+          <a:xfrm>
+            <a:off x="2718395" y="4092378"/>
+            <a:ext cx="1" cy="434952"/>
+          </a:xfrm>
+          <a:prstGeom prst="straightConnector1">
+            <a:avLst/>
+          </a:prstGeom>
+          <a:ln>
+            <a:tailEnd type="triangle"/>
+          </a:ln>
+        </p:spPr>
+        <p:style>
+          <a:lnRef idx="1">
+            <a:schemeClr val="accent1"/>
+          </a:lnRef>
+          <a:fillRef idx="0">
+            <a:schemeClr val="accent1"/>
+          </a:fillRef>
+          <a:effectRef idx="0">
+            <a:schemeClr val="accent1"/>
+          </a:effectRef>
+          <a:fontRef idx="minor">
+            <a:schemeClr val="tx1"/>
+          </a:fontRef>
+        </p:style>
+      </p:cxnSp>
+      <p:sp>
+        <p:nvSpPr>
+          <p:cNvPr id="35" name="Flödesschema: Process 34"/>
+          <p:cNvSpPr/>
+          <p:nvPr/>
+        </p:nvSpPr>
+        <p:spPr>
+          <a:xfrm>
+            <a:off x="2014060" y="4527330"/>
+            <a:ext cx="1408671" cy="468264"/>
+          </a:xfrm>
+          <a:prstGeom prst="flowChartProcess">
+            <a:avLst/>
+          </a:prstGeom>
+          <a:noFill/>
+        </p:spPr>
+        <p:style>
+          <a:lnRef idx="2">
+            <a:schemeClr val="accent1">
+              <a:shade val="50000"/>
+            </a:schemeClr>
+          </a:lnRef>
+          <a:fillRef idx="1">
+            <a:schemeClr val="accent1"/>
+          </a:fillRef>
+          <a:effectRef idx="0">
+            <a:schemeClr val="accent1"/>
+          </a:effectRef>
+          <a:fontRef idx="minor">
+            <a:schemeClr val="lt1"/>
+          </a:fontRef>
+        </p:style>
+        <p:txBody>
+          <a:bodyPr rtlCol="0" anchor="ctr"/>
+          <a:lstStyle/>
+          <a:p>
+            <a:pPr algn="ctr"/>
+            <a:endParaRPr lang="sv-SE" sz="1100" dirty="0">
+              <a:solidFill>
+                <a:schemeClr val="tx1"/>
+              </a:solidFill>
+            </a:endParaRPr>
+          </a:p>
+        </p:txBody>
+      </p:sp>
+      <p:sp>
+        <p:nvSpPr>
+          <p:cNvPr id="39" name="Flödesschema: Process 38"/>
+          <p:cNvSpPr/>
+          <p:nvPr/>
+        </p:nvSpPr>
+        <p:spPr>
+          <a:xfrm>
+            <a:off x="256173" y="371036"/>
+            <a:ext cx="1692762" cy="287589"/>
+          </a:xfrm>
+          <a:prstGeom prst="flowChartProcess">
+            <a:avLst/>
+          </a:prstGeom>
+          <a:noFill/>
+        </p:spPr>
+        <p:style>
+          <a:lnRef idx="2">
+            <a:schemeClr val="accent1">
+              <a:shade val="50000"/>
+            </a:schemeClr>
+          </a:lnRef>
+          <a:fillRef idx="1">
+            <a:schemeClr val="accent1"/>
+          </a:fillRef>
+          <a:effectRef idx="0">
+            <a:schemeClr val="accent1"/>
+          </a:effectRef>
+          <a:fontRef idx="minor">
+            <a:schemeClr val="lt1"/>
+          </a:fontRef>
+        </p:style>
+        <p:txBody>
+          <a:bodyPr rtlCol="0" anchor="t"/>
+          <a:lstStyle/>
+          <a:p>
+            <a:r>
+              <a:rPr lang="sv-SE" sz="1100" b="1" u="sng" dirty="0" err="1" smtClean="0">
+                <a:solidFill>
+                  <a:srgbClr val="000000"/>
+                </a:solidFill>
+                <a:latin typeface="Consolas" panose="020B0609020204030204" pitchFamily="49" charset="0"/>
+              </a:rPr>
+              <a:t>createSdLines</a:t>
+            </a:r>
+            <a:endParaRPr lang="sv-SE" sz="1100" b="1" u="sng" dirty="0" smtClean="0">
+              <a:solidFill>
+                <a:srgbClr val="000000"/>
+              </a:solidFill>
+              <a:latin typeface="Consolas" panose="020B0609020204030204" pitchFamily="49" charset="0"/>
+            </a:endParaRPr>
+          </a:p>
+        </p:txBody>
+      </p:sp>
+      <p:sp>
+        <p:nvSpPr>
+          <p:cNvPr id="40" name="Flödesschema: Begränsare 39"/>
+          <p:cNvSpPr/>
+          <p:nvPr/>
+        </p:nvSpPr>
+        <p:spPr>
+          <a:xfrm>
+            <a:off x="2430794" y="827895"/>
+            <a:ext cx="729044" cy="250586"/>
+          </a:xfrm>
+          <a:prstGeom prst="flowChartTerminator">
+            <a:avLst/>
+          </a:prstGeom>
+          <a:noFill/>
+        </p:spPr>
+        <p:style>
+          <a:lnRef idx="2">
+            <a:schemeClr val="accent1">
+              <a:shade val="50000"/>
+            </a:schemeClr>
+          </a:lnRef>
+          <a:fillRef idx="1">
+            <a:schemeClr val="accent1"/>
+          </a:fillRef>
+          <a:effectRef idx="0">
+            <a:schemeClr val="accent1"/>
+          </a:effectRef>
+          <a:fontRef idx="minor">
+            <a:schemeClr val="lt1"/>
+          </a:fontRef>
+        </p:style>
+        <p:txBody>
+          <a:bodyPr rtlCol="0" anchor="ctr"/>
+          <a:lstStyle/>
+          <a:p>
+            <a:pPr algn="ctr"/>
+            <a:r>
+              <a:rPr lang="sv-SE" sz="1200" dirty="0" smtClean="0">
+                <a:solidFill>
+                  <a:schemeClr val="tx1"/>
+                </a:solidFill>
+              </a:rPr>
+              <a:t>Start</a:t>
+            </a:r>
+            <a:endParaRPr lang="sv-SE" sz="1200" dirty="0">
+              <a:solidFill>
+                <a:schemeClr val="tx1"/>
+              </a:solidFill>
+            </a:endParaRPr>
+          </a:p>
+        </p:txBody>
+      </p:sp>
+      <p:cxnSp>
+        <p:nvCxnSpPr>
+          <p:cNvPr id="42" name="Rak pilkoppling 41"/>
+          <p:cNvCxnSpPr>
+            <a:stCxn id="40" idx="2"/>
+            <a:endCxn id="5" idx="0"/>
+          </p:cNvCxnSpPr>
+          <p:nvPr/>
+        </p:nvCxnSpPr>
+        <p:spPr>
+          <a:xfrm>
+            <a:off x="2795316" y="1078481"/>
+            <a:ext cx="0" cy="87187"/>
+          </a:xfrm>
+          <a:prstGeom prst="straightConnector1">
+            <a:avLst/>
+          </a:prstGeom>
+          <a:ln>
+            <a:tailEnd type="triangle"/>
+          </a:ln>
+        </p:spPr>
+        <p:style>
+          <a:lnRef idx="1">
+            <a:schemeClr val="accent1"/>
+          </a:lnRef>
+          <a:fillRef idx="0">
+            <a:schemeClr val="accent1"/>
+          </a:fillRef>
+          <a:effectRef idx="0">
+            <a:schemeClr val="accent1"/>
+          </a:effectRef>
+          <a:fontRef idx="minor">
+            <a:schemeClr val="tx1"/>
+          </a:fontRef>
+        </p:style>
+      </p:cxnSp>
+    </p:spTree>
+    <p:extLst>
+      <p:ext uri="{BB962C8B-B14F-4D97-AF65-F5344CB8AC3E}">
+        <p14:creationId xmlns:p14="http://schemas.microsoft.com/office/powerpoint/2010/main" val="3633092711"/>
       </p:ext>
     </p:extLst>
   </p:cSld>

</xml_diff>

<commit_message>
Added Code snippet ClassHeader
</commit_message>
<xml_diff>
--- a/Presentation1.pptx
+++ b/Presentation1.pptx
@@ -244,7 +244,7 @@
           <a:p>
             <a:fld id="{67C4A0DB-23A0-4C2A-BC24-C417547B364E}" type="datetimeFigureOut">
               <a:rPr lang="sv-SE" smtClean="0"/>
-              <a:t>2021-04-15</a:t>
+              <a:t>2021-04-17</a:t>
             </a:fld>
             <a:endParaRPr lang="sv-SE"/>
           </a:p>
@@ -414,7 +414,7 @@
           <a:p>
             <a:fld id="{67C4A0DB-23A0-4C2A-BC24-C417547B364E}" type="datetimeFigureOut">
               <a:rPr lang="sv-SE" smtClean="0"/>
-              <a:t>2021-04-15</a:t>
+              <a:t>2021-04-17</a:t>
             </a:fld>
             <a:endParaRPr lang="sv-SE"/>
           </a:p>
@@ -594,7 +594,7 @@
           <a:p>
             <a:fld id="{67C4A0DB-23A0-4C2A-BC24-C417547B364E}" type="datetimeFigureOut">
               <a:rPr lang="sv-SE" smtClean="0"/>
-              <a:t>2021-04-15</a:t>
+              <a:t>2021-04-17</a:t>
             </a:fld>
             <a:endParaRPr lang="sv-SE"/>
           </a:p>
@@ -764,7 +764,7 @@
           <a:p>
             <a:fld id="{67C4A0DB-23A0-4C2A-BC24-C417547B364E}" type="datetimeFigureOut">
               <a:rPr lang="sv-SE" smtClean="0"/>
-              <a:t>2021-04-15</a:t>
+              <a:t>2021-04-17</a:t>
             </a:fld>
             <a:endParaRPr lang="sv-SE"/>
           </a:p>
@@ -1008,7 +1008,7 @@
           <a:p>
             <a:fld id="{67C4A0DB-23A0-4C2A-BC24-C417547B364E}" type="datetimeFigureOut">
               <a:rPr lang="sv-SE" smtClean="0"/>
-              <a:t>2021-04-15</a:t>
+              <a:t>2021-04-17</a:t>
             </a:fld>
             <a:endParaRPr lang="sv-SE"/>
           </a:p>
@@ -1240,7 +1240,7 @@
           <a:p>
             <a:fld id="{67C4A0DB-23A0-4C2A-BC24-C417547B364E}" type="datetimeFigureOut">
               <a:rPr lang="sv-SE" smtClean="0"/>
-              <a:t>2021-04-15</a:t>
+              <a:t>2021-04-17</a:t>
             </a:fld>
             <a:endParaRPr lang="sv-SE"/>
           </a:p>
@@ -1607,7 +1607,7 @@
           <a:p>
             <a:fld id="{67C4A0DB-23A0-4C2A-BC24-C417547B364E}" type="datetimeFigureOut">
               <a:rPr lang="sv-SE" smtClean="0"/>
-              <a:t>2021-04-15</a:t>
+              <a:t>2021-04-17</a:t>
             </a:fld>
             <a:endParaRPr lang="sv-SE"/>
           </a:p>
@@ -1725,7 +1725,7 @@
           <a:p>
             <a:fld id="{67C4A0DB-23A0-4C2A-BC24-C417547B364E}" type="datetimeFigureOut">
               <a:rPr lang="sv-SE" smtClean="0"/>
-              <a:t>2021-04-15</a:t>
+              <a:t>2021-04-17</a:t>
             </a:fld>
             <a:endParaRPr lang="sv-SE"/>
           </a:p>
@@ -1820,7 +1820,7 @@
           <a:p>
             <a:fld id="{67C4A0DB-23A0-4C2A-BC24-C417547B364E}" type="datetimeFigureOut">
               <a:rPr lang="sv-SE" smtClean="0"/>
-              <a:t>2021-04-15</a:t>
+              <a:t>2021-04-17</a:t>
             </a:fld>
             <a:endParaRPr lang="sv-SE"/>
           </a:p>
@@ -2097,7 +2097,7 @@
           <a:p>
             <a:fld id="{67C4A0DB-23A0-4C2A-BC24-C417547B364E}" type="datetimeFigureOut">
               <a:rPr lang="sv-SE" smtClean="0"/>
-              <a:t>2021-04-15</a:t>
+              <a:t>2021-04-17</a:t>
             </a:fld>
             <a:endParaRPr lang="sv-SE"/>
           </a:p>
@@ -2354,7 +2354,7 @@
           <a:p>
             <a:fld id="{67C4A0DB-23A0-4C2A-BC24-C417547B364E}" type="datetimeFigureOut">
               <a:rPr lang="sv-SE" smtClean="0"/>
-              <a:t>2021-04-15</a:t>
+              <a:t>2021-04-17</a:t>
             </a:fld>
             <a:endParaRPr lang="sv-SE"/>
           </a:p>
@@ -2567,7 +2567,7 @@
           <a:p>
             <a:fld id="{67C4A0DB-23A0-4C2A-BC24-C417547B364E}" type="datetimeFigureOut">
               <a:rPr lang="sv-SE" smtClean="0"/>
-              <a:t>2021-04-15</a:t>
+              <a:t>2021-04-17</a:t>
             </a:fld>
             <a:endParaRPr lang="sv-SE"/>
           </a:p>
@@ -3520,59 +3520,6 @@
       </p:sp>
       <p:sp>
         <p:nvSpPr>
-          <p:cNvPr id="20" name="Flödesschema: Manuella indata 19"/>
-          <p:cNvSpPr/>
-          <p:nvPr/>
-        </p:nvSpPr>
-        <p:spPr>
-          <a:xfrm>
-            <a:off x="574468" y="10824151"/>
-            <a:ext cx="1027611" cy="722811"/>
-          </a:xfrm>
-          <a:prstGeom prst="flowChartManualInput">
-            <a:avLst/>
-          </a:prstGeom>
-          <a:noFill/>
-        </p:spPr>
-        <p:style>
-          <a:lnRef idx="2">
-            <a:schemeClr val="accent1">
-              <a:shade val="50000"/>
-            </a:schemeClr>
-          </a:lnRef>
-          <a:fillRef idx="1">
-            <a:schemeClr val="accent1"/>
-          </a:fillRef>
-          <a:effectRef idx="0">
-            <a:schemeClr val="accent1"/>
-          </a:effectRef>
-          <a:fontRef idx="minor">
-            <a:schemeClr val="lt1"/>
-          </a:fontRef>
-        </p:style>
-        <p:txBody>
-          <a:bodyPr rtlCol="0" anchor="ctr"/>
-          <a:lstStyle/>
-          <a:p>
-            <a:pPr algn="ctr"/>
-            <a:r>
-              <a:rPr lang="sv-SE" sz="1100" dirty="0" smtClean="0">
-                <a:solidFill>
-                  <a:schemeClr val="tx1"/>
-                </a:solidFill>
-              </a:rPr>
-              <a:t>Manual input</a:t>
-            </a:r>
-            <a:endParaRPr lang="sv-SE" sz="1100" dirty="0">
-              <a:solidFill>
-                <a:schemeClr val="tx1"/>
-              </a:solidFill>
-            </a:endParaRPr>
-          </a:p>
-        </p:txBody>
-      </p:sp>
-      <p:sp>
-        <p:nvSpPr>
           <p:cNvPr id="22" name="Flödesschema: Data 21"/>
           <p:cNvSpPr/>
           <p:nvPr/>
@@ -4044,8 +3991,8 @@
         </p:nvSpPr>
         <p:spPr>
           <a:xfrm>
-            <a:off x="2337872" y="4934253"/>
-            <a:ext cx="1175823" cy="273059"/>
+            <a:off x="2337872" y="4659803"/>
+            <a:ext cx="1399212" cy="547510"/>
           </a:xfrm>
           <a:prstGeom prst="flowChartProcess">
             <a:avLst/>
@@ -4073,13 +4020,66 @@
           <a:lstStyle/>
           <a:p>
             <a:r>
-              <a:rPr lang="sv-SE" sz="1100" b="1" u="sng" dirty="0" err="1">
+              <a:rPr lang="sv-SE" sz="1100" b="1" u="sng" dirty="0" err="1" smtClean="0">
                 <a:solidFill>
                   <a:srgbClr val="000000"/>
                 </a:solidFill>
                 <a:latin typeface="Consolas" panose="020B0609020204030204" pitchFamily="49" charset="0"/>
               </a:rPr>
               <a:t>createSdLines</a:t>
+            </a:r>
+            <a:endParaRPr lang="sv-SE" sz="1100" b="1" u="sng" dirty="0" smtClean="0">
+              <a:solidFill>
+                <a:srgbClr val="000000"/>
+              </a:solidFill>
+              <a:latin typeface="Consolas" panose="020B0609020204030204" pitchFamily="49" charset="0"/>
+            </a:endParaRPr>
+          </a:p>
+          <a:p>
+            <a:r>
+              <a:rPr lang="sv-SE" sz="1100" b="1" u="sng" dirty="0" smtClean="0">
+                <a:solidFill>
+                  <a:srgbClr val="000000"/>
+                </a:solidFill>
+                <a:latin typeface="Consolas" panose="020B0609020204030204" pitchFamily="49" charset="0"/>
+              </a:rPr>
+              <a:t>(</a:t>
+            </a:r>
+            <a:r>
+              <a:rPr lang="sv-SE" sz="1100" b="1" u="sng" dirty="0" err="1" smtClean="0">
+                <a:solidFill>
+                  <a:srgbClr val="000000"/>
+                </a:solidFill>
+                <a:latin typeface="Consolas" panose="020B0609020204030204" pitchFamily="49" charset="0"/>
+              </a:rPr>
+              <a:t>see</a:t>
+            </a:r>
+            <a:r>
+              <a:rPr lang="sv-SE" sz="1100" b="1" u="sng" dirty="0" smtClean="0">
+                <a:solidFill>
+                  <a:srgbClr val="000000"/>
+                </a:solidFill>
+                <a:latin typeface="Consolas" panose="020B0609020204030204" pitchFamily="49" charset="0"/>
+              </a:rPr>
+              <a:t> </a:t>
+            </a:r>
+            <a:r>
+              <a:rPr lang="sv-SE" sz="1100" b="1" u="sng" dirty="0" err="1" smtClean="0">
+                <a:solidFill>
+                  <a:srgbClr val="000000"/>
+                </a:solidFill>
+                <a:latin typeface="Consolas" panose="020B0609020204030204" pitchFamily="49" charset="0"/>
+              </a:rPr>
+              <a:t>flowchart</a:t>
+            </a:r>
+            <a:r>
+              <a:rPr lang="sv-SE" sz="1100" b="1" u="sng" dirty="0" smtClean="0">
+                <a:solidFill>
+                  <a:srgbClr val="000000"/>
+                </a:solidFill>
+                <a:latin typeface="Consolas" panose="020B0609020204030204" pitchFamily="49" charset="0"/>
+              </a:rPr>
+              <a:t>)</a:t>
             </a:r>
             <a:endParaRPr lang="sv-SE" sz="1100" b="1" u="sng" dirty="0">
               <a:solidFill>
@@ -4099,9 +4099,9 @@
           <p:nvPr/>
         </p:nvCxnSpPr>
         <p:spPr>
-          <a:xfrm flipH="1">
-            <a:off x="2925784" y="4493572"/>
-            <a:ext cx="47898" cy="440681"/>
+          <a:xfrm>
+            <a:off x="2973682" y="4493572"/>
+            <a:ext cx="63796" cy="166231"/>
           </a:xfrm>
           <a:prstGeom prst="straightConnector1">
             <a:avLst/>
@@ -4372,16 +4372,7 @@
                 </a:solidFill>
                 <a:latin typeface="Consolas" panose="020B0609020204030204" pitchFamily="49" charset="0"/>
               </a:rPr>
-              <a:t>Set y</a:t>
-            </a:r>
-            <a:r>
-              <a:rPr lang="sv-SE" sz="1100" dirty="0" smtClean="0">
-                <a:solidFill>
-                  <a:srgbClr val="000000"/>
-                </a:solidFill>
-                <a:latin typeface="Consolas" panose="020B0609020204030204" pitchFamily="49" charset="0"/>
-              </a:rPr>
-              <a:t>= </a:t>
+              <a:t>Set y= </a:t>
             </a:r>
             <a:r>
               <a:rPr lang="sv-SE" sz="1100" dirty="0" err="1">
@@ -4683,8 +4674,8 @@
         </p:nvCxnSpPr>
         <p:spPr>
           <a:xfrm>
-            <a:off x="2925784" y="5207312"/>
-            <a:ext cx="129108" cy="158277"/>
+            <a:off x="3037478" y="5207313"/>
+            <a:ext cx="17414" cy="158276"/>
           </a:xfrm>
           <a:prstGeom prst="straightConnector1">
             <a:avLst/>
@@ -4847,6 +4838,132 @@
             <a:endParaRPr lang="sv-SE" sz="1100" dirty="0">
               <a:solidFill>
                 <a:prstClr val="black"/>
+              </a:solidFill>
+              <a:latin typeface="Consolas" panose="020B0609020204030204" pitchFamily="49" charset="0"/>
+            </a:endParaRPr>
+          </a:p>
+        </p:txBody>
+      </p:sp>
+      <p:sp>
+        <p:nvSpPr>
+          <p:cNvPr id="42" name="Flödesschema: Manuella indata 41"/>
+          <p:cNvSpPr/>
+          <p:nvPr/>
+        </p:nvSpPr>
+        <p:spPr>
+          <a:xfrm>
+            <a:off x="1702458" y="9623727"/>
+            <a:ext cx="1457636" cy="722811"/>
+          </a:xfrm>
+          <a:prstGeom prst="flowChartManualInput">
+            <a:avLst/>
+          </a:prstGeom>
+          <a:noFill/>
+        </p:spPr>
+        <p:style>
+          <a:lnRef idx="2">
+            <a:schemeClr val="accent1">
+              <a:shade val="50000"/>
+            </a:schemeClr>
+          </a:lnRef>
+          <a:fillRef idx="1">
+            <a:schemeClr val="accent1"/>
+          </a:fillRef>
+          <a:effectRef idx="0">
+            <a:schemeClr val="accent1"/>
+          </a:effectRef>
+          <a:fontRef idx="minor">
+            <a:schemeClr val="lt1"/>
+          </a:fontRef>
+        </p:style>
+        <p:txBody>
+          <a:bodyPr rtlCol="0" anchor="ctr"/>
+          <a:lstStyle/>
+          <a:p>
+            <a:pPr algn="ctr"/>
+            <a:r>
+              <a:rPr lang="sv-SE" sz="1100" dirty="0" smtClean="0">
+                <a:solidFill>
+                  <a:schemeClr val="tx1"/>
+                </a:solidFill>
+              </a:rPr>
+              <a:t>Manual </a:t>
+            </a:r>
+            <a:r>
+              <a:rPr lang="sv-SE" sz="1100" dirty="0" smtClean="0">
+                <a:solidFill>
+                  <a:schemeClr val="tx1"/>
+                </a:solidFill>
+              </a:rPr>
+              <a:t>input/</a:t>
+            </a:r>
+            <a:r>
+              <a:rPr lang="sv-SE" sz="1100" dirty="0" err="1" smtClean="0">
+                <a:solidFill>
+                  <a:schemeClr val="tx1"/>
+                </a:solidFill>
+              </a:rPr>
+              <a:t>preferences</a:t>
+            </a:r>
+            <a:endParaRPr lang="sv-SE" sz="1100" dirty="0">
+              <a:solidFill>
+                <a:schemeClr val="tx1"/>
+              </a:solidFill>
+            </a:endParaRPr>
+          </a:p>
+        </p:txBody>
+      </p:sp>
+      <p:sp>
+        <p:nvSpPr>
+          <p:cNvPr id="44" name="Flödesschema: Process 43"/>
+          <p:cNvSpPr/>
+          <p:nvPr/>
+        </p:nvSpPr>
+        <p:spPr>
+          <a:xfrm>
+            <a:off x="2203563" y="196789"/>
+            <a:ext cx="1692762" cy="287589"/>
+          </a:xfrm>
+          <a:prstGeom prst="flowChartProcess">
+            <a:avLst/>
+          </a:prstGeom>
+          <a:noFill/>
+          <a:ln>
+            <a:noFill/>
+          </a:ln>
+        </p:spPr>
+        <p:style>
+          <a:lnRef idx="2">
+            <a:schemeClr val="accent1">
+              <a:shade val="50000"/>
+            </a:schemeClr>
+          </a:lnRef>
+          <a:fillRef idx="1">
+            <a:schemeClr val="accent1"/>
+          </a:fillRef>
+          <a:effectRef idx="0">
+            <a:schemeClr val="accent1"/>
+          </a:effectRef>
+          <a:fontRef idx="minor">
+            <a:schemeClr val="lt1"/>
+          </a:fontRef>
+        </p:style>
+        <p:txBody>
+          <a:bodyPr rtlCol="0" anchor="t"/>
+          <a:lstStyle/>
+          <a:p>
+            <a:r>
+              <a:rPr lang="sv-SE" b="1" u="sng" dirty="0" err="1" smtClean="0">
+                <a:solidFill>
+                  <a:srgbClr val="000000"/>
+                </a:solidFill>
+                <a:latin typeface="Consolas" panose="020B0609020204030204" pitchFamily="49" charset="0"/>
+              </a:rPr>
+              <a:t>createTip</a:t>
+            </a:r>
+            <a:endParaRPr lang="sv-SE" b="1" u="sng" dirty="0" smtClean="0">
+              <a:solidFill>
+                <a:srgbClr val="000000"/>
               </a:solidFill>
               <a:latin typeface="Consolas" panose="020B0609020204030204" pitchFamily="49" charset="0"/>
             </a:endParaRPr>
@@ -4891,7 +5008,7 @@
         </p:nvSpPr>
         <p:spPr>
           <a:xfrm>
-            <a:off x="339632" y="5122435"/>
+            <a:off x="339632" y="6781419"/>
             <a:ext cx="1236617" cy="486279"/>
           </a:xfrm>
           <a:prstGeom prst="flowChartInputOutput">
@@ -4943,8 +5060,8 @@
         </p:nvSpPr>
         <p:spPr>
           <a:xfrm>
-            <a:off x="557345" y="6722414"/>
-            <a:ext cx="1027611" cy="722811"/>
+            <a:off x="557345" y="8381398"/>
+            <a:ext cx="1457636" cy="722811"/>
           </a:xfrm>
           <a:prstGeom prst="flowChartManualInput">
             <a:avLst/>
@@ -4978,7 +5095,23 @@
                   <a:schemeClr val="tx1"/>
                 </a:solidFill>
               </a:rPr>
-              <a:t>Manual input</a:t>
+              <a:t>Manual </a:t>
+            </a:r>
+            <a:r>
+              <a:rPr lang="sv-SE" sz="1100" dirty="0" smtClean="0">
+                <a:solidFill>
+                  <a:schemeClr val="tx1"/>
+                </a:solidFill>
+              </a:rPr>
+              <a:t>input/</a:t>
+            </a:r>
+            <a:r>
+              <a:rPr lang="sv-SE" sz="1100" dirty="0" err="1" smtClean="0">
+                <a:solidFill>
+                  <a:schemeClr val="tx1"/>
+                </a:solidFill>
+              </a:rPr>
+              <a:t>preferences</a:t>
             </a:r>
             <a:endParaRPr lang="sv-SE" sz="1100" dirty="0">
               <a:solidFill>
@@ -4990,83 +5123,13 @@
       </p:sp>
       <p:sp>
         <p:nvSpPr>
-          <p:cNvPr id="5" name="Flödesschema: Process 4"/>
-          <p:cNvSpPr/>
-          <p:nvPr/>
-        </p:nvSpPr>
-        <p:spPr>
-          <a:xfrm>
-            <a:off x="2061517" y="1165668"/>
-            <a:ext cx="1692762" cy="313922"/>
-          </a:xfrm>
-          <a:prstGeom prst="flowChartProcess">
-            <a:avLst/>
-          </a:prstGeom>
-          <a:noFill/>
-        </p:spPr>
-        <p:style>
-          <a:lnRef idx="2">
-            <a:schemeClr val="accent1">
-              <a:shade val="50000"/>
-            </a:schemeClr>
-          </a:lnRef>
-          <a:fillRef idx="1">
-            <a:schemeClr val="accent1"/>
-          </a:fillRef>
-          <a:effectRef idx="0">
-            <a:schemeClr val="accent1"/>
-          </a:effectRef>
-          <a:fontRef idx="minor">
-            <a:schemeClr val="lt1"/>
-          </a:fontRef>
-        </p:style>
-        <p:txBody>
-          <a:bodyPr rtlCol="0" anchor="t"/>
-          <a:lstStyle/>
-          <a:p>
-            <a:r>
-              <a:rPr lang="sv-SE" sz="1100" dirty="0" smtClean="0">
-                <a:solidFill>
-                  <a:srgbClr val="000000"/>
-                </a:solidFill>
-                <a:latin typeface="Consolas" panose="020B0609020204030204" pitchFamily="49" charset="0"/>
-              </a:rPr>
-              <a:t>Clear </a:t>
-            </a:r>
-            <a:r>
-              <a:rPr lang="sv-SE" sz="1100" dirty="0" err="1" smtClean="0">
-                <a:solidFill>
-                  <a:srgbClr val="000000"/>
-                </a:solidFill>
-                <a:latin typeface="Consolas" panose="020B0609020204030204" pitchFamily="49" charset="0"/>
-              </a:rPr>
-              <a:t>sdLines</a:t>
-            </a:r>
-            <a:endParaRPr lang="sv-SE" sz="1100" dirty="0" smtClean="0">
-              <a:solidFill>
-                <a:srgbClr val="000000"/>
-              </a:solidFill>
-              <a:latin typeface="Consolas" panose="020B0609020204030204" pitchFamily="49" charset="0"/>
-            </a:endParaRPr>
-          </a:p>
-          <a:p>
-            <a:endParaRPr lang="en-US" sz="1100" dirty="0">
-              <a:solidFill>
-                <a:schemeClr val="tx1"/>
-              </a:solidFill>
-            </a:endParaRPr>
-          </a:p>
-        </p:txBody>
-      </p:sp>
-      <p:sp>
-        <p:nvSpPr>
           <p:cNvPr id="6" name="Flödesschema: Intern lagring 5"/>
           <p:cNvSpPr/>
           <p:nvPr/>
         </p:nvSpPr>
         <p:spPr>
           <a:xfrm>
-            <a:off x="400751" y="5939803"/>
+            <a:off x="400751" y="7598787"/>
             <a:ext cx="928174" cy="612648"/>
           </a:xfrm>
           <a:prstGeom prst="flowChartInternalStorage">
@@ -5118,66 +5181,13 @@
       </p:sp>
       <p:sp>
         <p:nvSpPr>
-          <p:cNvPr id="7" name="Flödesschema: Process 6"/>
-          <p:cNvSpPr/>
-          <p:nvPr/>
-        </p:nvSpPr>
-        <p:spPr>
-          <a:xfrm>
-            <a:off x="104843" y="4469583"/>
-            <a:ext cx="1408671" cy="468264"/>
-          </a:xfrm>
-          <a:prstGeom prst="flowChartProcess">
-            <a:avLst/>
-          </a:prstGeom>
-          <a:noFill/>
-        </p:spPr>
-        <p:style>
-          <a:lnRef idx="2">
-            <a:schemeClr val="accent1">
-              <a:shade val="50000"/>
-            </a:schemeClr>
-          </a:lnRef>
-          <a:fillRef idx="1">
-            <a:schemeClr val="accent1"/>
-          </a:fillRef>
-          <a:effectRef idx="0">
-            <a:schemeClr val="accent1"/>
-          </a:effectRef>
-          <a:fontRef idx="minor">
-            <a:schemeClr val="lt1"/>
-          </a:fontRef>
-        </p:style>
-        <p:txBody>
-          <a:bodyPr rtlCol="0" anchor="ctr"/>
-          <a:lstStyle/>
-          <a:p>
-            <a:pPr algn="ctr"/>
-            <a:r>
-              <a:rPr lang="sv-SE" sz="1100" dirty="0" smtClean="0">
-                <a:solidFill>
-                  <a:schemeClr val="tx1"/>
-                </a:solidFill>
-              </a:rPr>
-              <a:t>process</a:t>
-            </a:r>
-            <a:endParaRPr lang="sv-SE" sz="1100" dirty="0">
-              <a:solidFill>
-                <a:schemeClr val="tx1"/>
-              </a:solidFill>
-            </a:endParaRPr>
-          </a:p>
-        </p:txBody>
-      </p:sp>
-      <p:sp>
-        <p:nvSpPr>
           <p:cNvPr id="10" name="Flödesschema: Beslut 9"/>
           <p:cNvSpPr/>
           <p:nvPr/>
         </p:nvSpPr>
         <p:spPr>
           <a:xfrm>
-            <a:off x="213078" y="7502745"/>
+            <a:off x="99868" y="9597838"/>
             <a:ext cx="1716144" cy="598841"/>
           </a:xfrm>
           <a:prstGeom prst="flowChartDecision">
@@ -5222,114 +5232,6 @@
           </a:p>
         </p:txBody>
       </p:sp>
-      <p:cxnSp>
-        <p:nvCxnSpPr>
-          <p:cNvPr id="14" name="Rak pilkoppling 13"/>
-          <p:cNvCxnSpPr>
-            <a:stCxn id="5" idx="2"/>
-            <a:endCxn id="12" idx="0"/>
-          </p:cNvCxnSpPr>
-          <p:nvPr/>
-        </p:nvCxnSpPr>
-        <p:spPr>
-          <a:xfrm>
-            <a:off x="2907898" y="1479590"/>
-            <a:ext cx="1" cy="453515"/>
-          </a:xfrm>
-          <a:prstGeom prst="straightConnector1">
-            <a:avLst/>
-          </a:prstGeom>
-          <a:ln>
-            <a:tailEnd type="triangle"/>
-          </a:ln>
-        </p:spPr>
-        <p:style>
-          <a:lnRef idx="1">
-            <a:schemeClr val="accent1"/>
-          </a:lnRef>
-          <a:fillRef idx="0">
-            <a:schemeClr val="accent1"/>
-          </a:fillRef>
-          <a:effectRef idx="0">
-            <a:schemeClr val="accent1"/>
-          </a:effectRef>
-          <a:fontRef idx="minor">
-            <a:schemeClr val="tx1"/>
-          </a:fontRef>
-        </p:style>
-      </p:cxnSp>
-      <p:cxnSp>
-        <p:nvCxnSpPr>
-          <p:cNvPr id="17" name="Rak pilkoppling 16"/>
-          <p:cNvCxnSpPr>
-            <a:stCxn id="18" idx="3"/>
-            <a:endCxn id="32" idx="1"/>
-          </p:cNvCxnSpPr>
-          <p:nvPr/>
-        </p:nvCxnSpPr>
-        <p:spPr>
-          <a:xfrm flipV="1">
-            <a:off x="3552379" y="2339510"/>
-            <a:ext cx="525143" cy="15020"/>
-          </a:xfrm>
-          <a:prstGeom prst="straightConnector1">
-            <a:avLst/>
-          </a:prstGeom>
-          <a:ln>
-            <a:tailEnd type="triangle"/>
-          </a:ln>
-        </p:spPr>
-        <p:style>
-          <a:lnRef idx="1">
-            <a:schemeClr val="accent1"/>
-          </a:lnRef>
-          <a:fillRef idx="0">
-            <a:schemeClr val="accent1"/>
-          </a:fillRef>
-          <a:effectRef idx="0">
-            <a:schemeClr val="accent1"/>
-          </a:effectRef>
-          <a:fontRef idx="minor">
-            <a:schemeClr val="tx1"/>
-          </a:fontRef>
-        </p:style>
-      </p:cxnSp>
-      <p:cxnSp>
-        <p:nvCxnSpPr>
-          <p:cNvPr id="20" name="Rak pilkoppling 19"/>
-          <p:cNvCxnSpPr>
-            <a:stCxn id="12" idx="2"/>
-            <a:endCxn id="46" idx="0"/>
-          </p:cNvCxnSpPr>
-          <p:nvPr/>
-        </p:nvCxnSpPr>
-        <p:spPr>
-          <a:xfrm>
-            <a:off x="2907899" y="2676244"/>
-            <a:ext cx="0" cy="553227"/>
-          </a:xfrm>
-          <a:prstGeom prst="straightConnector1">
-            <a:avLst/>
-          </a:prstGeom>
-          <a:ln>
-            <a:tailEnd type="triangle"/>
-          </a:ln>
-        </p:spPr>
-        <p:style>
-          <a:lnRef idx="1">
-            <a:schemeClr val="accent1"/>
-          </a:lnRef>
-          <a:fillRef idx="0">
-            <a:schemeClr val="accent1"/>
-          </a:fillRef>
-          <a:effectRef idx="0">
-            <a:schemeClr val="accent1"/>
-          </a:effectRef>
-          <a:fontRef idx="minor">
-            <a:schemeClr val="tx1"/>
-          </a:fontRef>
-        </p:style>
-      </p:cxnSp>
       <p:sp>
         <p:nvSpPr>
           <p:cNvPr id="39" name="Flödesschema: Process 38"/>
@@ -5338,8 +5240,8 @@
         </p:nvSpPr>
         <p:spPr>
           <a:xfrm>
-            <a:off x="2203563" y="196789"/>
-            <a:ext cx="1692762" cy="287589"/>
+            <a:off x="1579657" y="247706"/>
+            <a:ext cx="1972721" cy="252472"/>
           </a:xfrm>
           <a:prstGeom prst="flowChartProcess">
             <a:avLst/>
@@ -5370,7 +5272,7 @@
           <a:lstStyle/>
           <a:p>
             <a:r>
-              <a:rPr lang="sv-SE" sz="1100" b="1" u="sng" dirty="0" err="1" smtClean="0">
+              <a:rPr lang="sv-SE" b="1" u="sng" dirty="0" err="1" smtClean="0">
                 <a:solidFill>
                   <a:srgbClr val="000000"/>
                 </a:solidFill>
@@ -5378,7 +5280,7 @@
               </a:rPr>
               <a:t>createSdLines</a:t>
             </a:r>
-            <a:endParaRPr lang="sv-SE" sz="1100" b="1" u="sng" dirty="0" smtClean="0">
+            <a:endParaRPr lang="sv-SE" b="1" u="sng" dirty="0" smtClean="0">
               <a:solidFill>
                 <a:srgbClr val="000000"/>
               </a:solidFill>
@@ -5387,119 +5289,30 @@
           </a:p>
         </p:txBody>
       </p:sp>
-      <p:sp>
-        <p:nvSpPr>
-          <p:cNvPr id="40" name="Flödesschema: Begränsare 39"/>
-          <p:cNvSpPr/>
-          <p:nvPr/>
-        </p:nvSpPr>
-        <p:spPr>
-          <a:xfrm>
-            <a:off x="2543376" y="615662"/>
-            <a:ext cx="729044" cy="250586"/>
-          </a:xfrm>
-          <a:prstGeom prst="flowChartTerminator">
-            <a:avLst/>
-          </a:prstGeom>
-          <a:noFill/>
-        </p:spPr>
-        <p:style>
-          <a:lnRef idx="2">
-            <a:schemeClr val="accent1">
-              <a:shade val="50000"/>
-            </a:schemeClr>
-          </a:lnRef>
-          <a:fillRef idx="1">
-            <a:schemeClr val="accent1"/>
-          </a:fillRef>
-          <a:effectRef idx="0">
-            <a:schemeClr val="accent1"/>
-          </a:effectRef>
-          <a:fontRef idx="minor">
-            <a:schemeClr val="lt1"/>
-          </a:fontRef>
-        </p:style>
-        <p:txBody>
-          <a:bodyPr rtlCol="0" anchor="ctr"/>
-          <a:lstStyle/>
-          <a:p>
-            <a:pPr algn="ctr"/>
-            <a:r>
-              <a:rPr lang="sv-SE" sz="1200" dirty="0" smtClean="0">
-                <a:solidFill>
-                  <a:schemeClr val="tx1"/>
-                </a:solidFill>
-              </a:rPr>
-              <a:t>Start</a:t>
-            </a:r>
-            <a:endParaRPr lang="sv-SE" sz="1200" dirty="0">
-              <a:solidFill>
-                <a:schemeClr val="tx1"/>
-              </a:solidFill>
-            </a:endParaRPr>
-          </a:p>
-        </p:txBody>
-      </p:sp>
-      <p:cxnSp>
-        <p:nvCxnSpPr>
-          <p:cNvPr id="42" name="Rak pilkoppling 41"/>
-          <p:cNvCxnSpPr>
-            <a:stCxn id="40" idx="2"/>
-            <a:endCxn id="5" idx="0"/>
-          </p:cNvCxnSpPr>
-          <p:nvPr/>
-        </p:nvCxnSpPr>
-        <p:spPr>
-          <a:xfrm>
-            <a:off x="2907898" y="866248"/>
-            <a:ext cx="0" cy="299420"/>
-          </a:xfrm>
-          <a:prstGeom prst="straightConnector1">
-            <a:avLst/>
-          </a:prstGeom>
-          <a:ln>
-            <a:tailEnd type="triangle"/>
-          </a:ln>
-        </p:spPr>
-        <p:style>
-          <a:lnRef idx="1">
-            <a:schemeClr val="accent1"/>
-          </a:lnRef>
-          <a:fillRef idx="0">
-            <a:schemeClr val="accent1"/>
-          </a:fillRef>
-          <a:effectRef idx="0">
-            <a:schemeClr val="accent1"/>
-          </a:effectRef>
-          <a:fontRef idx="minor">
-            <a:schemeClr val="tx1"/>
-          </a:fontRef>
-        </p:style>
-      </p:cxnSp>
       <p:grpSp>
         <p:nvGrpSpPr>
-          <p:cNvPr id="44" name="Grupp 43"/>
+          <p:cNvPr id="8" name="Grupp 7"/>
           <p:cNvGrpSpPr/>
           <p:nvPr/>
         </p:nvGrpSpPr>
         <p:grpSpPr>
           <a:xfrm>
-            <a:off x="2203563" y="1933105"/>
-            <a:ext cx="1408671" cy="743139"/>
-            <a:chOff x="2090980" y="1933105"/>
-            <a:chExt cx="1408671" cy="743139"/>
+            <a:off x="339632" y="906338"/>
+            <a:ext cx="5022832" cy="4053489"/>
+            <a:chOff x="104843" y="2108121"/>
+            <a:chExt cx="5022832" cy="4053489"/>
           </a:xfrm>
         </p:grpSpPr>
         <p:sp>
           <p:nvSpPr>
-            <p:cNvPr id="12" name="Flödesschema: Process 11"/>
+            <p:cNvPr id="5" name="Flödesschema: Process 4"/>
             <p:cNvSpPr/>
             <p:nvPr/>
           </p:nvSpPr>
           <p:spPr>
             <a:xfrm>
-              <a:off x="2090980" y="1933105"/>
-              <a:ext cx="1408671" cy="743139"/>
+              <a:off x="2061517" y="2824652"/>
+              <a:ext cx="1692762" cy="313922"/>
             </a:xfrm>
             <a:prstGeom prst="flowChartProcess">
               <a:avLst/>
@@ -5526,40 +5339,33 @@
             <a:bodyPr rtlCol="0" anchor="t"/>
             <a:lstStyle/>
             <a:p>
-              <a:pPr algn="ctr"/>
               <a:r>
                 <a:rPr lang="sv-SE" sz="1100" dirty="0" smtClean="0">
                   <a:solidFill>
-                    <a:schemeClr val="tx1"/>
+                    <a:srgbClr val="000000"/>
                   </a:solidFill>
+                  <a:latin typeface="Consolas" panose="020B0609020204030204" pitchFamily="49" charset="0"/>
                 </a:rPr>
-                <a:t>For </a:t>
+                <a:t>Clear </a:t>
               </a:r>
               <a:r>
                 <a:rPr lang="sv-SE" sz="1100" dirty="0" err="1" smtClean="0">
                   <a:solidFill>
-                    <a:schemeClr val="tx1"/>
+                    <a:srgbClr val="000000"/>
                   </a:solidFill>
+                  <a:latin typeface="Consolas" panose="020B0609020204030204" pitchFamily="49" charset="0"/>
                 </a:rPr>
-                <a:t>each</a:t>
+                <a:t>sdLines</a:t>
               </a:r>
-              <a:r>
-                <a:rPr lang="sv-SE" sz="1100" dirty="0" smtClean="0">
-                  <a:solidFill>
-                    <a:schemeClr val="tx1"/>
-                  </a:solidFill>
-                </a:rPr>
-                <a:t> input </a:t>
-              </a:r>
-              <a:r>
-                <a:rPr lang="sv-SE" sz="1100" dirty="0" err="1" smtClean="0">
-                  <a:solidFill>
-                    <a:schemeClr val="tx1"/>
-                  </a:solidFill>
-                </a:rPr>
-                <a:t>line</a:t>
-              </a:r>
-              <a:endParaRPr lang="sv-SE" sz="1100" dirty="0">
+              <a:endParaRPr lang="sv-SE" sz="1100" dirty="0" smtClean="0">
+                <a:solidFill>
+                  <a:srgbClr val="000000"/>
+                </a:solidFill>
+                <a:latin typeface="Consolas" panose="020B0609020204030204" pitchFamily="49" charset="0"/>
+              </a:endParaRPr>
+            </a:p>
+            <a:p>
+              <a:endParaRPr lang="en-US" sz="1100" dirty="0">
                 <a:solidFill>
                   <a:schemeClr val="tx1"/>
                 </a:solidFill>
@@ -5569,264 +5375,14 @@
         </p:sp>
         <p:sp>
           <p:nvSpPr>
-            <p:cNvPr id="18" name="textruta 17"/>
-            <p:cNvSpPr txBox="1"/>
-            <p:nvPr/>
-          </p:nvSpPr>
-          <p:spPr>
-            <a:xfrm>
-              <a:off x="2192339" y="2223725"/>
-              <a:ext cx="1247457" cy="261610"/>
-            </a:xfrm>
-            <a:prstGeom prst="rect">
-              <a:avLst/>
-            </a:prstGeom>
-            <a:noFill/>
-            <a:ln>
-              <a:solidFill>
-                <a:schemeClr val="accent1"/>
-              </a:solidFill>
-            </a:ln>
-          </p:spPr>
-          <p:txBody>
-            <a:bodyPr wrap="none" rtlCol="0">
-              <a:spAutoFit/>
-            </a:bodyPr>
-            <a:lstStyle/>
-            <a:p>
-              <a:r>
-                <a:rPr lang="sv-SE" sz="1100" dirty="0" err="1"/>
-                <a:t>createTempSdLine</a:t>
-              </a:r>
-              <a:endParaRPr lang="sv-SE" sz="1100" dirty="0"/>
-            </a:p>
-          </p:txBody>
-        </p:sp>
-      </p:grpSp>
-      <p:sp>
-        <p:nvSpPr>
-          <p:cNvPr id="28" name="Flödesschema: Intern lagring 27"/>
-          <p:cNvSpPr/>
-          <p:nvPr/>
-        </p:nvSpPr>
-        <p:spPr>
-          <a:xfrm>
-            <a:off x="602330" y="2071772"/>
-            <a:ext cx="1079711" cy="570313"/>
-          </a:xfrm>
-          <a:prstGeom prst="flowChartInternalStorage">
-            <a:avLst/>
-          </a:prstGeom>
-          <a:noFill/>
-          <a:ln w="6350">
-            <a:solidFill>
-              <a:schemeClr val="tx1"/>
-            </a:solidFill>
-          </a:ln>
-        </p:spPr>
-        <p:style>
-          <a:lnRef idx="2">
-            <a:schemeClr val="accent1">
-              <a:shade val="50000"/>
-            </a:schemeClr>
-          </a:lnRef>
-          <a:fillRef idx="1">
-            <a:schemeClr val="accent1"/>
-          </a:fillRef>
-          <a:effectRef idx="0">
-            <a:schemeClr val="accent1"/>
-          </a:effectRef>
-          <a:fontRef idx="minor">
-            <a:schemeClr val="lt1"/>
-          </a:fontRef>
-        </p:style>
-        <p:txBody>
-          <a:bodyPr rtlCol="0" anchor="t"/>
-          <a:lstStyle/>
-          <a:p>
-            <a:pPr algn="ctr"/>
-            <a:r>
-              <a:rPr lang="sv-SE" sz="1100" dirty="0" err="1">
-                <a:solidFill>
-                  <a:schemeClr val="tx1"/>
-                </a:solidFill>
-              </a:rPr>
-              <a:t>l</a:t>
-            </a:r>
-            <a:r>
-              <a:rPr lang="sv-SE" sz="1100" dirty="0" err="1" smtClean="0">
-                <a:solidFill>
-                  <a:schemeClr val="tx1"/>
-                </a:solidFill>
-              </a:rPr>
-              <a:t>ines</a:t>
-            </a:r>
-            <a:endParaRPr lang="sv-SE" sz="1100" dirty="0" smtClean="0">
-              <a:solidFill>
-                <a:schemeClr val="tx1"/>
-              </a:solidFill>
-            </a:endParaRPr>
-          </a:p>
-          <a:p>
-            <a:pPr algn="ctr"/>
-            <a:r>
-              <a:rPr lang="sv-SE" sz="1100" dirty="0" smtClean="0">
-                <a:solidFill>
-                  <a:schemeClr val="tx1"/>
-                </a:solidFill>
-              </a:rPr>
-              <a:t>(from Sd </a:t>
-            </a:r>
-            <a:r>
-              <a:rPr lang="sv-SE" sz="1100" dirty="0" err="1" smtClean="0">
-                <a:solidFill>
-                  <a:schemeClr val="tx1"/>
-                </a:solidFill>
-              </a:rPr>
-              <a:t>file</a:t>
-            </a:r>
-            <a:r>
-              <a:rPr lang="sv-SE" sz="1100" dirty="0" smtClean="0">
-                <a:solidFill>
-                  <a:schemeClr val="tx1"/>
-                </a:solidFill>
-              </a:rPr>
-              <a:t>)</a:t>
-            </a:r>
-            <a:endParaRPr lang="sv-SE" sz="1100" dirty="0">
-              <a:solidFill>
-                <a:schemeClr val="tx1"/>
-              </a:solidFill>
-            </a:endParaRPr>
-          </a:p>
-        </p:txBody>
-      </p:sp>
-      <p:cxnSp>
-        <p:nvCxnSpPr>
-          <p:cNvPr id="22" name="Rak pilkoppling 21"/>
-          <p:cNvCxnSpPr>
-            <a:stCxn id="28" idx="3"/>
-            <a:endCxn id="18" idx="1"/>
-          </p:cNvCxnSpPr>
-          <p:nvPr/>
-        </p:nvCxnSpPr>
-        <p:spPr>
-          <a:xfrm flipV="1">
-            <a:off x="1682041" y="2354530"/>
-            <a:ext cx="622881" cy="2399"/>
-          </a:xfrm>
-          <a:prstGeom prst="straightConnector1">
-            <a:avLst/>
-          </a:prstGeom>
-          <a:ln>
-            <a:tailEnd type="triangle"/>
-          </a:ln>
-        </p:spPr>
-        <p:style>
-          <a:lnRef idx="1">
-            <a:schemeClr val="accent1"/>
-          </a:lnRef>
-          <a:fillRef idx="0">
-            <a:schemeClr val="accent1"/>
-          </a:fillRef>
-          <a:effectRef idx="0">
-            <a:schemeClr val="accent1"/>
-          </a:effectRef>
-          <a:fontRef idx="minor">
-            <a:schemeClr val="tx1"/>
-          </a:fontRef>
-        </p:style>
-      </p:cxnSp>
-      <p:sp>
-        <p:nvSpPr>
-          <p:cNvPr id="32" name="Flödesschema: Intern lagring 31"/>
-          <p:cNvSpPr/>
-          <p:nvPr/>
-        </p:nvSpPr>
-        <p:spPr>
-          <a:xfrm>
-            <a:off x="4077522" y="2033186"/>
-            <a:ext cx="1050153" cy="612648"/>
-          </a:xfrm>
-          <a:prstGeom prst="flowChartInternalStorage">
-            <a:avLst/>
-          </a:prstGeom>
-          <a:noFill/>
-          <a:ln w="6350">
-            <a:solidFill>
-              <a:schemeClr val="tx1"/>
-            </a:solidFill>
-          </a:ln>
-        </p:spPr>
-        <p:style>
-          <a:lnRef idx="2">
-            <a:schemeClr val="accent1">
-              <a:shade val="50000"/>
-            </a:schemeClr>
-          </a:lnRef>
-          <a:fillRef idx="1">
-            <a:schemeClr val="accent1"/>
-          </a:fillRef>
-          <a:effectRef idx="0">
-            <a:schemeClr val="accent1"/>
-          </a:effectRef>
-          <a:fontRef idx="minor">
-            <a:schemeClr val="lt1"/>
-          </a:fontRef>
-        </p:style>
-        <p:txBody>
-          <a:bodyPr rtlCol="0" anchor="ctr"/>
-          <a:lstStyle/>
-          <a:p>
-            <a:pPr algn="ctr"/>
-            <a:r>
-              <a:rPr lang="sv-SE" sz="1100" dirty="0" err="1" smtClean="0">
-                <a:solidFill>
-                  <a:schemeClr val="tx1"/>
-                </a:solidFill>
-              </a:rPr>
-              <a:t>sdLinesTmp</a:t>
-            </a:r>
-            <a:r>
-              <a:rPr lang="sv-SE" sz="1100" dirty="0" smtClean="0">
-                <a:solidFill>
-                  <a:schemeClr val="tx1"/>
-                </a:solidFill>
-              </a:rPr>
-              <a:t> </a:t>
-            </a:r>
-            <a:endParaRPr lang="sv-SE" sz="1100" dirty="0">
-              <a:solidFill>
-                <a:schemeClr val="tx1"/>
-              </a:solidFill>
-            </a:endParaRPr>
-          </a:p>
-        </p:txBody>
-      </p:sp>
-      <p:grpSp>
-        <p:nvGrpSpPr>
-          <p:cNvPr id="45" name="Grupp 44"/>
-          <p:cNvGrpSpPr/>
-          <p:nvPr/>
-        </p:nvGrpSpPr>
-        <p:grpSpPr>
-          <a:xfrm>
-            <a:off x="2014981" y="3229471"/>
-            <a:ext cx="1785835" cy="743139"/>
-            <a:chOff x="2090980" y="1933105"/>
-            <a:chExt cx="1408671" cy="743139"/>
-          </a:xfrm>
-        </p:grpSpPr>
-        <p:sp>
-          <p:nvSpPr>
-            <p:cNvPr id="46" name="Flödesschema: Process 45"/>
+            <p:cNvPr id="7" name="Flödesschema: Process 6"/>
             <p:cNvSpPr/>
             <p:nvPr/>
           </p:nvSpPr>
           <p:spPr>
             <a:xfrm>
-              <a:off x="2090980" y="1933105"/>
-              <a:ext cx="1408671" cy="743139"/>
+              <a:off x="104843" y="4469583"/>
+              <a:ext cx="1408671" cy="468264"/>
             </a:xfrm>
             <a:prstGeom prst="flowChartProcess">
               <a:avLst/>
@@ -5850,7 +5406,7 @@
             </a:fontRef>
           </p:style>
           <p:txBody>
-            <a:bodyPr rtlCol="0" anchor="t"/>
+            <a:bodyPr rtlCol="0" anchor="ctr"/>
             <a:lstStyle/>
             <a:p>
               <a:pPr algn="ctr"/>
@@ -5860,7 +5416,389 @@
                     <a:schemeClr val="tx1"/>
                   </a:solidFill>
                 </a:rPr>
-                <a:t>For </a:t>
+                <a:t>process</a:t>
+              </a:r>
+              <a:endParaRPr lang="sv-SE" sz="1100" dirty="0">
+                <a:solidFill>
+                  <a:schemeClr val="tx1"/>
+                </a:solidFill>
+              </a:endParaRPr>
+            </a:p>
+          </p:txBody>
+        </p:sp>
+        <p:cxnSp>
+          <p:nvCxnSpPr>
+            <p:cNvPr id="14" name="Rak pilkoppling 13"/>
+            <p:cNvCxnSpPr>
+              <a:stCxn id="5" idx="2"/>
+              <a:endCxn id="12" idx="0"/>
+            </p:cNvCxnSpPr>
+            <p:nvPr/>
+          </p:nvCxnSpPr>
+          <p:spPr>
+            <a:xfrm>
+              <a:off x="2907898" y="3138574"/>
+              <a:ext cx="1" cy="453515"/>
+            </a:xfrm>
+            <a:prstGeom prst="straightConnector1">
+              <a:avLst/>
+            </a:prstGeom>
+            <a:ln>
+              <a:tailEnd type="triangle"/>
+            </a:ln>
+          </p:spPr>
+          <p:style>
+            <a:lnRef idx="1">
+              <a:schemeClr val="accent1"/>
+            </a:lnRef>
+            <a:fillRef idx="0">
+              <a:schemeClr val="accent1"/>
+            </a:fillRef>
+            <a:effectRef idx="0">
+              <a:schemeClr val="accent1"/>
+            </a:effectRef>
+            <a:fontRef idx="minor">
+              <a:schemeClr val="tx1"/>
+            </a:fontRef>
+          </p:style>
+        </p:cxnSp>
+        <p:cxnSp>
+          <p:nvCxnSpPr>
+            <p:cNvPr id="17" name="Rak pilkoppling 16"/>
+            <p:cNvCxnSpPr>
+              <a:stCxn id="18" idx="3"/>
+              <a:endCxn id="32" idx="1"/>
+            </p:cNvCxnSpPr>
+            <p:nvPr/>
+          </p:nvCxnSpPr>
+          <p:spPr>
+            <a:xfrm flipV="1">
+              <a:off x="3552379" y="3998494"/>
+              <a:ext cx="525143" cy="15020"/>
+            </a:xfrm>
+            <a:prstGeom prst="straightConnector1">
+              <a:avLst/>
+            </a:prstGeom>
+            <a:ln>
+              <a:tailEnd type="triangle"/>
+            </a:ln>
+          </p:spPr>
+          <p:style>
+            <a:lnRef idx="1">
+              <a:schemeClr val="accent1"/>
+            </a:lnRef>
+            <a:fillRef idx="0">
+              <a:schemeClr val="accent1"/>
+            </a:fillRef>
+            <a:effectRef idx="0">
+              <a:schemeClr val="accent1"/>
+            </a:effectRef>
+            <a:fontRef idx="minor">
+              <a:schemeClr val="tx1"/>
+            </a:fontRef>
+          </p:style>
+        </p:cxnSp>
+        <p:cxnSp>
+          <p:nvCxnSpPr>
+            <p:cNvPr id="20" name="Rak pilkoppling 19"/>
+            <p:cNvCxnSpPr>
+              <a:stCxn id="12" idx="2"/>
+              <a:endCxn id="46" idx="0"/>
+            </p:cNvCxnSpPr>
+            <p:nvPr/>
+          </p:nvCxnSpPr>
+          <p:spPr>
+            <a:xfrm>
+              <a:off x="2907899" y="4335228"/>
+              <a:ext cx="0" cy="553227"/>
+            </a:xfrm>
+            <a:prstGeom prst="straightConnector1">
+              <a:avLst/>
+            </a:prstGeom>
+            <a:ln>
+              <a:tailEnd type="triangle"/>
+            </a:ln>
+          </p:spPr>
+          <p:style>
+            <a:lnRef idx="1">
+              <a:schemeClr val="accent1"/>
+            </a:lnRef>
+            <a:fillRef idx="0">
+              <a:schemeClr val="accent1"/>
+            </a:fillRef>
+            <a:effectRef idx="0">
+              <a:schemeClr val="accent1"/>
+            </a:effectRef>
+            <a:fontRef idx="minor">
+              <a:schemeClr val="tx1"/>
+            </a:fontRef>
+          </p:style>
+        </p:cxnSp>
+        <p:sp>
+          <p:nvSpPr>
+            <p:cNvPr id="40" name="Flödesschema: Begränsare 39"/>
+            <p:cNvSpPr/>
+            <p:nvPr/>
+          </p:nvSpPr>
+          <p:spPr>
+            <a:xfrm>
+              <a:off x="2543376" y="2108121"/>
+              <a:ext cx="729044" cy="250586"/>
+            </a:xfrm>
+            <a:prstGeom prst="flowChartTerminator">
+              <a:avLst/>
+            </a:prstGeom>
+            <a:noFill/>
+          </p:spPr>
+          <p:style>
+            <a:lnRef idx="2">
+              <a:schemeClr val="accent1">
+                <a:shade val="50000"/>
+              </a:schemeClr>
+            </a:lnRef>
+            <a:fillRef idx="1">
+              <a:schemeClr val="accent1"/>
+            </a:fillRef>
+            <a:effectRef idx="0">
+              <a:schemeClr val="accent1"/>
+            </a:effectRef>
+            <a:fontRef idx="minor">
+              <a:schemeClr val="lt1"/>
+            </a:fontRef>
+          </p:style>
+          <p:txBody>
+            <a:bodyPr rtlCol="0" anchor="ctr"/>
+            <a:lstStyle/>
+            <a:p>
+              <a:pPr algn="ctr"/>
+              <a:r>
+                <a:rPr lang="sv-SE" sz="1200" dirty="0" smtClean="0">
+                  <a:solidFill>
+                    <a:schemeClr val="tx1"/>
+                  </a:solidFill>
+                </a:rPr>
+                <a:t>Start</a:t>
+              </a:r>
+              <a:endParaRPr lang="sv-SE" sz="1200" dirty="0">
+                <a:solidFill>
+                  <a:schemeClr val="tx1"/>
+                </a:solidFill>
+              </a:endParaRPr>
+            </a:p>
+          </p:txBody>
+        </p:sp>
+        <p:cxnSp>
+          <p:nvCxnSpPr>
+            <p:cNvPr id="42" name="Rak pilkoppling 41"/>
+            <p:cNvCxnSpPr>
+              <a:stCxn id="40" idx="2"/>
+              <a:endCxn id="5" idx="0"/>
+            </p:cNvCxnSpPr>
+            <p:nvPr/>
+          </p:nvCxnSpPr>
+          <p:spPr>
+            <a:xfrm>
+              <a:off x="2907898" y="2358707"/>
+              <a:ext cx="0" cy="465945"/>
+            </a:xfrm>
+            <a:prstGeom prst="straightConnector1">
+              <a:avLst/>
+            </a:prstGeom>
+            <a:ln>
+              <a:tailEnd type="triangle"/>
+            </a:ln>
+          </p:spPr>
+          <p:style>
+            <a:lnRef idx="1">
+              <a:schemeClr val="accent1"/>
+            </a:lnRef>
+            <a:fillRef idx="0">
+              <a:schemeClr val="accent1"/>
+            </a:fillRef>
+            <a:effectRef idx="0">
+              <a:schemeClr val="accent1"/>
+            </a:effectRef>
+            <a:fontRef idx="minor">
+              <a:schemeClr val="tx1"/>
+            </a:fontRef>
+          </p:style>
+        </p:cxnSp>
+        <p:grpSp>
+          <p:nvGrpSpPr>
+            <p:cNvPr id="44" name="Grupp 43"/>
+            <p:cNvGrpSpPr/>
+            <p:nvPr/>
+          </p:nvGrpSpPr>
+          <p:grpSpPr>
+            <a:xfrm>
+              <a:off x="2203563" y="3592089"/>
+              <a:ext cx="1408671" cy="743139"/>
+              <a:chOff x="2090980" y="1933105"/>
+              <a:chExt cx="1408671" cy="743139"/>
+            </a:xfrm>
+          </p:grpSpPr>
+          <p:sp>
+            <p:nvSpPr>
+              <p:cNvPr id="12" name="Flödesschema: Process 11"/>
+              <p:cNvSpPr/>
+              <p:nvPr/>
+            </p:nvSpPr>
+            <p:spPr>
+              <a:xfrm>
+                <a:off x="2090980" y="1933105"/>
+                <a:ext cx="1408671" cy="743139"/>
+              </a:xfrm>
+              <a:prstGeom prst="flowChartProcess">
+                <a:avLst/>
+              </a:prstGeom>
+              <a:noFill/>
+            </p:spPr>
+            <p:style>
+              <a:lnRef idx="2">
+                <a:schemeClr val="accent1">
+                  <a:shade val="50000"/>
+                </a:schemeClr>
+              </a:lnRef>
+              <a:fillRef idx="1">
+                <a:schemeClr val="accent1"/>
+              </a:fillRef>
+              <a:effectRef idx="0">
+                <a:schemeClr val="accent1"/>
+              </a:effectRef>
+              <a:fontRef idx="minor">
+                <a:schemeClr val="lt1"/>
+              </a:fontRef>
+            </p:style>
+            <p:txBody>
+              <a:bodyPr rtlCol="0" anchor="t"/>
+              <a:lstStyle/>
+              <a:p>
+                <a:pPr algn="ctr"/>
+                <a:r>
+                  <a:rPr lang="sv-SE" sz="1100" dirty="0" smtClean="0">
+                    <a:solidFill>
+                      <a:schemeClr val="tx1"/>
+                    </a:solidFill>
+                  </a:rPr>
+                  <a:t>For </a:t>
+                </a:r>
+                <a:r>
+                  <a:rPr lang="sv-SE" sz="1100" dirty="0" err="1" smtClean="0">
+                    <a:solidFill>
+                      <a:schemeClr val="tx1"/>
+                    </a:solidFill>
+                  </a:rPr>
+                  <a:t>each</a:t>
+                </a:r>
+                <a:r>
+                  <a:rPr lang="sv-SE" sz="1100" dirty="0" smtClean="0">
+                    <a:solidFill>
+                      <a:schemeClr val="tx1"/>
+                    </a:solidFill>
+                  </a:rPr>
+                  <a:t> input </a:t>
+                </a:r>
+                <a:r>
+                  <a:rPr lang="sv-SE" sz="1100" dirty="0" err="1" smtClean="0">
+                    <a:solidFill>
+                      <a:schemeClr val="tx1"/>
+                    </a:solidFill>
+                  </a:rPr>
+                  <a:t>line</a:t>
+                </a:r>
+                <a:endParaRPr lang="sv-SE" sz="1100" dirty="0">
+                  <a:solidFill>
+                    <a:schemeClr val="tx1"/>
+                  </a:solidFill>
+                </a:endParaRPr>
+              </a:p>
+            </p:txBody>
+          </p:sp>
+          <p:sp>
+            <p:nvSpPr>
+              <p:cNvPr id="18" name="textruta 17"/>
+              <p:cNvSpPr txBox="1"/>
+              <p:nvPr/>
+            </p:nvSpPr>
+            <p:spPr>
+              <a:xfrm>
+                <a:off x="2192339" y="2223725"/>
+                <a:ext cx="1247457" cy="261610"/>
+              </a:xfrm>
+              <a:prstGeom prst="rect">
+                <a:avLst/>
+              </a:prstGeom>
+              <a:noFill/>
+              <a:ln>
+                <a:solidFill>
+                  <a:schemeClr val="accent1"/>
+                </a:solidFill>
+              </a:ln>
+            </p:spPr>
+            <p:txBody>
+              <a:bodyPr wrap="none" rtlCol="0">
+                <a:spAutoFit/>
+              </a:bodyPr>
+              <a:lstStyle/>
+              <a:p>
+                <a:r>
+                  <a:rPr lang="sv-SE" sz="1100" dirty="0" err="1"/>
+                  <a:t>createTempSdLine</a:t>
+                </a:r>
+                <a:endParaRPr lang="sv-SE" sz="1100" dirty="0"/>
+              </a:p>
+            </p:txBody>
+          </p:sp>
+        </p:grpSp>
+        <p:sp>
+          <p:nvSpPr>
+            <p:cNvPr id="28" name="Flödesschema: Intern lagring 27"/>
+            <p:cNvSpPr/>
+            <p:nvPr/>
+          </p:nvSpPr>
+          <p:spPr>
+            <a:xfrm>
+              <a:off x="602330" y="3730756"/>
+              <a:ext cx="1079711" cy="570313"/>
+            </a:xfrm>
+            <a:prstGeom prst="flowChartInternalStorage">
+              <a:avLst/>
+            </a:prstGeom>
+            <a:noFill/>
+            <a:ln w="6350">
+              <a:solidFill>
+                <a:schemeClr val="tx1"/>
+              </a:solidFill>
+            </a:ln>
+          </p:spPr>
+          <p:style>
+            <a:lnRef idx="2">
+              <a:schemeClr val="accent1">
+                <a:shade val="50000"/>
+              </a:schemeClr>
+            </a:lnRef>
+            <a:fillRef idx="1">
+              <a:schemeClr val="accent1"/>
+            </a:fillRef>
+            <a:effectRef idx="0">
+              <a:schemeClr val="accent1"/>
+            </a:effectRef>
+            <a:fontRef idx="minor">
+              <a:schemeClr val="lt1"/>
+            </a:fontRef>
+          </p:style>
+          <p:txBody>
+            <a:bodyPr rtlCol="0" anchor="t"/>
+            <a:lstStyle/>
+            <a:p>
+              <a:pPr algn="ctr"/>
+              <a:r>
+                <a:rPr lang="sv-SE" sz="1100" dirty="0" err="1">
+                  <a:solidFill>
+                    <a:schemeClr val="tx1"/>
+                  </a:solidFill>
+                </a:rPr>
+                <a:t>l</a:t>
               </a:r>
               <a:r>
                 <a:rPr lang="sv-SE" sz="1100" dirty="0" err="1" smtClean="0">
@@ -5868,23 +5806,370 @@
                     <a:schemeClr val="tx1"/>
                   </a:solidFill>
                 </a:rPr>
-                <a:t>each</a:t>
+                <a:t>ines</a:t>
+              </a:r>
+              <a:endParaRPr lang="sv-SE" sz="1100" dirty="0" smtClean="0">
+                <a:solidFill>
+                  <a:schemeClr val="tx1"/>
+                </a:solidFill>
+              </a:endParaRPr>
+            </a:p>
+            <a:p>
+              <a:pPr algn="ctr"/>
+              <a:r>
+                <a:rPr lang="sv-SE" sz="1100" dirty="0" smtClean="0">
+                  <a:solidFill>
+                    <a:schemeClr val="tx1"/>
+                  </a:solidFill>
+                </a:rPr>
+                <a:t>(from Sd </a:t>
               </a:r>
               <a:r>
-                <a:rPr lang="sv-SE" sz="1100" dirty="0">
+                <a:rPr lang="sv-SE" sz="1100" dirty="0" err="1" smtClean="0">
+                  <a:solidFill>
+                    <a:schemeClr val="tx1"/>
+                  </a:solidFill>
+                </a:rPr>
+                <a:t>file</a:t>
+              </a:r>
+              <a:r>
+                <a:rPr lang="sv-SE" sz="1100" dirty="0" smtClean="0">
+                  <a:solidFill>
+                    <a:schemeClr val="tx1"/>
+                  </a:solidFill>
+                </a:rPr>
+                <a:t>)</a:t>
+              </a:r>
+              <a:endParaRPr lang="sv-SE" sz="1100" dirty="0">
+                <a:solidFill>
+                  <a:schemeClr val="tx1"/>
+                </a:solidFill>
+              </a:endParaRPr>
+            </a:p>
+          </p:txBody>
+        </p:sp>
+        <p:cxnSp>
+          <p:nvCxnSpPr>
+            <p:cNvPr id="22" name="Rak pilkoppling 21"/>
+            <p:cNvCxnSpPr>
+              <a:stCxn id="28" idx="3"/>
+              <a:endCxn id="18" idx="1"/>
+            </p:cNvCxnSpPr>
+            <p:nvPr/>
+          </p:nvCxnSpPr>
+          <p:spPr>
+            <a:xfrm flipV="1">
+              <a:off x="1682041" y="4013514"/>
+              <a:ext cx="622881" cy="2399"/>
+            </a:xfrm>
+            <a:prstGeom prst="straightConnector1">
+              <a:avLst/>
+            </a:prstGeom>
+            <a:ln>
+              <a:tailEnd type="triangle"/>
+            </a:ln>
+          </p:spPr>
+          <p:style>
+            <a:lnRef idx="1">
+              <a:schemeClr val="accent1"/>
+            </a:lnRef>
+            <a:fillRef idx="0">
+              <a:schemeClr val="accent1"/>
+            </a:fillRef>
+            <a:effectRef idx="0">
+              <a:schemeClr val="accent1"/>
+            </a:effectRef>
+            <a:fontRef idx="minor">
+              <a:schemeClr val="tx1"/>
+            </a:fontRef>
+          </p:style>
+        </p:cxnSp>
+        <p:sp>
+          <p:nvSpPr>
+            <p:cNvPr id="32" name="Flödesschema: Intern lagring 31"/>
+            <p:cNvSpPr/>
+            <p:nvPr/>
+          </p:nvSpPr>
+          <p:spPr>
+            <a:xfrm>
+              <a:off x="4077522" y="3692170"/>
+              <a:ext cx="1050153" cy="612648"/>
+            </a:xfrm>
+            <a:prstGeom prst="flowChartInternalStorage">
+              <a:avLst/>
+            </a:prstGeom>
+            <a:noFill/>
+            <a:ln w="6350">
+              <a:solidFill>
+                <a:schemeClr val="tx1"/>
+              </a:solidFill>
+            </a:ln>
+          </p:spPr>
+          <p:style>
+            <a:lnRef idx="2">
+              <a:schemeClr val="accent1">
+                <a:shade val="50000"/>
+              </a:schemeClr>
+            </a:lnRef>
+            <a:fillRef idx="1">
+              <a:schemeClr val="accent1"/>
+            </a:fillRef>
+            <a:effectRef idx="0">
+              <a:schemeClr val="accent1"/>
+            </a:effectRef>
+            <a:fontRef idx="minor">
+              <a:schemeClr val="lt1"/>
+            </a:fontRef>
+          </p:style>
+          <p:txBody>
+            <a:bodyPr rtlCol="0" anchor="ctr"/>
+            <a:lstStyle/>
+            <a:p>
+              <a:pPr algn="ctr"/>
+              <a:r>
+                <a:rPr lang="sv-SE" sz="1100" dirty="0" err="1" smtClean="0">
+                  <a:solidFill>
+                    <a:schemeClr val="tx1"/>
+                  </a:solidFill>
+                </a:rPr>
+                <a:t>sdLinesTmp</a:t>
+              </a:r>
+              <a:r>
+                <a:rPr lang="sv-SE" sz="1100" dirty="0" smtClean="0">
                   <a:solidFill>
                     <a:schemeClr val="tx1"/>
                   </a:solidFill>
                 </a:rPr>
                 <a:t> </a:t>
               </a:r>
+              <a:endParaRPr lang="sv-SE" sz="1100" dirty="0">
+                <a:solidFill>
+                  <a:schemeClr val="tx1"/>
+                </a:solidFill>
+              </a:endParaRPr>
+            </a:p>
+          </p:txBody>
+        </p:sp>
+        <p:grpSp>
+          <p:nvGrpSpPr>
+            <p:cNvPr id="45" name="Grupp 44"/>
+            <p:cNvGrpSpPr/>
+            <p:nvPr/>
+          </p:nvGrpSpPr>
+          <p:grpSpPr>
+            <a:xfrm>
+              <a:off x="2014981" y="4888455"/>
+              <a:ext cx="1785835" cy="743139"/>
+              <a:chOff x="2090980" y="1933105"/>
+              <a:chExt cx="1408671" cy="743139"/>
+            </a:xfrm>
+          </p:grpSpPr>
+          <p:sp>
+            <p:nvSpPr>
+              <p:cNvPr id="46" name="Flödesschema: Process 45"/>
+              <p:cNvSpPr/>
+              <p:nvPr/>
+            </p:nvSpPr>
+            <p:spPr>
+              <a:xfrm>
+                <a:off x="2090980" y="1933105"/>
+                <a:ext cx="1408671" cy="743139"/>
+              </a:xfrm>
+              <a:prstGeom prst="flowChartProcess">
+                <a:avLst/>
+              </a:prstGeom>
+              <a:noFill/>
+            </p:spPr>
+            <p:style>
+              <a:lnRef idx="2">
+                <a:schemeClr val="accent1">
+                  <a:shade val="50000"/>
+                </a:schemeClr>
+              </a:lnRef>
+              <a:fillRef idx="1">
+                <a:schemeClr val="accent1"/>
+              </a:fillRef>
+              <a:effectRef idx="0">
+                <a:schemeClr val="accent1"/>
+              </a:effectRef>
+              <a:fontRef idx="minor">
+                <a:schemeClr val="lt1"/>
+              </a:fontRef>
+            </p:style>
+            <p:txBody>
+              <a:bodyPr rtlCol="0" anchor="t"/>
+              <a:lstStyle/>
+              <a:p>
+                <a:pPr algn="ctr"/>
+                <a:r>
+                  <a:rPr lang="sv-SE" sz="1100" dirty="0" smtClean="0">
+                    <a:solidFill>
+                      <a:schemeClr val="tx1"/>
+                    </a:solidFill>
+                  </a:rPr>
+                  <a:t>For </a:t>
+                </a:r>
+                <a:r>
+                  <a:rPr lang="sv-SE" sz="1100" dirty="0" err="1" smtClean="0">
+                    <a:solidFill>
+                      <a:schemeClr val="tx1"/>
+                    </a:solidFill>
+                  </a:rPr>
+                  <a:t>each</a:t>
+                </a:r>
+                <a:r>
+                  <a:rPr lang="sv-SE" sz="1100" dirty="0">
+                    <a:solidFill>
+                      <a:schemeClr val="tx1"/>
+                    </a:solidFill>
+                  </a:rPr>
+                  <a:t> </a:t>
+                </a:r>
+                <a:r>
+                  <a:rPr lang="sv-SE" sz="1100" dirty="0" err="1">
+                    <a:solidFill>
+                      <a:schemeClr val="tx1"/>
+                    </a:solidFill>
+                  </a:rPr>
+                  <a:t>sdLinesTmp</a:t>
+                </a:r>
+                <a:endParaRPr lang="sv-SE" sz="1100" dirty="0">
+                  <a:solidFill>
+                    <a:schemeClr val="tx1"/>
+                  </a:solidFill>
+                </a:endParaRPr>
+              </a:p>
+            </p:txBody>
+          </p:sp>
+          <p:sp>
+            <p:nvSpPr>
+              <p:cNvPr id="47" name="textruta 46"/>
+              <p:cNvSpPr txBox="1"/>
+              <p:nvPr/>
+            </p:nvSpPr>
+            <p:spPr>
+              <a:xfrm>
+                <a:off x="2192340" y="2223724"/>
+                <a:ext cx="1190330" cy="261610"/>
+              </a:xfrm>
+              <a:prstGeom prst="rect">
+                <a:avLst/>
+              </a:prstGeom>
+              <a:noFill/>
+              <a:ln>
+                <a:solidFill>
+                  <a:schemeClr val="accent1"/>
+                </a:solidFill>
+              </a:ln>
+            </p:spPr>
+            <p:txBody>
+              <a:bodyPr wrap="square" rtlCol="0">
+                <a:spAutoFit/>
+              </a:bodyPr>
+              <a:lstStyle/>
+              <a:p>
+                <a:r>
+                  <a:rPr lang="sv-SE" sz="1100" dirty="0" err="1"/>
+                  <a:t>modifyAndCopySdLine</a:t>
+                </a:r>
+                <a:endParaRPr lang="sv-SE" sz="1100" dirty="0"/>
+              </a:p>
+            </p:txBody>
+          </p:sp>
+        </p:grpSp>
+        <p:cxnSp>
+          <p:nvCxnSpPr>
+            <p:cNvPr id="53" name="Vinklad koppling 52"/>
+            <p:cNvCxnSpPr>
+              <a:stCxn id="32" idx="2"/>
+              <a:endCxn id="47" idx="3"/>
+            </p:cNvCxnSpPr>
+            <p:nvPr/>
+          </p:nvCxnSpPr>
+          <p:spPr>
+            <a:xfrm rot="5400000">
+              <a:off x="3625027" y="4332306"/>
+              <a:ext cx="1005061" cy="950085"/>
+            </a:xfrm>
+            <a:prstGeom prst="bentConnector2">
+              <a:avLst/>
+            </a:prstGeom>
+            <a:ln>
+              <a:tailEnd type="triangle"/>
+            </a:ln>
+          </p:spPr>
+          <p:style>
+            <a:lnRef idx="1">
+              <a:schemeClr val="accent1"/>
+            </a:lnRef>
+            <a:fillRef idx="0">
+              <a:schemeClr val="accent1"/>
+            </a:fillRef>
+            <a:effectRef idx="0">
+              <a:schemeClr val="accent1"/>
+            </a:effectRef>
+            <a:fontRef idx="minor">
+              <a:schemeClr val="tx1"/>
+            </a:fontRef>
+          </p:style>
+        </p:cxnSp>
+        <p:sp>
+          <p:nvSpPr>
+            <p:cNvPr id="59" name="Flödesschema: Intern lagring 58"/>
+            <p:cNvSpPr/>
+            <p:nvPr/>
+          </p:nvSpPr>
+          <p:spPr>
+            <a:xfrm>
+              <a:off x="763481" y="5111687"/>
+              <a:ext cx="750033" cy="396384"/>
+            </a:xfrm>
+            <a:prstGeom prst="flowChartInternalStorage">
+              <a:avLst/>
+            </a:prstGeom>
+            <a:noFill/>
+            <a:ln w="6350">
+              <a:solidFill>
+                <a:schemeClr val="tx1"/>
+              </a:solidFill>
+            </a:ln>
+          </p:spPr>
+          <p:style>
+            <a:lnRef idx="2">
+              <a:schemeClr val="accent1">
+                <a:shade val="50000"/>
+              </a:schemeClr>
+            </a:lnRef>
+            <a:fillRef idx="1">
+              <a:schemeClr val="accent1"/>
+            </a:fillRef>
+            <a:effectRef idx="0">
+              <a:schemeClr val="accent1"/>
+            </a:effectRef>
+            <a:fontRef idx="minor">
+              <a:schemeClr val="lt1"/>
+            </a:fontRef>
+          </p:style>
+          <p:txBody>
+            <a:bodyPr rtlCol="0" anchor="ctr"/>
+            <a:lstStyle/>
+            <a:p>
+              <a:pPr algn="ctr"/>
               <a:r>
-                <a:rPr lang="sv-SE" sz="1100" dirty="0" err="1">
+                <a:rPr lang="sv-SE" sz="1100" dirty="0" err="1" smtClean="0">
                   <a:solidFill>
                     <a:schemeClr val="tx1"/>
                   </a:solidFill>
                 </a:rPr>
-                <a:t>sdLinesTmp</a:t>
+                <a:t>sdLines</a:t>
+              </a:r>
+              <a:r>
+                <a:rPr lang="sv-SE" sz="1100" dirty="0" smtClean="0">
+                  <a:solidFill>
+                    <a:schemeClr val="tx1"/>
+                  </a:solidFill>
+                </a:rPr>
+                <a:t> </a:t>
               </a:r>
               <a:endParaRPr lang="sv-SE" sz="1100" dirty="0">
                 <a:solidFill>
@@ -5894,269 +6179,132 @@
             </a:p>
           </p:txBody>
         </p:sp>
+        <p:cxnSp>
+          <p:nvCxnSpPr>
+            <p:cNvPr id="61" name="Rak pilkoppling 60"/>
+            <p:cNvCxnSpPr>
+              <a:stCxn id="47" idx="1"/>
+              <a:endCxn id="59" idx="3"/>
+            </p:cNvCxnSpPr>
+            <p:nvPr/>
+          </p:nvCxnSpPr>
+          <p:spPr>
+            <a:xfrm flipH="1">
+              <a:off x="1513514" y="5309879"/>
+              <a:ext cx="629966" cy="0"/>
+            </a:xfrm>
+            <a:prstGeom prst="straightConnector1">
+              <a:avLst/>
+            </a:prstGeom>
+            <a:ln>
+              <a:tailEnd type="triangle"/>
+            </a:ln>
+          </p:spPr>
+          <p:style>
+            <a:lnRef idx="1">
+              <a:schemeClr val="accent1"/>
+            </a:lnRef>
+            <a:fillRef idx="0">
+              <a:schemeClr val="accent1"/>
+            </a:fillRef>
+            <a:effectRef idx="0">
+              <a:schemeClr val="accent1"/>
+            </a:effectRef>
+            <a:fontRef idx="minor">
+              <a:schemeClr val="tx1"/>
+            </a:fontRef>
+          </p:style>
+        </p:cxnSp>
         <p:sp>
           <p:nvSpPr>
-            <p:cNvPr id="47" name="textruta 46"/>
-            <p:cNvSpPr txBox="1"/>
+            <p:cNvPr id="65" name="Flödesschema: Begränsare 64"/>
+            <p:cNvSpPr/>
             <p:nvPr/>
           </p:nvSpPr>
           <p:spPr>
             <a:xfrm>
-              <a:off x="2192340" y="2223724"/>
-              <a:ext cx="1190330" cy="261610"/>
+              <a:off x="2533475" y="5911024"/>
+              <a:ext cx="729044" cy="250586"/>
             </a:xfrm>
-            <a:prstGeom prst="rect">
+            <a:prstGeom prst="flowChartTerminator">
               <a:avLst/>
             </a:prstGeom>
             <a:noFill/>
-            <a:ln>
-              <a:solidFill>
-                <a:schemeClr val="accent1"/>
-              </a:solidFill>
-            </a:ln>
           </p:spPr>
+          <p:style>
+            <a:lnRef idx="2">
+              <a:schemeClr val="accent1">
+                <a:shade val="50000"/>
+              </a:schemeClr>
+            </a:lnRef>
+            <a:fillRef idx="1">
+              <a:schemeClr val="accent1"/>
+            </a:fillRef>
+            <a:effectRef idx="0">
+              <a:schemeClr val="accent1"/>
+            </a:effectRef>
+            <a:fontRef idx="minor">
+              <a:schemeClr val="lt1"/>
+            </a:fontRef>
+          </p:style>
           <p:txBody>
-            <a:bodyPr wrap="square" rtlCol="0">
-              <a:spAutoFit/>
-            </a:bodyPr>
+            <a:bodyPr rtlCol="0" anchor="ctr"/>
             <a:lstStyle/>
             <a:p>
+              <a:pPr algn="ctr"/>
               <a:r>
-                <a:rPr lang="sv-SE" sz="1100" dirty="0" err="1"/>
-                <a:t>modifyAndCopySdLine</a:t>
+                <a:rPr lang="sv-SE" sz="1200" dirty="0" smtClean="0">
+                  <a:solidFill>
+                    <a:schemeClr val="tx1"/>
+                  </a:solidFill>
+                </a:rPr>
+                <a:t>End</a:t>
               </a:r>
-              <a:endParaRPr lang="sv-SE" sz="1100" dirty="0"/>
+              <a:endParaRPr lang="sv-SE" sz="1200" dirty="0">
+                <a:solidFill>
+                  <a:schemeClr val="tx1"/>
+                </a:solidFill>
+              </a:endParaRPr>
             </a:p>
           </p:txBody>
         </p:sp>
+        <p:cxnSp>
+          <p:nvCxnSpPr>
+            <p:cNvPr id="67" name="Rak pilkoppling 66"/>
+            <p:cNvCxnSpPr>
+              <a:stCxn id="46" idx="2"/>
+              <a:endCxn id="65" idx="0"/>
+            </p:cNvCxnSpPr>
+            <p:nvPr/>
+          </p:nvCxnSpPr>
+          <p:spPr>
+            <a:xfrm flipH="1">
+              <a:off x="2897997" y="5631594"/>
+              <a:ext cx="9902" cy="279430"/>
+            </a:xfrm>
+            <a:prstGeom prst="straightConnector1">
+              <a:avLst/>
+            </a:prstGeom>
+            <a:ln>
+              <a:tailEnd type="triangle"/>
+            </a:ln>
+          </p:spPr>
+          <p:style>
+            <a:lnRef idx="1">
+              <a:schemeClr val="accent1"/>
+            </a:lnRef>
+            <a:fillRef idx="0">
+              <a:schemeClr val="accent1"/>
+            </a:fillRef>
+            <a:effectRef idx="0">
+              <a:schemeClr val="accent1"/>
+            </a:effectRef>
+            <a:fontRef idx="minor">
+              <a:schemeClr val="tx1"/>
+            </a:fontRef>
+          </p:style>
+        </p:cxnSp>
       </p:grpSp>
-      <p:cxnSp>
-        <p:nvCxnSpPr>
-          <p:cNvPr id="53" name="Vinklad koppling 52"/>
-          <p:cNvCxnSpPr>
-            <a:stCxn id="32" idx="2"/>
-            <a:endCxn id="47" idx="3"/>
-          </p:cNvCxnSpPr>
-          <p:nvPr/>
-        </p:nvCxnSpPr>
-        <p:spPr>
-          <a:xfrm rot="5400000">
-            <a:off x="3625027" y="2673322"/>
-            <a:ext cx="1005061" cy="950085"/>
-          </a:xfrm>
-          <a:prstGeom prst="bentConnector2">
-            <a:avLst/>
-          </a:prstGeom>
-          <a:ln>
-            <a:tailEnd type="triangle"/>
-          </a:ln>
-        </p:spPr>
-        <p:style>
-          <a:lnRef idx="1">
-            <a:schemeClr val="accent1"/>
-          </a:lnRef>
-          <a:fillRef idx="0">
-            <a:schemeClr val="accent1"/>
-          </a:fillRef>
-          <a:effectRef idx="0">
-            <a:schemeClr val="accent1"/>
-          </a:effectRef>
-          <a:fontRef idx="minor">
-            <a:schemeClr val="tx1"/>
-          </a:fontRef>
-        </p:style>
-      </p:cxnSp>
-      <p:sp>
-        <p:nvSpPr>
-          <p:cNvPr id="59" name="Flödesschema: Intern lagring 58"/>
-          <p:cNvSpPr/>
-          <p:nvPr/>
-        </p:nvSpPr>
-        <p:spPr>
-          <a:xfrm>
-            <a:off x="763481" y="3452703"/>
-            <a:ext cx="750033" cy="396384"/>
-          </a:xfrm>
-          <a:prstGeom prst="flowChartInternalStorage">
-            <a:avLst/>
-          </a:prstGeom>
-          <a:noFill/>
-          <a:ln w="6350">
-            <a:solidFill>
-              <a:schemeClr val="tx1"/>
-            </a:solidFill>
-          </a:ln>
-        </p:spPr>
-        <p:style>
-          <a:lnRef idx="2">
-            <a:schemeClr val="accent1">
-              <a:shade val="50000"/>
-            </a:schemeClr>
-          </a:lnRef>
-          <a:fillRef idx="1">
-            <a:schemeClr val="accent1"/>
-          </a:fillRef>
-          <a:effectRef idx="0">
-            <a:schemeClr val="accent1"/>
-          </a:effectRef>
-          <a:fontRef idx="minor">
-            <a:schemeClr val="lt1"/>
-          </a:fontRef>
-        </p:style>
-        <p:txBody>
-          <a:bodyPr rtlCol="0" anchor="ctr"/>
-          <a:lstStyle/>
-          <a:p>
-            <a:pPr algn="ctr"/>
-            <a:r>
-              <a:rPr lang="sv-SE" sz="1100" dirty="0" err="1" smtClean="0">
-                <a:solidFill>
-                  <a:schemeClr val="tx1"/>
-                </a:solidFill>
-              </a:rPr>
-              <a:t>sdLines</a:t>
-            </a:r>
-            <a:r>
-              <a:rPr lang="sv-SE" sz="1100" dirty="0" smtClean="0">
-                <a:solidFill>
-                  <a:schemeClr val="tx1"/>
-                </a:solidFill>
-              </a:rPr>
-              <a:t> </a:t>
-            </a:r>
-            <a:endParaRPr lang="sv-SE" sz="1100" dirty="0">
-              <a:solidFill>
-                <a:schemeClr val="tx1"/>
-              </a:solidFill>
-            </a:endParaRPr>
-          </a:p>
-        </p:txBody>
-      </p:sp>
-      <p:cxnSp>
-        <p:nvCxnSpPr>
-          <p:cNvPr id="61" name="Rak pilkoppling 60"/>
-          <p:cNvCxnSpPr>
-            <a:stCxn id="47" idx="1"/>
-            <a:endCxn id="59" idx="3"/>
-          </p:cNvCxnSpPr>
-          <p:nvPr/>
-        </p:nvCxnSpPr>
-        <p:spPr>
-          <a:xfrm flipH="1">
-            <a:off x="1513514" y="3650895"/>
-            <a:ext cx="629966" cy="0"/>
-          </a:xfrm>
-          <a:prstGeom prst="straightConnector1">
-            <a:avLst/>
-          </a:prstGeom>
-          <a:ln>
-            <a:tailEnd type="triangle"/>
-          </a:ln>
-        </p:spPr>
-        <p:style>
-          <a:lnRef idx="1">
-            <a:schemeClr val="accent1"/>
-          </a:lnRef>
-          <a:fillRef idx="0">
-            <a:schemeClr val="accent1"/>
-          </a:fillRef>
-          <a:effectRef idx="0">
-            <a:schemeClr val="accent1"/>
-          </a:effectRef>
-          <a:fontRef idx="minor">
-            <a:schemeClr val="tx1"/>
-          </a:fontRef>
-        </p:style>
-      </p:cxnSp>
-      <p:sp>
-        <p:nvSpPr>
-          <p:cNvPr id="65" name="Flödesschema: Begränsare 64"/>
-          <p:cNvSpPr/>
-          <p:nvPr/>
-        </p:nvSpPr>
-        <p:spPr>
-          <a:xfrm>
-            <a:off x="2533475" y="4252040"/>
-            <a:ext cx="729044" cy="250586"/>
-          </a:xfrm>
-          <a:prstGeom prst="flowChartTerminator">
-            <a:avLst/>
-          </a:prstGeom>
-          <a:noFill/>
-        </p:spPr>
-        <p:style>
-          <a:lnRef idx="2">
-            <a:schemeClr val="accent1">
-              <a:shade val="50000"/>
-            </a:schemeClr>
-          </a:lnRef>
-          <a:fillRef idx="1">
-            <a:schemeClr val="accent1"/>
-          </a:fillRef>
-          <a:effectRef idx="0">
-            <a:schemeClr val="accent1"/>
-          </a:effectRef>
-          <a:fontRef idx="minor">
-            <a:schemeClr val="lt1"/>
-          </a:fontRef>
-        </p:style>
-        <p:txBody>
-          <a:bodyPr rtlCol="0" anchor="ctr"/>
-          <a:lstStyle/>
-          <a:p>
-            <a:pPr algn="ctr"/>
-            <a:r>
-              <a:rPr lang="sv-SE" sz="1200" dirty="0" smtClean="0">
-                <a:solidFill>
-                  <a:schemeClr val="tx1"/>
-                </a:solidFill>
-              </a:rPr>
-              <a:t>End</a:t>
-            </a:r>
-            <a:endParaRPr lang="sv-SE" sz="1200" dirty="0">
-              <a:solidFill>
-                <a:schemeClr val="tx1"/>
-              </a:solidFill>
-            </a:endParaRPr>
-          </a:p>
-        </p:txBody>
-      </p:sp>
-      <p:cxnSp>
-        <p:nvCxnSpPr>
-          <p:cNvPr id="67" name="Rak pilkoppling 66"/>
-          <p:cNvCxnSpPr>
-            <a:stCxn id="46" idx="2"/>
-            <a:endCxn id="65" idx="0"/>
-          </p:cNvCxnSpPr>
-          <p:nvPr/>
-        </p:nvCxnSpPr>
-        <p:spPr>
-          <a:xfrm flipH="1">
-            <a:off x="2897997" y="3972610"/>
-            <a:ext cx="9902" cy="279430"/>
-          </a:xfrm>
-          <a:prstGeom prst="straightConnector1">
-            <a:avLst/>
-          </a:prstGeom>
-          <a:ln>
-            <a:tailEnd type="triangle"/>
-          </a:ln>
-        </p:spPr>
-        <p:style>
-          <a:lnRef idx="1">
-            <a:schemeClr val="accent1"/>
-          </a:lnRef>
-          <a:fillRef idx="0">
-            <a:schemeClr val="accent1"/>
-          </a:fillRef>
-          <a:effectRef idx="0">
-            <a:schemeClr val="accent1"/>
-          </a:effectRef>
-          <a:fontRef idx="minor">
-            <a:schemeClr val="tx1"/>
-          </a:fontRef>
-        </p:style>
-      </p:cxnSp>
     </p:spTree>
     <p:extLst>
       <p:ext uri="{BB962C8B-B14F-4D97-AF65-F5344CB8AC3E}">

</xml_diff>

<commit_message>
Updated Help file Changed Browse button text in ZipViewer Added Demo
</commit_message>
<xml_diff>
--- a/Presentation1.pptx
+++ b/Presentation1.pptx
@@ -244,7 +244,7 @@
           <a:p>
             <a:fld id="{67C4A0DB-23A0-4C2A-BC24-C417547B364E}" type="datetimeFigureOut">
               <a:rPr lang="sv-SE" smtClean="0"/>
-              <a:t>2021-04-17</a:t>
+              <a:t>2021-04-21</a:t>
             </a:fld>
             <a:endParaRPr lang="sv-SE"/>
           </a:p>
@@ -414,7 +414,7 @@
           <a:p>
             <a:fld id="{67C4A0DB-23A0-4C2A-BC24-C417547B364E}" type="datetimeFigureOut">
               <a:rPr lang="sv-SE" smtClean="0"/>
-              <a:t>2021-04-17</a:t>
+              <a:t>2021-04-21</a:t>
             </a:fld>
             <a:endParaRPr lang="sv-SE"/>
           </a:p>
@@ -594,7 +594,7 @@
           <a:p>
             <a:fld id="{67C4A0DB-23A0-4C2A-BC24-C417547B364E}" type="datetimeFigureOut">
               <a:rPr lang="sv-SE" smtClean="0"/>
-              <a:t>2021-04-17</a:t>
+              <a:t>2021-04-21</a:t>
             </a:fld>
             <a:endParaRPr lang="sv-SE"/>
           </a:p>
@@ -764,7 +764,7 @@
           <a:p>
             <a:fld id="{67C4A0DB-23A0-4C2A-BC24-C417547B364E}" type="datetimeFigureOut">
               <a:rPr lang="sv-SE" smtClean="0"/>
-              <a:t>2021-04-17</a:t>
+              <a:t>2021-04-21</a:t>
             </a:fld>
             <a:endParaRPr lang="sv-SE"/>
           </a:p>
@@ -1008,7 +1008,7 @@
           <a:p>
             <a:fld id="{67C4A0DB-23A0-4C2A-BC24-C417547B364E}" type="datetimeFigureOut">
               <a:rPr lang="sv-SE" smtClean="0"/>
-              <a:t>2021-04-17</a:t>
+              <a:t>2021-04-21</a:t>
             </a:fld>
             <a:endParaRPr lang="sv-SE"/>
           </a:p>
@@ -1240,7 +1240,7 @@
           <a:p>
             <a:fld id="{67C4A0DB-23A0-4C2A-BC24-C417547B364E}" type="datetimeFigureOut">
               <a:rPr lang="sv-SE" smtClean="0"/>
-              <a:t>2021-04-17</a:t>
+              <a:t>2021-04-21</a:t>
             </a:fld>
             <a:endParaRPr lang="sv-SE"/>
           </a:p>
@@ -1607,7 +1607,7 @@
           <a:p>
             <a:fld id="{67C4A0DB-23A0-4C2A-BC24-C417547B364E}" type="datetimeFigureOut">
               <a:rPr lang="sv-SE" smtClean="0"/>
-              <a:t>2021-04-17</a:t>
+              <a:t>2021-04-21</a:t>
             </a:fld>
             <a:endParaRPr lang="sv-SE"/>
           </a:p>
@@ -1725,7 +1725,7 @@
           <a:p>
             <a:fld id="{67C4A0DB-23A0-4C2A-BC24-C417547B364E}" type="datetimeFigureOut">
               <a:rPr lang="sv-SE" smtClean="0"/>
-              <a:t>2021-04-17</a:t>
+              <a:t>2021-04-21</a:t>
             </a:fld>
             <a:endParaRPr lang="sv-SE"/>
           </a:p>
@@ -1820,7 +1820,7 @@
           <a:p>
             <a:fld id="{67C4A0DB-23A0-4C2A-BC24-C417547B364E}" type="datetimeFigureOut">
               <a:rPr lang="sv-SE" smtClean="0"/>
-              <a:t>2021-04-17</a:t>
+              <a:t>2021-04-21</a:t>
             </a:fld>
             <a:endParaRPr lang="sv-SE"/>
           </a:p>
@@ -2097,7 +2097,7 @@
           <a:p>
             <a:fld id="{67C4A0DB-23A0-4C2A-BC24-C417547B364E}" type="datetimeFigureOut">
               <a:rPr lang="sv-SE" smtClean="0"/>
-              <a:t>2021-04-17</a:t>
+              <a:t>2021-04-21</a:t>
             </a:fld>
             <a:endParaRPr lang="sv-SE"/>
           </a:p>
@@ -2268,7 +2268,7 @@
               <a:rPr lang="sv-SE" smtClean="0"/>
               <a:t>Klicka på ikonen för att lägga till en bild</a:t>
             </a:r>
-            <a:endParaRPr lang="en-US" dirty="0"/>
+            <a:endParaRPr lang="en-US"/>
           </a:p>
         </p:txBody>
       </p:sp>
@@ -2354,7 +2354,7 @@
           <a:p>
             <a:fld id="{67C4A0DB-23A0-4C2A-BC24-C417547B364E}" type="datetimeFigureOut">
               <a:rPr lang="sv-SE" smtClean="0"/>
-              <a:t>2021-04-17</a:t>
+              <a:t>2021-04-21</a:t>
             </a:fld>
             <a:endParaRPr lang="sv-SE"/>
           </a:p>
@@ -2567,7 +2567,7 @@
           <a:p>
             <a:fld id="{67C4A0DB-23A0-4C2A-BC24-C417547B364E}" type="datetimeFigureOut">
               <a:rPr lang="sv-SE" smtClean="0"/>
-              <a:t>2021-04-17</a:t>
+              <a:t>2021-04-21</a:t>
             </a:fld>
             <a:endParaRPr lang="sv-SE"/>
           </a:p>
@@ -3010,14 +3010,14 @@
           <a:p>
             <a:pPr algn="ctr"/>
             <a:r>
-              <a:rPr lang="sv-SE" sz="1200" dirty="0" smtClean="0">
+              <a:rPr lang="sv-SE" sz="1200" smtClean="0">
                 <a:solidFill>
                   <a:schemeClr val="tx1"/>
                 </a:solidFill>
               </a:rPr>
               <a:t>Start</a:t>
             </a:r>
-            <a:endParaRPr lang="sv-SE" sz="1200" dirty="0">
+            <a:endParaRPr lang="sv-SE" sz="1200">
               <a:solidFill>
                 <a:schemeClr val="tx1"/>
               </a:solidFill>
@@ -3063,23 +3063,15 @@
           <a:p>
             <a:pPr algn="ctr"/>
             <a:r>
-              <a:rPr lang="sv-SE" sz="1100" dirty="0" err="1">
+              <a:rPr lang="sv-SE" sz="1100">
                 <a:solidFill>
                   <a:schemeClr val="tx1"/>
                 </a:solidFill>
               </a:rPr>
-              <a:t>graphicsForm</a:t>
-            </a:r>
-            <a:r>
-              <a:rPr lang="sv-SE" sz="1100" dirty="0">
-                <a:solidFill>
-                  <a:schemeClr val="tx1"/>
-                </a:solidFill>
-              </a:rPr>
-              <a:t> </a:t>
-            </a:r>
-            <a:r>
-              <a:rPr lang="sv-SE" sz="1100" dirty="0" err="1">
+              <a:t>graphicsForm </a:t>
+            </a:r>
+            <a:r>
+              <a:rPr lang="sv-SE" sz="1100" err="1">
                 <a:solidFill>
                   <a:schemeClr val="tx1"/>
                 </a:solidFill>
@@ -3087,7 +3079,7 @@
               <a:t>created</a:t>
             </a:r>
             <a:r>
-              <a:rPr lang="sv-SE" sz="1100" dirty="0">
+              <a:rPr lang="sv-SE" sz="1100">
                 <a:solidFill>
                   <a:schemeClr val="tx1"/>
                 </a:solidFill>
@@ -3171,14 +3163,14 @@
           <a:p>
             <a:pPr algn="ctr"/>
             <a:r>
-              <a:rPr lang="sv-SE" sz="1100" dirty="0" err="1" smtClean="0">
+              <a:rPr lang="sv-SE" sz="1100" err="1" smtClean="0">
                 <a:solidFill>
                   <a:schemeClr val="tx1"/>
                 </a:solidFill>
               </a:rPr>
               <a:t>creatNewForm</a:t>
             </a:r>
-            <a:endParaRPr lang="sv-SE" sz="1100" dirty="0">
+            <a:endParaRPr lang="sv-SE" sz="1100">
               <a:solidFill>
                 <a:schemeClr val="tx1"/>
               </a:solidFill>
@@ -3245,10 +3237,10 @@
           <a:lstStyle/>
           <a:p>
             <a:r>
-              <a:rPr lang="sv-SE" sz="1100" dirty="0" smtClean="0"/>
+              <a:rPr lang="sv-SE" sz="1100" smtClean="0"/>
               <a:t>No</a:t>
             </a:r>
-            <a:endParaRPr lang="sv-SE" sz="1100" dirty="0"/>
+            <a:endParaRPr lang="sv-SE" sz="1100"/>
           </a:p>
         </p:txBody>
       </p:sp>
@@ -3290,14 +3282,14 @@
           <a:p>
             <a:pPr algn="ctr"/>
             <a:r>
-              <a:rPr lang="sv-SE" sz="1100" b="1" u="sng" dirty="0" err="1" smtClean="0">
+              <a:rPr lang="sv-SE" sz="1100" b="1" u="sng" err="1" smtClean="0">
                 <a:solidFill>
                   <a:schemeClr val="tx1"/>
                 </a:solidFill>
               </a:rPr>
               <a:t>formatGraphicsForm</a:t>
             </a:r>
-            <a:endParaRPr lang="sv-SE" sz="1100" b="1" u="sng" dirty="0" smtClean="0">
+            <a:endParaRPr lang="sv-SE" sz="1100" b="1" u="sng" smtClean="0">
               <a:solidFill>
                 <a:schemeClr val="tx1"/>
               </a:solidFill>
@@ -3305,7 +3297,7 @@
           </a:p>
           <a:p>
             <a:r>
-              <a:rPr lang="en-US" sz="1100" dirty="0">
+              <a:rPr lang="en-US" sz="1100">
                 <a:solidFill>
                   <a:schemeClr val="tx1"/>
                 </a:solidFill>
@@ -3314,7 +3306,7 @@
               <a:t>Set size </a:t>
             </a:r>
             <a:r>
-              <a:rPr lang="en-US" sz="1100" dirty="0" smtClean="0">
+              <a:rPr lang="en-US" sz="1100" smtClean="0">
                 <a:solidFill>
                   <a:schemeClr val="tx1"/>
                 </a:solidFill>
@@ -3323,7 +3315,7 @@
               <a:t>of pictureBox1 </a:t>
             </a:r>
             <a:r>
-              <a:rPr lang="en-US" sz="1100" dirty="0">
+              <a:rPr lang="en-US" sz="1100">
                 <a:solidFill>
                   <a:schemeClr val="tx1"/>
                 </a:solidFill>
@@ -3332,7 +3324,7 @@
               <a:t>and </a:t>
             </a:r>
             <a:r>
-              <a:rPr lang="en-US" sz="1100" dirty="0" err="1">
+              <a:rPr lang="en-US" sz="1100" err="1">
                 <a:solidFill>
                   <a:schemeClr val="tx1"/>
                 </a:solidFill>
@@ -3340,7 +3332,7 @@
               </a:rPr>
               <a:t>graphicsForm</a:t>
             </a:r>
-            <a:endParaRPr lang="en-US" sz="1100" dirty="0">
+            <a:endParaRPr lang="en-US" sz="1100">
               <a:solidFill>
                 <a:schemeClr val="tx1"/>
               </a:solidFill>
@@ -3348,7 +3340,7 @@
             </a:endParaRPr>
           </a:p>
           <a:p>
-            <a:endParaRPr lang="en-US" sz="1100" dirty="0">
+            <a:endParaRPr lang="en-US" sz="1100">
               <a:solidFill>
                 <a:schemeClr val="tx1"/>
               </a:solidFill>
@@ -3356,7 +3348,7 @@
           </a:p>
           <a:p>
             <a:pPr algn="ctr"/>
-            <a:endParaRPr lang="sv-SE" sz="1100" dirty="0">
+            <a:endParaRPr lang="sv-SE" sz="1100">
               <a:solidFill>
                 <a:schemeClr val="tx1"/>
               </a:solidFill>
@@ -3423,10 +3415,10 @@
           <a:lstStyle/>
           <a:p>
             <a:r>
-              <a:rPr lang="sv-SE" sz="1100" dirty="0" err="1" smtClean="0"/>
+              <a:rPr lang="sv-SE" sz="1100" err="1" smtClean="0"/>
               <a:t>Yes</a:t>
             </a:r>
-            <a:endParaRPr lang="sv-SE" sz="1100" dirty="0"/>
+            <a:endParaRPr lang="sv-SE" sz="1100"/>
           </a:p>
         </p:txBody>
       </p:sp>
@@ -3468,161 +3460,14 @@
       </p:cxnSp>
       <p:sp>
         <p:nvSpPr>
-          <p:cNvPr id="19" name="Flödesschema: Data 18"/>
-          <p:cNvSpPr/>
-          <p:nvPr/>
-        </p:nvSpPr>
-        <p:spPr>
-          <a:xfrm>
-            <a:off x="356755" y="9224172"/>
-            <a:ext cx="1236617" cy="486279"/>
-          </a:xfrm>
-          <a:prstGeom prst="flowChartInputOutput">
-            <a:avLst/>
-          </a:prstGeom>
-          <a:noFill/>
-        </p:spPr>
-        <p:style>
-          <a:lnRef idx="2">
-            <a:schemeClr val="accent1">
-              <a:shade val="50000"/>
-            </a:schemeClr>
-          </a:lnRef>
-          <a:fillRef idx="1">
-            <a:schemeClr val="accent1"/>
-          </a:fillRef>
-          <a:effectRef idx="0">
-            <a:schemeClr val="accent1"/>
-          </a:effectRef>
-          <a:fontRef idx="minor">
-            <a:schemeClr val="lt1"/>
-          </a:fontRef>
-        </p:style>
-        <p:txBody>
-          <a:bodyPr rtlCol="0" anchor="ctr"/>
-          <a:lstStyle/>
-          <a:p>
-            <a:pPr algn="ctr"/>
-            <a:r>
-              <a:rPr lang="sv-SE" sz="1100" dirty="0" smtClean="0">
-                <a:solidFill>
-                  <a:schemeClr val="tx1"/>
-                </a:solidFill>
-              </a:rPr>
-              <a:t>Settings</a:t>
-            </a:r>
-          </a:p>
-          <a:p>
-            <a:pPr algn="ctr"/>
-            <a:endParaRPr lang="sv-SE" dirty="0"/>
-          </a:p>
-        </p:txBody>
-      </p:sp>
-      <p:sp>
-        <p:nvSpPr>
-          <p:cNvPr id="22" name="Flödesschema: Data 21"/>
-          <p:cNvSpPr/>
-          <p:nvPr/>
-        </p:nvSpPr>
-        <p:spPr>
-          <a:xfrm>
-            <a:off x="330385" y="2645971"/>
-            <a:ext cx="1236617" cy="235840"/>
-          </a:xfrm>
-          <a:prstGeom prst="flowChartInputOutput">
-            <a:avLst/>
-          </a:prstGeom>
-          <a:noFill/>
-        </p:spPr>
-        <p:style>
-          <a:lnRef idx="2">
-            <a:schemeClr val="accent1">
-              <a:shade val="50000"/>
-            </a:schemeClr>
-          </a:lnRef>
-          <a:fillRef idx="1">
-            <a:schemeClr val="accent1"/>
-          </a:fillRef>
-          <a:effectRef idx="0">
-            <a:schemeClr val="accent1"/>
-          </a:effectRef>
-          <a:fontRef idx="minor">
-            <a:schemeClr val="lt1"/>
-          </a:fontRef>
-        </p:style>
-        <p:txBody>
-          <a:bodyPr rtlCol="0" anchor="t"/>
-          <a:lstStyle/>
-          <a:p>
-            <a:pPr algn="ctr"/>
-            <a:r>
-              <a:rPr lang="sv-SE" sz="1100" dirty="0" err="1" smtClean="0">
-                <a:solidFill>
-                  <a:schemeClr val="tx1"/>
-                </a:solidFill>
-              </a:rPr>
-              <a:t>PageSize</a:t>
-            </a:r>
-            <a:endParaRPr lang="sv-SE" sz="1100" dirty="0" smtClean="0">
-              <a:solidFill>
-                <a:schemeClr val="tx1"/>
-              </a:solidFill>
-            </a:endParaRPr>
-          </a:p>
-          <a:p>
-            <a:pPr algn="ctr"/>
-            <a:endParaRPr lang="sv-SE" dirty="0"/>
-          </a:p>
-        </p:txBody>
-      </p:sp>
-      <p:cxnSp>
-        <p:nvCxnSpPr>
-          <p:cNvPr id="24" name="Rak pilkoppling 23"/>
-          <p:cNvCxnSpPr>
-            <a:stCxn id="22" idx="5"/>
-            <a:endCxn id="10" idx="1"/>
-          </p:cNvCxnSpPr>
-          <p:nvPr/>
-        </p:nvCxnSpPr>
-        <p:spPr>
-          <a:xfrm>
-            <a:off x="1443340" y="2763891"/>
-            <a:ext cx="546437" cy="243464"/>
-          </a:xfrm>
-          <a:prstGeom prst="bentConnector3">
-            <a:avLst>
-              <a:gd name="adj1" fmla="val 50000"/>
-            </a:avLst>
-          </a:prstGeom>
-          <a:ln>
-            <a:tailEnd type="triangle"/>
-          </a:ln>
-        </p:spPr>
-        <p:style>
-          <a:lnRef idx="1">
-            <a:schemeClr val="accent1"/>
-          </a:lnRef>
-          <a:fillRef idx="0">
-            <a:schemeClr val="accent1"/>
-          </a:fillRef>
-          <a:effectRef idx="0">
-            <a:schemeClr val="accent1"/>
-          </a:effectRef>
-          <a:fontRef idx="minor">
-            <a:schemeClr val="tx1"/>
-          </a:fontRef>
-        </p:style>
-      </p:cxnSp>
-      <p:sp>
-        <p:nvSpPr>
           <p:cNvPr id="26" name="Flödesschema: Manuella indata 25"/>
           <p:cNvSpPr/>
           <p:nvPr/>
         </p:nvSpPr>
         <p:spPr>
           <a:xfrm>
-            <a:off x="494723" y="2976424"/>
-            <a:ext cx="740231" cy="280418"/>
+            <a:off x="307787" y="2667651"/>
+            <a:ext cx="1166088" cy="674260"/>
           </a:xfrm>
           <a:prstGeom prst="flowChartManualInput">
             <a:avLst/>
@@ -3651,14 +3496,46 @@
           <a:p>
             <a:pPr algn="ctr"/>
             <a:r>
-              <a:rPr lang="sv-SE" sz="1100" dirty="0" err="1" smtClean="0">
+              <a:rPr lang="sv-SE" sz="1100" err="1" smtClean="0">
+                <a:solidFill>
+                  <a:schemeClr val="tx1"/>
+                </a:solidFill>
+              </a:rPr>
+              <a:t>PageSize</a:t>
+            </a:r>
+            <a:r>
+              <a:rPr lang="sv-SE" sz="1100" smtClean="0">
+                <a:solidFill>
+                  <a:schemeClr val="tx1"/>
+                </a:solidFill>
+              </a:rPr>
+              <a:t>, </a:t>
+            </a:r>
+            <a:r>
+              <a:rPr lang="sv-SE" sz="1100" err="1" smtClean="0">
                 <a:solidFill>
                   <a:schemeClr val="tx1"/>
                 </a:solidFill>
               </a:rPr>
               <a:t>Scale</a:t>
             </a:r>
-            <a:endParaRPr lang="sv-SE" sz="1100" dirty="0">
+            <a:endParaRPr lang="sv-SE" sz="1100" smtClean="0">
+              <a:solidFill>
+                <a:schemeClr val="tx1"/>
+              </a:solidFill>
+            </a:endParaRPr>
+          </a:p>
+          <a:p>
+            <a:pPr algn="ctr"/>
+            <a:r>
+              <a:rPr lang="sv-SE" sz="1100" err="1">
+                <a:solidFill>
+                  <a:schemeClr val="tx1"/>
+                </a:solidFill>
+              </a:rPr>
+              <a:t>TitleBarHeight</a:t>
+            </a:r>
+            <a:endParaRPr lang="sv-SE" sz="1100">
               <a:solidFill>
                 <a:schemeClr val="tx1"/>
               </a:solidFill>
@@ -3676,9 +3553,9 @@
           <p:nvPr/>
         </p:nvCxnSpPr>
         <p:spPr>
-          <a:xfrm flipV="1">
-            <a:off x="1234954" y="3007355"/>
-            <a:ext cx="754823" cy="109278"/>
+          <a:xfrm>
+            <a:off x="1473875" y="3004781"/>
+            <a:ext cx="515902" cy="2574"/>
           </a:xfrm>
           <a:prstGeom prst="bentConnector3">
             <a:avLst>
@@ -3686,45 +3563,6 @@
             </a:avLst>
           </a:prstGeom>
           <a:ln>
-            <a:tailEnd type="triangle"/>
-          </a:ln>
-        </p:spPr>
-        <p:style>
-          <a:lnRef idx="1">
-            <a:schemeClr val="accent1"/>
-          </a:lnRef>
-          <a:fillRef idx="0">
-            <a:schemeClr val="accent1"/>
-          </a:fillRef>
-          <a:effectRef idx="0">
-            <a:schemeClr val="accent1"/>
-          </a:effectRef>
-          <a:fontRef idx="minor">
-            <a:schemeClr val="tx1"/>
-          </a:fontRef>
-        </p:style>
-      </p:cxnSp>
-      <p:cxnSp>
-        <p:nvCxnSpPr>
-          <p:cNvPr id="37" name="Rak pilkoppling 36"/>
-          <p:cNvCxnSpPr>
-            <a:stCxn id="46" idx="3"/>
-            <a:endCxn id="10" idx="1"/>
-          </p:cNvCxnSpPr>
-          <p:nvPr/>
-        </p:nvCxnSpPr>
-        <p:spPr>
-          <a:xfrm flipV="1">
-            <a:off x="1415140" y="3007355"/>
-            <a:ext cx="574637" cy="570005"/>
-          </a:xfrm>
-          <a:prstGeom prst="bentConnector3">
-            <a:avLst>
-              <a:gd name="adj1" fmla="val 50000"/>
-            </a:avLst>
-          </a:prstGeom>
-          <a:ln>
-            <a:miter lim="800000"/>
             <a:tailEnd type="triangle"/>
           </a:ln>
         </p:spPr>
@@ -3780,7 +3618,7 @@
           <a:lstStyle/>
           <a:p>
             <a:r>
-              <a:rPr lang="sv-SE" sz="1100" dirty="0" smtClean="0">
+              <a:rPr lang="sv-SE" sz="1100" smtClean="0">
                 <a:solidFill>
                   <a:schemeClr val="tx1"/>
                 </a:solidFill>
@@ -3789,7 +3627,7 @@
               <a:t>Clear </a:t>
             </a:r>
             <a:r>
-              <a:rPr lang="sv-SE" sz="1100" dirty="0" err="1" smtClean="0">
+              <a:rPr lang="sv-SE" sz="1100" err="1" smtClean="0">
                 <a:solidFill>
                   <a:schemeClr val="tx1"/>
                 </a:solidFill>
@@ -3797,7 +3635,7 @@
               </a:rPr>
               <a:t>bitmaplList</a:t>
             </a:r>
-            <a:endParaRPr lang="sv-SE" sz="1100" dirty="0" smtClean="0">
+            <a:endParaRPr lang="sv-SE" sz="1100" smtClean="0">
               <a:solidFill>
                 <a:schemeClr val="tx1"/>
               </a:solidFill>
@@ -3806,7 +3644,7 @@
           </a:p>
           <a:p>
             <a:r>
-              <a:rPr lang="sv-SE" sz="1100" dirty="0" smtClean="0">
+              <a:rPr lang="sv-SE" sz="1100" smtClean="0">
                 <a:solidFill>
                   <a:schemeClr val="tx1"/>
                 </a:solidFill>
@@ -3815,7 +3653,7 @@
               <a:t>Read all </a:t>
             </a:r>
             <a:r>
-              <a:rPr lang="sv-SE" sz="1100" dirty="0" err="1" smtClean="0">
+              <a:rPr lang="sv-SE" sz="1100" err="1" smtClean="0">
                 <a:solidFill>
                   <a:schemeClr val="tx1"/>
                 </a:solidFill>
@@ -3824,7 +3662,7 @@
               <a:t>lines</a:t>
             </a:r>
             <a:r>
-              <a:rPr lang="sv-SE" sz="1100" dirty="0" smtClean="0">
+              <a:rPr lang="sv-SE" sz="1100" smtClean="0">
                 <a:solidFill>
                   <a:schemeClr val="tx1"/>
                 </a:solidFill>
@@ -3833,7 +3671,7 @@
               <a:t> from Sd </a:t>
             </a:r>
             <a:r>
-              <a:rPr lang="sv-SE" sz="1100" dirty="0" err="1" smtClean="0">
+              <a:rPr lang="sv-SE" sz="1100" err="1" smtClean="0">
                 <a:solidFill>
                   <a:schemeClr val="tx1"/>
                 </a:solidFill>
@@ -3841,7 +3679,7 @@
               </a:rPr>
               <a:t>file</a:t>
             </a:r>
-            <a:endParaRPr lang="sv-SE" sz="1100" dirty="0">
+            <a:endParaRPr lang="sv-SE" sz="1100">
               <a:solidFill>
                 <a:schemeClr val="tx1"/>
               </a:solidFill>
@@ -3888,7 +3726,7 @@
           <a:p>
             <a:pPr algn="ctr"/>
             <a:r>
-              <a:rPr lang="sv-SE" sz="1100" dirty="0" smtClean="0">
+              <a:rPr lang="sv-SE" sz="1100" smtClean="0">
                 <a:solidFill>
                   <a:schemeClr val="tx1"/>
                 </a:solidFill>
@@ -3896,14 +3734,14 @@
               <a:t>Sd </a:t>
             </a:r>
             <a:r>
-              <a:rPr lang="sv-SE" sz="1100" dirty="0" err="1" smtClean="0">
+              <a:rPr lang="sv-SE" sz="1100" err="1" smtClean="0">
                 <a:solidFill>
                   <a:schemeClr val="tx1"/>
                 </a:solidFill>
               </a:rPr>
               <a:t>file</a:t>
             </a:r>
-            <a:endParaRPr lang="sv-SE" sz="1100" dirty="0">
+            <a:endParaRPr lang="sv-SE" sz="1100">
               <a:solidFill>
                 <a:schemeClr val="tx1"/>
               </a:solidFill>
@@ -3991,7 +3829,7 @@
         </p:nvSpPr>
         <p:spPr>
           <a:xfrm>
-            <a:off x="2337872" y="4659803"/>
+            <a:off x="2321975" y="4652596"/>
             <a:ext cx="1399212" cy="547510"/>
           </a:xfrm>
           <a:prstGeom prst="flowChartProcess">
@@ -4020,7 +3858,7 @@
           <a:lstStyle/>
           <a:p>
             <a:r>
-              <a:rPr lang="sv-SE" sz="1100" b="1" u="sng" dirty="0" err="1" smtClean="0">
+              <a:rPr lang="sv-SE" sz="1100" b="1" u="sng" err="1" smtClean="0">
                 <a:solidFill>
                   <a:srgbClr val="000000"/>
                 </a:solidFill>
@@ -4028,7 +3866,7 @@
               </a:rPr>
               <a:t>createSdLines</a:t>
             </a:r>
-            <a:endParaRPr lang="sv-SE" sz="1100" b="1" u="sng" dirty="0" smtClean="0">
+            <a:endParaRPr lang="sv-SE" sz="1100" b="1" u="sng" smtClean="0">
               <a:solidFill>
                 <a:srgbClr val="000000"/>
               </a:solidFill>
@@ -4037,7 +3875,7 @@
           </a:p>
           <a:p>
             <a:r>
-              <a:rPr lang="sv-SE" sz="1100" b="1" u="sng" dirty="0" smtClean="0">
+              <a:rPr lang="sv-SE" sz="1100" b="1" u="sng" smtClean="0">
                 <a:solidFill>
                   <a:srgbClr val="000000"/>
                 </a:solidFill>
@@ -4046,7 +3884,7 @@
               <a:t>(</a:t>
             </a:r>
             <a:r>
-              <a:rPr lang="sv-SE" sz="1100" b="1" u="sng" dirty="0" err="1" smtClean="0">
+              <a:rPr lang="sv-SE" sz="1100" b="1" u="sng" err="1" smtClean="0">
                 <a:solidFill>
                   <a:srgbClr val="000000"/>
                 </a:solidFill>
@@ -4055,7 +3893,7 @@
               <a:t>see</a:t>
             </a:r>
             <a:r>
-              <a:rPr lang="sv-SE" sz="1100" b="1" u="sng" dirty="0" smtClean="0">
+              <a:rPr lang="sv-SE" sz="1100" b="1" u="sng" smtClean="0">
                 <a:solidFill>
                   <a:srgbClr val="000000"/>
                 </a:solidFill>
@@ -4064,7 +3902,7 @@
               <a:t> </a:t>
             </a:r>
             <a:r>
-              <a:rPr lang="sv-SE" sz="1100" b="1" u="sng" dirty="0" err="1" smtClean="0">
+              <a:rPr lang="sv-SE" sz="1100" b="1" u="sng" err="1" smtClean="0">
                 <a:solidFill>
                   <a:srgbClr val="000000"/>
                 </a:solidFill>
@@ -4073,7 +3911,7 @@
               <a:t>flowchart</a:t>
             </a:r>
             <a:r>
-              <a:rPr lang="sv-SE" sz="1100" b="1" u="sng" dirty="0" smtClean="0">
+              <a:rPr lang="sv-SE" sz="1100" b="1" u="sng" smtClean="0">
                 <a:solidFill>
                   <a:srgbClr val="000000"/>
                 </a:solidFill>
@@ -4081,7 +3919,7 @@
               </a:rPr>
               <a:t>)</a:t>
             </a:r>
-            <a:endParaRPr lang="sv-SE" sz="1100" b="1" u="sng" dirty="0">
+            <a:endParaRPr lang="sv-SE" sz="1100" b="1" u="sng">
               <a:solidFill>
                 <a:schemeClr val="tx1"/>
               </a:solidFill>
@@ -4101,7 +3939,7 @@
         <p:spPr>
           <a:xfrm>
             <a:off x="2973682" y="4493572"/>
-            <a:ext cx="63796" cy="166231"/>
+            <a:ext cx="47899" cy="159024"/>
           </a:xfrm>
           <a:prstGeom prst="straightConnector1">
             <a:avLst/>
@@ -4125,175 +3963,6 @@
           </a:fontRef>
         </p:style>
       </p:cxnSp>
-      <p:sp>
-        <p:nvSpPr>
-          <p:cNvPr id="45" name="Flödesschema: Intern lagring 44"/>
-          <p:cNvSpPr/>
-          <p:nvPr/>
-        </p:nvSpPr>
-        <p:spPr>
-          <a:xfrm>
-            <a:off x="417874" y="10041540"/>
-            <a:ext cx="928174" cy="612648"/>
-          </a:xfrm>
-          <a:prstGeom prst="flowChartInternalStorage">
-            <a:avLst/>
-          </a:prstGeom>
-          <a:noFill/>
-          <a:ln w="6350">
-            <a:solidFill>
-              <a:schemeClr val="tx1"/>
-            </a:solidFill>
-          </a:ln>
-        </p:spPr>
-        <p:style>
-          <a:lnRef idx="2">
-            <a:schemeClr val="accent1">
-              <a:shade val="50000"/>
-            </a:schemeClr>
-          </a:lnRef>
-          <a:fillRef idx="1">
-            <a:schemeClr val="accent1"/>
-          </a:fillRef>
-          <a:effectRef idx="0">
-            <a:schemeClr val="accent1"/>
-          </a:effectRef>
-          <a:fontRef idx="minor">
-            <a:schemeClr val="lt1"/>
-          </a:fontRef>
-        </p:style>
-        <p:txBody>
-          <a:bodyPr rtlCol="0" anchor="ctr"/>
-          <a:lstStyle/>
-          <a:p>
-            <a:pPr algn="ctr"/>
-            <a:r>
-              <a:rPr lang="sv-SE" sz="1100" dirty="0" smtClean="0">
-                <a:solidFill>
-                  <a:schemeClr val="tx1"/>
-                </a:solidFill>
-              </a:rPr>
-              <a:t>Intern lagring</a:t>
-            </a:r>
-            <a:endParaRPr lang="sv-SE" sz="1100" dirty="0">
-              <a:solidFill>
-                <a:schemeClr val="tx1"/>
-              </a:solidFill>
-            </a:endParaRPr>
-          </a:p>
-        </p:txBody>
-      </p:sp>
-      <p:sp>
-        <p:nvSpPr>
-          <p:cNvPr id="46" name="Flödesschema: Intern lagring 45"/>
-          <p:cNvSpPr/>
-          <p:nvPr/>
-        </p:nvSpPr>
-        <p:spPr>
-          <a:xfrm>
-            <a:off x="267154" y="3435758"/>
-            <a:ext cx="1147986" cy="283203"/>
-          </a:xfrm>
-          <a:prstGeom prst="flowChartInternalStorage">
-            <a:avLst/>
-          </a:prstGeom>
-          <a:noFill/>
-          <a:ln w="6350">
-            <a:solidFill>
-              <a:schemeClr val="tx1"/>
-            </a:solidFill>
-          </a:ln>
-        </p:spPr>
-        <p:style>
-          <a:lnRef idx="2">
-            <a:schemeClr val="accent1">
-              <a:shade val="50000"/>
-            </a:schemeClr>
-          </a:lnRef>
-          <a:fillRef idx="1">
-            <a:schemeClr val="accent1"/>
-          </a:fillRef>
-          <a:effectRef idx="0">
-            <a:schemeClr val="accent1"/>
-          </a:effectRef>
-          <a:fontRef idx="minor">
-            <a:schemeClr val="lt1"/>
-          </a:fontRef>
-        </p:style>
-        <p:txBody>
-          <a:bodyPr rtlCol="0" anchor="ctr"/>
-          <a:lstStyle/>
-          <a:p>
-            <a:pPr algn="ctr"/>
-            <a:r>
-              <a:rPr lang="sv-SE" sz="1100" dirty="0" err="1">
-                <a:solidFill>
-                  <a:schemeClr val="tx1"/>
-                </a:solidFill>
-              </a:rPr>
-              <a:t>TitleBarHeight</a:t>
-            </a:r>
-            <a:endParaRPr lang="sv-SE" sz="1100" dirty="0">
-              <a:solidFill>
-                <a:schemeClr val="tx1"/>
-              </a:solidFill>
-            </a:endParaRPr>
-          </a:p>
-        </p:txBody>
-      </p:sp>
-      <p:sp>
-        <p:nvSpPr>
-          <p:cNvPr id="48" name="Flödesschema: Beslut 47"/>
-          <p:cNvSpPr/>
-          <p:nvPr/>
-        </p:nvSpPr>
-        <p:spPr>
-          <a:xfrm>
-            <a:off x="1681493" y="10514139"/>
-            <a:ext cx="1716144" cy="598841"/>
-          </a:xfrm>
-          <a:prstGeom prst="flowChartDecision">
-            <a:avLst/>
-          </a:prstGeom>
-          <a:noFill/>
-        </p:spPr>
-        <p:style>
-          <a:lnRef idx="2">
-            <a:schemeClr val="accent1">
-              <a:shade val="50000"/>
-            </a:schemeClr>
-          </a:lnRef>
-          <a:fillRef idx="1">
-            <a:schemeClr val="accent1"/>
-          </a:fillRef>
-          <a:effectRef idx="0">
-            <a:schemeClr val="accent1"/>
-          </a:effectRef>
-          <a:fontRef idx="minor">
-            <a:schemeClr val="lt1"/>
-          </a:fontRef>
-        </p:style>
-        <p:txBody>
-          <a:bodyPr lIns="36000" rIns="36000" rtlCol="0" anchor="ctr"/>
-          <a:lstStyle/>
-          <a:p>
-            <a:pPr algn="ctr"/>
-            <a:r>
-              <a:rPr lang="sv-SE" sz="1100" dirty="0" err="1" smtClean="0">
-                <a:solidFill>
-                  <a:schemeClr val="tx1"/>
-                </a:solidFill>
-              </a:rPr>
-              <a:t>Desicion</a:t>
-            </a:r>
-            <a:endParaRPr lang="sv-SE" sz="1100" dirty="0">
-              <a:solidFill>
-                <a:schemeClr val="tx1"/>
-              </a:solidFill>
-            </a:endParaRPr>
-          </a:p>
-        </p:txBody>
-      </p:sp>
       <p:sp>
         <p:nvSpPr>
           <p:cNvPr id="29" name="Flödesschema: Process 28"/>
@@ -4331,7 +4000,7 @@
           <a:lstStyle/>
           <a:p>
             <a:r>
-              <a:rPr lang="sv-SE" sz="1100" dirty="0" err="1" smtClean="0">
+              <a:rPr lang="sv-SE" sz="1100" err="1" smtClean="0">
                 <a:solidFill>
                   <a:srgbClr val="000000"/>
                 </a:solidFill>
@@ -4340,7 +4009,7 @@
               <a:t>Create</a:t>
             </a:r>
             <a:r>
-              <a:rPr lang="sv-SE" sz="1100" dirty="0" smtClean="0">
+              <a:rPr lang="sv-SE" sz="1100" smtClean="0">
                 <a:solidFill>
                   <a:srgbClr val="000000"/>
                 </a:solidFill>
@@ -4349,7 +4018,7 @@
               <a:t> page </a:t>
             </a:r>
             <a:r>
-              <a:rPr lang="sv-SE" sz="1100" dirty="0" err="1" smtClean="0">
+              <a:rPr lang="sv-SE" sz="1100" err="1" smtClean="0">
                 <a:solidFill>
                   <a:srgbClr val="000000"/>
                 </a:solidFill>
@@ -4357,7 +4026,7 @@
               </a:rPr>
               <a:t>bitmap</a:t>
             </a:r>
-            <a:endParaRPr lang="sv-SE" sz="1100" dirty="0" smtClean="0">
+            <a:endParaRPr lang="sv-SE" sz="1100" smtClean="0">
               <a:solidFill>
                 <a:srgbClr val="000000"/>
               </a:solidFill>
@@ -4366,7 +4035,7 @@
           </a:p>
           <a:p>
             <a:r>
-              <a:rPr lang="sv-SE" sz="1100" dirty="0" smtClean="0">
+              <a:rPr lang="sv-SE" sz="1100" smtClean="0">
                 <a:solidFill>
                   <a:srgbClr val="000000"/>
                 </a:solidFill>
@@ -4375,7 +4044,7 @@
               <a:t>Set y= </a:t>
             </a:r>
             <a:r>
-              <a:rPr lang="sv-SE" sz="1100" dirty="0" err="1">
+              <a:rPr lang="sv-SE" sz="1100" err="1">
                 <a:solidFill>
                   <a:srgbClr val="000000"/>
                 </a:solidFill>
@@ -4384,7 +4053,7 @@
               <a:t>mus.MarginTop</a:t>
             </a:r>
             <a:r>
-              <a:rPr lang="sv-SE" sz="1100" dirty="0" smtClean="0">
+              <a:rPr lang="sv-SE" sz="1100" smtClean="0">
                 <a:solidFill>
                   <a:srgbClr val="000000"/>
                 </a:solidFill>
@@ -4395,7 +4064,7 @@
           </a:p>
           <a:p>
             <a:r>
-              <a:rPr lang="sv-SE" sz="1100" dirty="0" smtClean="0">
+              <a:rPr lang="sv-SE" sz="1100" smtClean="0">
                 <a:solidFill>
                   <a:srgbClr val="000000"/>
                 </a:solidFill>
@@ -4404,7 +4073,7 @@
               <a:t>Set </a:t>
             </a:r>
             <a:r>
-              <a:rPr lang="sv-SE" sz="1100" dirty="0" err="1" smtClean="0">
+              <a:rPr lang="sv-SE" sz="1100" err="1" smtClean="0">
                 <a:solidFill>
                   <a:srgbClr val="000000"/>
                 </a:solidFill>
@@ -4413,7 +4082,7 @@
               <a:t>pageNumber</a:t>
             </a:r>
             <a:r>
-              <a:rPr lang="sv-SE" sz="1100" dirty="0" smtClean="0">
+              <a:rPr lang="sv-SE" sz="1100" smtClean="0">
                 <a:solidFill>
                   <a:srgbClr val="000000"/>
                 </a:solidFill>
@@ -4424,7 +4093,7 @@
           </a:p>
           <a:p>
             <a:r>
-              <a:rPr lang="sv-SE" sz="1100" dirty="0" smtClean="0">
+              <a:rPr lang="sv-SE" sz="1100" smtClean="0">
                 <a:solidFill>
                   <a:srgbClr val="000000"/>
                 </a:solidFill>
@@ -4433,7 +4102,7 @@
               <a:t>Set </a:t>
             </a:r>
             <a:r>
-              <a:rPr lang="sv-SE" sz="1100" dirty="0" err="1" smtClean="0">
+              <a:rPr lang="sv-SE" sz="1100" err="1" smtClean="0">
                 <a:solidFill>
                   <a:srgbClr val="000000"/>
                 </a:solidFill>
@@ -4442,7 +4111,7 @@
               <a:t>currentXoffset</a:t>
             </a:r>
             <a:r>
-              <a:rPr lang="sv-SE" sz="1100" dirty="0" smtClean="0">
+              <a:rPr lang="sv-SE" sz="1100" smtClean="0">
                 <a:solidFill>
                   <a:srgbClr val="000000"/>
                 </a:solidFill>
@@ -4451,7 +4120,7 @@
               <a:t>= </a:t>
             </a:r>
             <a:r>
-              <a:rPr lang="sv-SE" sz="1100" dirty="0">
+              <a:rPr lang="sv-SE" sz="1100">
                 <a:solidFill>
                   <a:srgbClr val="000000"/>
                 </a:solidFill>
@@ -4459,7 +4128,7 @@
               </a:rPr>
               <a:t>0;</a:t>
             </a:r>
-            <a:endParaRPr lang="sv-SE" sz="1100" dirty="0">
+            <a:endParaRPr lang="sv-SE" sz="1100">
               <a:solidFill>
                 <a:schemeClr val="tx1"/>
               </a:solidFill>
@@ -4505,7 +4174,7 @@
           <a:p>
             <a:pPr algn="ctr"/>
             <a:r>
-              <a:rPr lang="sv-SE" sz="1100" dirty="0" err="1" smtClean="0">
+              <a:rPr lang="sv-SE" sz="1100" err="1" smtClean="0">
                 <a:solidFill>
                   <a:srgbClr val="000000"/>
                 </a:solidFill>
@@ -4513,7 +4182,7 @@
               </a:rPr>
               <a:t>MarginTop</a:t>
             </a:r>
-            <a:endParaRPr lang="sv-SE" sz="1100" dirty="0" smtClean="0">
+            <a:endParaRPr lang="sv-SE" sz="1100" smtClean="0">
               <a:solidFill>
                 <a:schemeClr val="tx1"/>
               </a:solidFill>
@@ -4595,14 +4264,14 @@
           <a:p>
             <a:pPr algn="ctr"/>
             <a:r>
-              <a:rPr lang="sv-SE" sz="1100" b="1" u="sng" dirty="0" err="1" smtClean="0">
+              <a:rPr lang="sv-SE" sz="1100" b="1" u="sng" err="1" smtClean="0">
                 <a:solidFill>
                   <a:schemeClr val="tx1"/>
                 </a:solidFill>
               </a:rPr>
               <a:t>writePageHeader</a:t>
             </a:r>
-            <a:endParaRPr lang="sv-SE" sz="1100" b="1" u="sng" dirty="0">
+            <a:endParaRPr lang="sv-SE" sz="1100" b="1" u="sng">
               <a:solidFill>
                 <a:schemeClr val="tx1"/>
               </a:solidFill>
@@ -4648,14 +4317,14 @@
           <a:p>
             <a:pPr algn="ctr"/>
             <a:r>
-              <a:rPr lang="sv-SE" sz="1100" b="1" u="sng" dirty="0" err="1" smtClean="0">
+              <a:rPr lang="sv-SE" sz="1100" b="1" u="sng" err="1" smtClean="0">
                 <a:solidFill>
                   <a:schemeClr val="tx1"/>
                 </a:solidFill>
               </a:rPr>
               <a:t>writeCopyright</a:t>
             </a:r>
-            <a:endParaRPr lang="sv-SE" sz="1100" b="1" u="sng" dirty="0">
+            <a:endParaRPr lang="sv-SE" sz="1100" b="1" u="sng">
               <a:solidFill>
                 <a:schemeClr val="tx1"/>
               </a:solidFill>
@@ -4674,8 +4343,8 @@
         </p:nvCxnSpPr>
         <p:spPr>
           <a:xfrm>
-            <a:off x="3037478" y="5207313"/>
-            <a:ext cx="17414" cy="158276"/>
+            <a:off x="3021581" y="5200106"/>
+            <a:ext cx="33311" cy="165483"/>
           </a:xfrm>
           <a:prstGeom prst="straightConnector1">
             <a:avLst/>
@@ -4779,8 +4448,8 @@
         </p:nvSpPr>
         <p:spPr>
           <a:xfrm>
-            <a:off x="1903036" y="7465688"/>
-            <a:ext cx="1880819" cy="840148"/>
+            <a:off x="1985373" y="7516371"/>
+            <a:ext cx="1880819" cy="508787"/>
           </a:xfrm>
           <a:prstGeom prst="flowChartProcess">
             <a:avLst/>
@@ -4809,7 +4478,7 @@
           <a:p>
             <a:pPr lvl="0"/>
             <a:r>
-              <a:rPr lang="sv-SE" sz="1100" dirty="0" smtClean="0">
+              <a:rPr lang="sv-SE" sz="1100" smtClean="0">
                 <a:solidFill>
                   <a:prstClr val="black"/>
                 </a:solidFill>
@@ -4818,7 +4487,7 @@
               <a:t>y </a:t>
             </a:r>
             <a:r>
-              <a:rPr lang="sv-SE" sz="1100" dirty="0">
+              <a:rPr lang="sv-SE" sz="1100">
                 <a:solidFill>
                   <a:prstClr val="black"/>
                 </a:solidFill>
@@ -4827,7 +4496,7 @@
               <a:t>+= </a:t>
             </a:r>
             <a:r>
-              <a:rPr lang="sv-SE" sz="1100" dirty="0" err="1" smtClean="0">
+              <a:rPr lang="sv-SE" sz="1100" smtClean="0">
                 <a:solidFill>
                   <a:prstClr val="black"/>
                 </a:solidFill>
@@ -4835,81 +4504,36 @@
               </a:rPr>
               <a:t>lineHeight</a:t>
             </a:r>
-            <a:endParaRPr lang="sv-SE" sz="1100" dirty="0">
-              <a:solidFill>
-                <a:prstClr val="black"/>
-              </a:solidFill>
-              <a:latin typeface="Consolas" panose="020B0609020204030204" pitchFamily="49" charset="0"/>
-            </a:endParaRPr>
-          </a:p>
-        </p:txBody>
-      </p:sp>
-      <p:sp>
-        <p:nvSpPr>
-          <p:cNvPr id="42" name="Flödesschema: Manuella indata 41"/>
-          <p:cNvSpPr/>
-          <p:nvPr/>
-        </p:nvSpPr>
-        <p:spPr>
-          <a:xfrm>
-            <a:off x="1702458" y="9623727"/>
-            <a:ext cx="1457636" cy="722811"/>
-          </a:xfrm>
-          <a:prstGeom prst="flowChartManualInput">
-            <a:avLst/>
-          </a:prstGeom>
-          <a:noFill/>
-        </p:spPr>
-        <p:style>
-          <a:lnRef idx="2">
-            <a:schemeClr val="accent1">
-              <a:shade val="50000"/>
-            </a:schemeClr>
-          </a:lnRef>
-          <a:fillRef idx="1">
-            <a:schemeClr val="accent1"/>
-          </a:fillRef>
-          <a:effectRef idx="0">
-            <a:schemeClr val="accent1"/>
-          </a:effectRef>
-          <a:fontRef idx="minor">
-            <a:schemeClr val="lt1"/>
-          </a:fontRef>
-        </p:style>
-        <p:txBody>
-          <a:bodyPr rtlCol="0" anchor="ctr"/>
-          <a:lstStyle/>
-          <a:p>
-            <a:pPr algn="ctr"/>
-            <a:r>
-              <a:rPr lang="sv-SE" sz="1100" dirty="0" smtClean="0">
-                <a:solidFill>
-                  <a:schemeClr val="tx1"/>
-                </a:solidFill>
+          </a:p>
+          <a:p>
+            <a:pPr lvl="0"/>
+            <a:r>
+              <a:rPr lang="sv-SE" sz="1100">
+                <a:solidFill>
+                  <a:prstClr val="black"/>
+                </a:solidFill>
+                <a:latin typeface="Consolas" panose="020B0609020204030204" pitchFamily="49" charset="0"/>
               </a:rPr>
-              <a:t>Manual </a:t>
-            </a:r>
-            <a:r>
-              <a:rPr lang="sv-SE" sz="1100" dirty="0" smtClean="0">
-                <a:solidFill>
-                  <a:schemeClr val="tx1"/>
-                </a:solidFill>
+              <a:t>lastCall </a:t>
+            </a:r>
+            <a:r>
+              <a:rPr lang="sv-SE" sz="1100">
+                <a:solidFill>
+                  <a:prstClr val="black"/>
+                </a:solidFill>
+                <a:latin typeface="Consolas" panose="020B0609020204030204" pitchFamily="49" charset="0"/>
               </a:rPr>
-              <a:t>input/</a:t>
-            </a:r>
-            <a:r>
-              <a:rPr lang="sv-SE" sz="1100" dirty="0" err="1" smtClean="0">
-                <a:solidFill>
-                  <a:schemeClr val="tx1"/>
-                </a:solidFill>
+              <a:t>= </a:t>
+            </a:r>
+            <a:r>
+              <a:rPr lang="sv-SE" sz="1100" smtClean="0">
+                <a:solidFill>
+                  <a:prstClr val="black"/>
+                </a:solidFill>
+                <a:latin typeface="Consolas" panose="020B0609020204030204" pitchFamily="49" charset="0"/>
               </a:rPr>
-              <a:t>preferences</a:t>
-            </a:r>
-            <a:endParaRPr lang="sv-SE" sz="1100" dirty="0">
-              <a:solidFill>
-                <a:schemeClr val="tx1"/>
-              </a:solidFill>
-            </a:endParaRPr>
+              <a:t>"";</a:t>
+            </a:r>
           </a:p>
         </p:txBody>
       </p:sp>
@@ -4953,7 +4577,7 @@
           <a:lstStyle/>
           <a:p>
             <a:r>
-              <a:rPr lang="sv-SE" b="1" u="sng" dirty="0" err="1" smtClean="0">
+              <a:rPr lang="sv-SE" b="1" u="sng" err="1" smtClean="0">
                 <a:solidFill>
                   <a:srgbClr val="000000"/>
                 </a:solidFill>
@@ -4961,7 +4585,7 @@
               </a:rPr>
               <a:t>createTip</a:t>
             </a:r>
-            <a:endParaRPr lang="sv-SE" b="1" u="sng" dirty="0" smtClean="0">
+            <a:endParaRPr lang="sv-SE" b="1" u="sng" smtClean="0">
               <a:solidFill>
                 <a:srgbClr val="000000"/>
               </a:solidFill>
@@ -4970,6 +4594,148 @@
           </a:p>
         </p:txBody>
       </p:sp>
+      <p:cxnSp>
+        <p:nvCxnSpPr>
+          <p:cNvPr id="16" name="Rak pilkoppling 15"/>
+          <p:cNvCxnSpPr>
+            <a:stCxn id="41" idx="2"/>
+            <a:endCxn id="79" idx="0"/>
+          </p:cNvCxnSpPr>
+          <p:nvPr/>
+        </p:nvCxnSpPr>
+        <p:spPr>
+          <a:xfrm>
+            <a:off x="2925783" y="7185404"/>
+            <a:ext cx="0" cy="330967"/>
+          </a:xfrm>
+          <a:prstGeom prst="straightConnector1">
+            <a:avLst/>
+          </a:prstGeom>
+          <a:ln>
+            <a:tailEnd type="triangle"/>
+          </a:ln>
+        </p:spPr>
+        <p:style>
+          <a:lnRef idx="1">
+            <a:schemeClr val="accent1"/>
+          </a:lnRef>
+          <a:fillRef idx="0">
+            <a:schemeClr val="accent1"/>
+          </a:fillRef>
+          <a:effectRef idx="0">
+            <a:schemeClr val="accent1"/>
+          </a:effectRef>
+          <a:fontRef idx="minor">
+            <a:schemeClr val="tx1"/>
+          </a:fontRef>
+        </p:style>
+      </p:cxnSp>
+      <p:sp>
+        <p:nvSpPr>
+          <p:cNvPr id="49" name="Flödesschema: Process 48"/>
+          <p:cNvSpPr/>
+          <p:nvPr/>
+        </p:nvSpPr>
+        <p:spPr>
+          <a:xfrm>
+            <a:off x="2026541" y="8396545"/>
+            <a:ext cx="1798481" cy="544285"/>
+          </a:xfrm>
+          <a:prstGeom prst="flowChartProcess">
+            <a:avLst/>
+          </a:prstGeom>
+          <a:noFill/>
+        </p:spPr>
+        <p:style>
+          <a:lnRef idx="2">
+            <a:schemeClr val="accent1">
+              <a:shade val="50000"/>
+            </a:schemeClr>
+          </a:lnRef>
+          <a:fillRef idx="1">
+            <a:schemeClr val="accent1"/>
+          </a:fillRef>
+          <a:effectRef idx="0">
+            <a:schemeClr val="accent1"/>
+          </a:effectRef>
+          <a:fontRef idx="minor">
+            <a:schemeClr val="lt1"/>
+          </a:fontRef>
+        </p:style>
+        <p:txBody>
+          <a:bodyPr rtlCol="0" anchor="t"/>
+          <a:lstStyle/>
+          <a:p>
+            <a:pPr algn="ctr"/>
+            <a:r>
+              <a:rPr lang="sv-SE" sz="1100">
+                <a:solidFill>
+                  <a:prstClr val="black"/>
+                </a:solidFill>
+                <a:latin typeface="Consolas" panose="020B0609020204030204" pitchFamily="49" charset="0"/>
+              </a:rPr>
+              <a:t>For each SdLine</a:t>
+            </a:r>
+            <a:endParaRPr lang="sv-SE" sz="1100" b="1" u="sng" smtClean="0">
+              <a:solidFill>
+                <a:schemeClr val="tx1"/>
+              </a:solidFill>
+            </a:endParaRPr>
+          </a:p>
+          <a:p>
+            <a:pPr algn="ctr"/>
+            <a:r>
+              <a:rPr lang="sv-SE" sz="1100" b="1" u="sng" smtClean="0">
+                <a:solidFill>
+                  <a:schemeClr val="tx1"/>
+                </a:solidFill>
+              </a:rPr>
+              <a:t>WriteCallOrAddLineToList</a:t>
+            </a:r>
+            <a:endParaRPr lang="sv-SE" sz="1100" b="1" u="sng">
+              <a:solidFill>
+                <a:schemeClr val="tx1"/>
+              </a:solidFill>
+            </a:endParaRPr>
+          </a:p>
+        </p:txBody>
+      </p:sp>
+      <p:cxnSp>
+        <p:nvCxnSpPr>
+          <p:cNvPr id="34" name="Rak pilkoppling 33"/>
+          <p:cNvCxnSpPr>
+            <a:stCxn id="79" idx="2"/>
+            <a:endCxn id="49" idx="0"/>
+          </p:cNvCxnSpPr>
+          <p:nvPr/>
+        </p:nvCxnSpPr>
+        <p:spPr>
+          <a:xfrm flipH="1">
+            <a:off x="2925782" y="8025158"/>
+            <a:ext cx="1" cy="371387"/>
+          </a:xfrm>
+          <a:prstGeom prst="straightConnector1">
+            <a:avLst/>
+          </a:prstGeom>
+          <a:ln>
+            <a:tailEnd type="triangle"/>
+          </a:ln>
+        </p:spPr>
+        <p:style>
+          <a:lnRef idx="1">
+            <a:schemeClr val="accent1"/>
+          </a:lnRef>
+          <a:fillRef idx="0">
+            <a:schemeClr val="accent1"/>
+          </a:fillRef>
+          <a:effectRef idx="0">
+            <a:schemeClr val="accent1"/>
+          </a:effectRef>
+          <a:fontRef idx="minor">
+            <a:schemeClr val="tx1"/>
+          </a:fontRef>
+        </p:style>
+      </p:cxnSp>
     </p:spTree>
     <p:extLst>
       <p:ext uri="{BB962C8B-B14F-4D97-AF65-F5344CB8AC3E}">
@@ -5002,285 +4768,38 @@
       </p:grpSpPr>
       <p:sp>
         <p:nvSpPr>
-          <p:cNvPr id="2" name="Flödesschema: Data 1"/>
-          <p:cNvSpPr/>
+          <p:cNvPr id="58" name="textruta 57"/>
+          <p:cNvSpPr txBox="1"/>
           <p:nvPr/>
         </p:nvSpPr>
         <p:spPr>
           <a:xfrm>
-            <a:off x="339632" y="6781419"/>
-            <a:ext cx="1236617" cy="486279"/>
+            <a:off x="628642" y="5177311"/>
+            <a:ext cx="5103223" cy="4598126"/>
           </a:xfrm>
-          <a:prstGeom prst="flowChartInputOutput">
-            <a:avLst/>
-          </a:prstGeom>
-          <a:noFill/>
-        </p:spPr>
-        <p:style>
-          <a:lnRef idx="2">
-            <a:schemeClr val="accent1">
-              <a:shade val="50000"/>
-            </a:schemeClr>
-          </a:lnRef>
-          <a:fillRef idx="1">
-            <a:schemeClr val="accent1"/>
-          </a:fillRef>
-          <a:effectRef idx="0">
-            <a:schemeClr val="accent1"/>
-          </a:effectRef>
-          <a:fontRef idx="minor">
-            <a:schemeClr val="lt1"/>
-          </a:fontRef>
-        </p:style>
-        <p:txBody>
-          <a:bodyPr rtlCol="0" anchor="ctr"/>
-          <a:lstStyle/>
-          <a:p>
-            <a:pPr algn="ctr"/>
-            <a:r>
-              <a:rPr lang="sv-SE" sz="1100" dirty="0" smtClean="0">
-                <a:solidFill>
-                  <a:schemeClr val="tx1"/>
-                </a:solidFill>
-              </a:rPr>
-              <a:t>Settings</a:t>
-            </a:r>
-          </a:p>
-          <a:p>
-            <a:pPr algn="ctr"/>
-            <a:endParaRPr lang="sv-SE" dirty="0"/>
-          </a:p>
-        </p:txBody>
-      </p:sp>
-      <p:sp>
-        <p:nvSpPr>
-          <p:cNvPr id="3" name="Flödesschema: Manuella indata 2"/>
-          <p:cNvSpPr/>
-          <p:nvPr/>
-        </p:nvSpPr>
-        <p:spPr>
-          <a:xfrm>
-            <a:off x="557345" y="8381398"/>
-            <a:ext cx="1457636" cy="722811"/>
-          </a:xfrm>
-          <a:prstGeom prst="flowChartManualInput">
-            <a:avLst/>
-          </a:prstGeom>
-          <a:noFill/>
-        </p:spPr>
-        <p:style>
-          <a:lnRef idx="2">
-            <a:schemeClr val="accent1">
-              <a:shade val="50000"/>
-            </a:schemeClr>
-          </a:lnRef>
-          <a:fillRef idx="1">
-            <a:schemeClr val="accent1"/>
-          </a:fillRef>
-          <a:effectRef idx="0">
-            <a:schemeClr val="accent1"/>
-          </a:effectRef>
-          <a:fontRef idx="minor">
-            <a:schemeClr val="lt1"/>
-          </a:fontRef>
-        </p:style>
-        <p:txBody>
-          <a:bodyPr rtlCol="0" anchor="ctr"/>
-          <a:lstStyle/>
-          <a:p>
-            <a:pPr algn="ctr"/>
-            <a:r>
-              <a:rPr lang="sv-SE" sz="1100" dirty="0" smtClean="0">
-                <a:solidFill>
-                  <a:schemeClr val="tx1"/>
-                </a:solidFill>
-              </a:rPr>
-              <a:t>Manual </a:t>
-            </a:r>
-            <a:r>
-              <a:rPr lang="sv-SE" sz="1100" dirty="0" smtClean="0">
-                <a:solidFill>
-                  <a:schemeClr val="tx1"/>
-                </a:solidFill>
-              </a:rPr>
-              <a:t>input/</a:t>
-            </a:r>
-            <a:r>
-              <a:rPr lang="sv-SE" sz="1100" dirty="0" err="1" smtClean="0">
-                <a:solidFill>
-                  <a:schemeClr val="tx1"/>
-                </a:solidFill>
-              </a:rPr>
-              <a:t>preferences</a:t>
-            </a:r>
-            <a:endParaRPr lang="sv-SE" sz="1100" dirty="0">
-              <a:solidFill>
-                <a:schemeClr val="tx1"/>
-              </a:solidFill>
-            </a:endParaRPr>
-          </a:p>
-        </p:txBody>
-      </p:sp>
-      <p:sp>
-        <p:nvSpPr>
-          <p:cNvPr id="6" name="Flödesschema: Intern lagring 5"/>
-          <p:cNvSpPr/>
-          <p:nvPr/>
-        </p:nvSpPr>
-        <p:spPr>
-          <a:xfrm>
-            <a:off x="400751" y="7598787"/>
-            <a:ext cx="928174" cy="612648"/>
-          </a:xfrm>
-          <a:prstGeom prst="flowChartInternalStorage">
-            <a:avLst/>
-          </a:prstGeom>
-          <a:noFill/>
-          <a:ln w="6350">
-            <a:solidFill>
-              <a:schemeClr val="tx1"/>
-            </a:solidFill>
-          </a:ln>
-        </p:spPr>
-        <p:style>
-          <a:lnRef idx="2">
-            <a:schemeClr val="accent1">
-              <a:shade val="50000"/>
-            </a:schemeClr>
-          </a:lnRef>
-          <a:fillRef idx="1">
-            <a:schemeClr val="accent1"/>
-          </a:fillRef>
-          <a:effectRef idx="0">
-            <a:schemeClr val="accent1"/>
-          </a:effectRef>
-          <a:fontRef idx="minor">
-            <a:schemeClr val="lt1"/>
-          </a:fontRef>
-        </p:style>
-        <p:txBody>
-          <a:bodyPr rtlCol="0" anchor="ctr"/>
-          <a:lstStyle/>
-          <a:p>
-            <a:pPr algn="ctr"/>
-            <a:r>
-              <a:rPr lang="sv-SE" sz="1100" dirty="0" smtClean="0">
-                <a:solidFill>
-                  <a:schemeClr val="tx1"/>
-                </a:solidFill>
-              </a:rPr>
-              <a:t>Intern lagring</a:t>
-            </a:r>
-            <a:endParaRPr lang="sv-SE" sz="1100" dirty="0">
-              <a:solidFill>
-                <a:schemeClr val="tx1"/>
-              </a:solidFill>
-            </a:endParaRPr>
-          </a:p>
-        </p:txBody>
-      </p:sp>
-      <p:sp>
-        <p:nvSpPr>
-          <p:cNvPr id="10" name="Flödesschema: Beslut 9"/>
-          <p:cNvSpPr/>
-          <p:nvPr/>
-        </p:nvSpPr>
-        <p:spPr>
-          <a:xfrm>
-            <a:off x="99868" y="9597838"/>
-            <a:ext cx="1716144" cy="598841"/>
-          </a:xfrm>
-          <a:prstGeom prst="flowChartDecision">
-            <a:avLst/>
-          </a:prstGeom>
-          <a:noFill/>
-        </p:spPr>
-        <p:style>
-          <a:lnRef idx="2">
-            <a:schemeClr val="accent1">
-              <a:shade val="50000"/>
-            </a:schemeClr>
-          </a:lnRef>
-          <a:fillRef idx="1">
-            <a:schemeClr val="accent1"/>
-          </a:fillRef>
-          <a:effectRef idx="0">
-            <a:schemeClr val="accent1"/>
-          </a:effectRef>
-          <a:fontRef idx="minor">
-            <a:schemeClr val="lt1"/>
-          </a:fontRef>
-        </p:style>
-        <p:txBody>
-          <a:bodyPr lIns="36000" rIns="36000" rtlCol="0" anchor="ctr"/>
-          <a:lstStyle/>
-          <a:p>
-            <a:pPr algn="ctr"/>
-            <a:r>
-              <a:rPr lang="sv-SE" sz="1100" dirty="0" err="1" smtClean="0">
-                <a:solidFill>
-                  <a:schemeClr val="tx1"/>
-                </a:solidFill>
-              </a:rPr>
-              <a:t>Desicion</a:t>
-            </a:r>
-            <a:endParaRPr lang="sv-SE" sz="1100" dirty="0">
-              <a:solidFill>
-                <a:schemeClr val="tx1"/>
-              </a:solidFill>
-            </a:endParaRPr>
-          </a:p>
-        </p:txBody>
-      </p:sp>
-      <p:sp>
-        <p:nvSpPr>
-          <p:cNvPr id="39" name="Flödesschema: Process 38"/>
-          <p:cNvSpPr/>
-          <p:nvPr/>
-        </p:nvSpPr>
-        <p:spPr>
-          <a:xfrm>
-            <a:off x="1579657" y="247706"/>
-            <a:ext cx="1972721" cy="252472"/>
-          </a:xfrm>
-          <a:prstGeom prst="flowChartProcess">
+          <a:prstGeom prst="rect">
             <a:avLst/>
           </a:prstGeom>
           <a:noFill/>
           <a:ln>
-            <a:noFill/>
+            <a:solidFill>
+              <a:schemeClr val="accent1">
+                <a:shade val="50000"/>
+              </a:schemeClr>
+            </a:solidFill>
           </a:ln>
         </p:spPr>
-        <p:style>
-          <a:lnRef idx="2">
-            <a:schemeClr val="accent1">
-              <a:shade val="50000"/>
-            </a:schemeClr>
-          </a:lnRef>
-          <a:fillRef idx="1">
-            <a:schemeClr val="accent1"/>
-          </a:fillRef>
-          <a:effectRef idx="0">
-            <a:schemeClr val="accent1"/>
-          </a:effectRef>
-          <a:fontRef idx="minor">
-            <a:schemeClr val="lt1"/>
-          </a:fontRef>
-        </p:style>
-        <p:txBody>
-          <a:bodyPr rtlCol="0" anchor="t"/>
-          <a:lstStyle/>
-          <a:p>
-            <a:r>
-              <a:rPr lang="sv-SE" b="1" u="sng" dirty="0" err="1" smtClean="0">
-                <a:solidFill>
-                  <a:srgbClr val="000000"/>
-                </a:solidFill>
-                <a:latin typeface="Consolas" panose="020B0609020204030204" pitchFamily="49" charset="0"/>
-              </a:rPr>
-              <a:t>createSdLines</a:t>
-            </a:r>
-            <a:endParaRPr lang="sv-SE" b="1" u="sng" dirty="0" smtClean="0">
+        <p:txBody>
+          <a:bodyPr wrap="square" rtlCol="0">
+            <a:noAutofit/>
+          </a:bodyPr>
+          <a:lstStyle/>
+          <a:p>
+            <a:r>
+              <a:rPr lang="sv-SE" b="1" u="sng"/>
+              <a:t>WriteCallOrAddLineToList</a:t>
+            </a:r>
+            <a:endParaRPr lang="sv-SE" b="1" u="sng">
               <a:solidFill>
                 <a:srgbClr val="000000"/>
               </a:solidFill>
@@ -5291,16 +4810,16 @@
       </p:sp>
       <p:grpSp>
         <p:nvGrpSpPr>
-          <p:cNvPr id="8" name="Grupp 7"/>
+          <p:cNvPr id="11" name="Grupp 10"/>
           <p:cNvGrpSpPr/>
           <p:nvPr/>
         </p:nvGrpSpPr>
         <p:grpSpPr>
           <a:xfrm>
-            <a:off x="339632" y="906338"/>
-            <a:ext cx="5022832" cy="4053489"/>
-            <a:chOff x="104843" y="2108121"/>
-            <a:chExt cx="5022832" cy="4053489"/>
+            <a:off x="705393" y="357052"/>
+            <a:ext cx="5103223" cy="4598126"/>
+            <a:chOff x="687976" y="1079863"/>
+            <a:chExt cx="5103223" cy="4598126"/>
           </a:xfrm>
         </p:grpSpPr>
         <p:sp>
@@ -5311,7 +4830,7 @@
           </p:nvSpPr>
           <p:spPr>
             <a:xfrm>
-              <a:off x="2061517" y="2824652"/>
+              <a:off x="2490582" y="2000481"/>
               <a:ext cx="1692762" cy="313922"/>
             </a:xfrm>
             <a:prstGeom prst="flowChartProcess">
@@ -5340,7 +4859,7 @@
             <a:lstStyle/>
             <a:p>
               <a:r>
-                <a:rPr lang="sv-SE" sz="1100" dirty="0" smtClean="0">
+                <a:rPr lang="sv-SE" sz="1100" smtClean="0">
                   <a:solidFill>
                     <a:srgbClr val="000000"/>
                   </a:solidFill>
@@ -5349,7 +4868,7 @@
                 <a:t>Clear </a:t>
               </a:r>
               <a:r>
-                <a:rPr lang="sv-SE" sz="1100" dirty="0" err="1" smtClean="0">
+                <a:rPr lang="sv-SE" sz="1100" err="1" smtClean="0">
                   <a:solidFill>
                     <a:srgbClr val="000000"/>
                   </a:solidFill>
@@ -5357,7 +4876,7 @@
                 </a:rPr>
                 <a:t>sdLines</a:t>
               </a:r>
-              <a:endParaRPr lang="sv-SE" sz="1100" dirty="0" smtClean="0">
+              <a:endParaRPr lang="sv-SE" sz="1100" smtClean="0">
                 <a:solidFill>
                   <a:srgbClr val="000000"/>
                 </a:solidFill>
@@ -5365,60 +4884,7 @@
               </a:endParaRPr>
             </a:p>
             <a:p>
-              <a:endParaRPr lang="en-US" sz="1100" dirty="0">
-                <a:solidFill>
-                  <a:schemeClr val="tx1"/>
-                </a:solidFill>
-              </a:endParaRPr>
-            </a:p>
-          </p:txBody>
-        </p:sp>
-        <p:sp>
-          <p:nvSpPr>
-            <p:cNvPr id="7" name="Flödesschema: Process 6"/>
-            <p:cNvSpPr/>
-            <p:nvPr/>
-          </p:nvSpPr>
-          <p:spPr>
-            <a:xfrm>
-              <a:off x="104843" y="4469583"/>
-              <a:ext cx="1408671" cy="468264"/>
-            </a:xfrm>
-            <a:prstGeom prst="flowChartProcess">
-              <a:avLst/>
-            </a:prstGeom>
-            <a:noFill/>
-          </p:spPr>
-          <p:style>
-            <a:lnRef idx="2">
-              <a:schemeClr val="accent1">
-                <a:shade val="50000"/>
-              </a:schemeClr>
-            </a:lnRef>
-            <a:fillRef idx="1">
-              <a:schemeClr val="accent1"/>
-            </a:fillRef>
-            <a:effectRef idx="0">
-              <a:schemeClr val="accent1"/>
-            </a:effectRef>
-            <a:fontRef idx="minor">
-              <a:schemeClr val="lt1"/>
-            </a:fontRef>
-          </p:style>
-          <p:txBody>
-            <a:bodyPr rtlCol="0" anchor="ctr"/>
-            <a:lstStyle/>
-            <a:p>
-              <a:pPr algn="ctr"/>
-              <a:r>
-                <a:rPr lang="sv-SE" sz="1100" dirty="0" smtClean="0">
-                  <a:solidFill>
-                    <a:schemeClr val="tx1"/>
-                  </a:solidFill>
-                </a:rPr>
-                <a:t>process</a:t>
-              </a:r>
-              <a:endParaRPr lang="sv-SE" sz="1100" dirty="0">
+              <a:endParaRPr lang="en-US" sz="1100">
                 <a:solidFill>
                   <a:schemeClr val="tx1"/>
                 </a:solidFill>
@@ -5437,7 +4903,7 @@
           </p:nvCxnSpPr>
           <p:spPr>
             <a:xfrm>
-              <a:off x="2907898" y="3138574"/>
+              <a:off x="3336963" y="2314403"/>
               <a:ext cx="1" cy="453515"/>
             </a:xfrm>
             <a:prstGeom prst="straightConnector1">
@@ -5473,7 +4939,7 @@
           </p:nvCxnSpPr>
           <p:spPr>
             <a:xfrm flipV="1">
-              <a:off x="3552379" y="3998494"/>
+              <a:off x="3981444" y="3174323"/>
               <a:ext cx="525143" cy="15020"/>
             </a:xfrm>
             <a:prstGeom prst="straightConnector1">
@@ -5509,7 +4975,7 @@
           </p:nvCxnSpPr>
           <p:spPr>
             <a:xfrm>
-              <a:off x="2907899" y="4335228"/>
+              <a:off x="3336964" y="3511057"/>
               <a:ext cx="0" cy="553227"/>
             </a:xfrm>
             <a:prstGeom prst="straightConnector1">
@@ -5542,7 +5008,7 @@
           </p:nvSpPr>
           <p:spPr>
             <a:xfrm>
-              <a:off x="2543376" y="2108121"/>
+              <a:off x="2972441" y="1283950"/>
               <a:ext cx="729044" cy="250586"/>
             </a:xfrm>
             <a:prstGeom prst="flowChartTerminator">
@@ -5572,14 +5038,14 @@
             <a:p>
               <a:pPr algn="ctr"/>
               <a:r>
-                <a:rPr lang="sv-SE" sz="1200" dirty="0" smtClean="0">
+                <a:rPr lang="sv-SE" sz="1200" smtClean="0">
                   <a:solidFill>
                     <a:schemeClr val="tx1"/>
                   </a:solidFill>
                 </a:rPr>
                 <a:t>Start</a:t>
               </a:r>
-              <a:endParaRPr lang="sv-SE" sz="1200" dirty="0">
+              <a:endParaRPr lang="sv-SE" sz="1200">
                 <a:solidFill>
                   <a:schemeClr val="tx1"/>
                 </a:solidFill>
@@ -5598,7 +5064,7 @@
           </p:nvCxnSpPr>
           <p:spPr>
             <a:xfrm>
-              <a:off x="2907898" y="2358707"/>
+              <a:off x="3336963" y="1534536"/>
               <a:ext cx="0" cy="465945"/>
             </a:xfrm>
             <a:prstGeom prst="straightConnector1">
@@ -5631,7 +5097,7 @@
           </p:nvGrpSpPr>
           <p:grpSpPr>
             <a:xfrm>
-              <a:off x="2203563" y="3592089"/>
+              <a:off x="2632628" y="2767918"/>
               <a:ext cx="1408671" cy="743139"/>
               <a:chOff x="2090980" y="1933105"/>
               <a:chExt cx="1408671" cy="743139"/>
@@ -5675,7 +5141,7 @@
               <a:p>
                 <a:pPr algn="ctr"/>
                 <a:r>
-                  <a:rPr lang="sv-SE" sz="1100" dirty="0" smtClean="0">
+                  <a:rPr lang="sv-SE" sz="1100" smtClean="0">
                     <a:solidFill>
                       <a:schemeClr val="tx1"/>
                     </a:solidFill>
@@ -5683,7 +5149,7 @@
                   <a:t>For </a:t>
                 </a:r>
                 <a:r>
-                  <a:rPr lang="sv-SE" sz="1100" dirty="0" err="1" smtClean="0">
+                  <a:rPr lang="sv-SE" sz="1100" err="1" smtClean="0">
                     <a:solidFill>
                       <a:schemeClr val="tx1"/>
                     </a:solidFill>
@@ -5691,7 +5157,7 @@
                   <a:t>each</a:t>
                 </a:r>
                 <a:r>
-                  <a:rPr lang="sv-SE" sz="1100" dirty="0" smtClean="0">
+                  <a:rPr lang="sv-SE" sz="1100" smtClean="0">
                     <a:solidFill>
                       <a:schemeClr val="tx1"/>
                     </a:solidFill>
@@ -5699,14 +5165,14 @@
                   <a:t> input </a:t>
                 </a:r>
                 <a:r>
-                  <a:rPr lang="sv-SE" sz="1100" dirty="0" err="1" smtClean="0">
+                  <a:rPr lang="sv-SE" sz="1100" err="1" smtClean="0">
                     <a:solidFill>
                       <a:schemeClr val="tx1"/>
                     </a:solidFill>
                   </a:rPr>
                   <a:t>line</a:t>
                 </a:r>
-                <a:endParaRPr lang="sv-SE" sz="1100" dirty="0">
+                <a:endParaRPr lang="sv-SE" sz="1100">
                   <a:solidFill>
                     <a:schemeClr val="tx1"/>
                   </a:solidFill>
@@ -5742,10 +5208,10 @@
               <a:lstStyle/>
               <a:p>
                 <a:r>
-                  <a:rPr lang="sv-SE" sz="1100" dirty="0" err="1"/>
+                  <a:rPr lang="sv-SE" sz="1100" err="1"/>
                   <a:t>createTempSdLine</a:t>
                 </a:r>
-                <a:endParaRPr lang="sv-SE" sz="1100" dirty="0"/>
+                <a:endParaRPr lang="sv-SE" sz="1100"/>
               </a:p>
             </p:txBody>
           </p:sp>
@@ -5758,7 +5224,7 @@
           </p:nvSpPr>
           <p:spPr>
             <a:xfrm>
-              <a:off x="602330" y="3730756"/>
+              <a:off x="1031395" y="2906585"/>
               <a:ext cx="1079711" cy="570313"/>
             </a:xfrm>
             <a:prstGeom prst="flowChartInternalStorage">
@@ -5793,7 +5259,7 @@
             <a:p>
               <a:pPr algn="ctr"/>
               <a:r>
-                <a:rPr lang="sv-SE" sz="1100" dirty="0" err="1">
+                <a:rPr lang="sv-SE" sz="1100" err="1">
                   <a:solidFill>
                     <a:schemeClr val="tx1"/>
                   </a:solidFill>
@@ -5801,14 +5267,14 @@
                 <a:t>l</a:t>
               </a:r>
               <a:r>
-                <a:rPr lang="sv-SE" sz="1100" dirty="0" err="1" smtClean="0">
+                <a:rPr lang="sv-SE" sz="1100" err="1" smtClean="0">
                   <a:solidFill>
                     <a:schemeClr val="tx1"/>
                   </a:solidFill>
                 </a:rPr>
                 <a:t>ines</a:t>
               </a:r>
-              <a:endParaRPr lang="sv-SE" sz="1100" dirty="0" smtClean="0">
+              <a:endParaRPr lang="sv-SE" sz="1100" smtClean="0">
                 <a:solidFill>
                   <a:schemeClr val="tx1"/>
                 </a:solidFill>
@@ -5817,7 +5283,7 @@
             <a:p>
               <a:pPr algn="ctr"/>
               <a:r>
-                <a:rPr lang="sv-SE" sz="1100" dirty="0" smtClean="0">
+                <a:rPr lang="sv-SE" sz="1100" smtClean="0">
                   <a:solidFill>
                     <a:schemeClr val="tx1"/>
                   </a:solidFill>
@@ -5825,7 +5291,7 @@
                 <a:t>(from Sd </a:t>
               </a:r>
               <a:r>
-                <a:rPr lang="sv-SE" sz="1100" dirty="0" err="1" smtClean="0">
+                <a:rPr lang="sv-SE" sz="1100" err="1" smtClean="0">
                   <a:solidFill>
                     <a:schemeClr val="tx1"/>
                   </a:solidFill>
@@ -5833,14 +5299,14 @@
                 <a:t>file</a:t>
               </a:r>
               <a:r>
-                <a:rPr lang="sv-SE" sz="1100" dirty="0" smtClean="0">
+                <a:rPr lang="sv-SE" sz="1100" smtClean="0">
                   <a:solidFill>
                     <a:schemeClr val="tx1"/>
                   </a:solidFill>
                 </a:rPr>
                 <a:t>)</a:t>
               </a:r>
-              <a:endParaRPr lang="sv-SE" sz="1100" dirty="0">
+              <a:endParaRPr lang="sv-SE" sz="1100">
                 <a:solidFill>
                   <a:schemeClr val="tx1"/>
                 </a:solidFill>
@@ -5859,7 +5325,7 @@
           </p:nvCxnSpPr>
           <p:spPr>
             <a:xfrm flipV="1">
-              <a:off x="1682041" y="4013514"/>
+              <a:off x="2111106" y="3189343"/>
               <a:ext cx="622881" cy="2399"/>
             </a:xfrm>
             <a:prstGeom prst="straightConnector1">
@@ -5892,7 +5358,7 @@
           </p:nvSpPr>
           <p:spPr>
             <a:xfrm>
-              <a:off x="4077522" y="3692170"/>
+              <a:off x="4506587" y="2867999"/>
               <a:ext cx="1050153" cy="612648"/>
             </a:xfrm>
             <a:prstGeom prst="flowChartInternalStorage">
@@ -5927,7 +5393,7 @@
             <a:p>
               <a:pPr algn="ctr"/>
               <a:r>
-                <a:rPr lang="sv-SE" sz="1100" dirty="0" err="1" smtClean="0">
+                <a:rPr lang="sv-SE" sz="1100" err="1" smtClean="0">
                   <a:solidFill>
                     <a:schemeClr val="tx1"/>
                   </a:solidFill>
@@ -5935,14 +5401,14 @@
                 <a:t>sdLinesTmp</a:t>
               </a:r>
               <a:r>
-                <a:rPr lang="sv-SE" sz="1100" dirty="0" smtClean="0">
+                <a:rPr lang="sv-SE" sz="1100" smtClean="0">
                   <a:solidFill>
                     <a:schemeClr val="tx1"/>
                   </a:solidFill>
                 </a:rPr>
                 <a:t> </a:t>
               </a:r>
-              <a:endParaRPr lang="sv-SE" sz="1100" dirty="0">
+              <a:endParaRPr lang="sv-SE" sz="1100">
                 <a:solidFill>
                   <a:schemeClr val="tx1"/>
                 </a:solidFill>
@@ -5958,7 +5424,7 @@
           </p:nvGrpSpPr>
           <p:grpSpPr>
             <a:xfrm>
-              <a:off x="2014981" y="4888455"/>
+              <a:off x="2444046" y="4064284"/>
               <a:ext cx="1785835" cy="743139"/>
               <a:chOff x="2090980" y="1933105"/>
               <a:chExt cx="1408671" cy="743139"/>
@@ -6002,7 +5468,7 @@
               <a:p>
                 <a:pPr algn="ctr"/>
                 <a:r>
-                  <a:rPr lang="sv-SE" sz="1100" dirty="0" smtClean="0">
+                  <a:rPr lang="sv-SE" sz="1100" smtClean="0">
                     <a:solidFill>
                       <a:schemeClr val="tx1"/>
                     </a:solidFill>
@@ -6010,7 +5476,7 @@
                   <a:t>For </a:t>
                 </a:r>
                 <a:r>
-                  <a:rPr lang="sv-SE" sz="1100" dirty="0" err="1" smtClean="0">
+                  <a:rPr lang="sv-SE" sz="1100" err="1" smtClean="0">
                     <a:solidFill>
                       <a:schemeClr val="tx1"/>
                     </a:solidFill>
@@ -6018,7 +5484,7 @@
                   <a:t>each</a:t>
                 </a:r>
                 <a:r>
-                  <a:rPr lang="sv-SE" sz="1100" dirty="0">
+                  <a:rPr lang="sv-SE" sz="1100">
                     <a:solidFill>
                       <a:schemeClr val="tx1"/>
                     </a:solidFill>
@@ -6026,14 +5492,14 @@
                   <a:t> </a:t>
                 </a:r>
                 <a:r>
-                  <a:rPr lang="sv-SE" sz="1100" dirty="0" err="1">
+                  <a:rPr lang="sv-SE" sz="1100" err="1">
                     <a:solidFill>
                       <a:schemeClr val="tx1"/>
                     </a:solidFill>
                   </a:rPr>
                   <a:t>sdLinesTmp</a:t>
                 </a:r>
-                <a:endParaRPr lang="sv-SE" sz="1100" dirty="0">
+                <a:endParaRPr lang="sv-SE" sz="1100">
                   <a:solidFill>
                     <a:schemeClr val="tx1"/>
                   </a:solidFill>
@@ -6069,10 +5535,10 @@
               <a:lstStyle/>
               <a:p>
                 <a:r>
-                  <a:rPr lang="sv-SE" sz="1100" dirty="0" err="1"/>
+                  <a:rPr lang="sv-SE" sz="1100" err="1"/>
                   <a:t>modifyAndCopySdLine</a:t>
                 </a:r>
-                <a:endParaRPr lang="sv-SE" sz="1100" dirty="0"/>
+                <a:endParaRPr lang="sv-SE" sz="1100"/>
               </a:p>
             </p:txBody>
           </p:sp>
@@ -6088,7 +5554,7 @@
           </p:nvCxnSpPr>
           <p:spPr>
             <a:xfrm rot="5400000">
-              <a:off x="3625027" y="4332306"/>
+              <a:off x="4054092" y="3508135"/>
               <a:ext cx="1005061" cy="950085"/>
             </a:xfrm>
             <a:prstGeom prst="bentConnector2">
@@ -6121,7 +5587,7 @@
           </p:nvSpPr>
           <p:spPr>
             <a:xfrm>
-              <a:off x="763481" y="5111687"/>
+              <a:off x="1192546" y="4287516"/>
               <a:ext cx="750033" cy="396384"/>
             </a:xfrm>
             <a:prstGeom prst="flowChartInternalStorage">
@@ -6156,7 +5622,7 @@
             <a:p>
               <a:pPr algn="ctr"/>
               <a:r>
-                <a:rPr lang="sv-SE" sz="1100" dirty="0" err="1" smtClean="0">
+                <a:rPr lang="sv-SE" sz="1100" err="1" smtClean="0">
                   <a:solidFill>
                     <a:schemeClr val="tx1"/>
                   </a:solidFill>
@@ -6164,14 +5630,14 @@
                 <a:t>sdLines</a:t>
               </a:r>
               <a:r>
-                <a:rPr lang="sv-SE" sz="1100" dirty="0" smtClean="0">
+                <a:rPr lang="sv-SE" sz="1100" smtClean="0">
                   <a:solidFill>
                     <a:schemeClr val="tx1"/>
                   </a:solidFill>
                 </a:rPr>
                 <a:t> </a:t>
               </a:r>
-              <a:endParaRPr lang="sv-SE" sz="1100" dirty="0">
+              <a:endParaRPr lang="sv-SE" sz="1100">
                 <a:solidFill>
                   <a:schemeClr val="tx1"/>
                 </a:solidFill>
@@ -6190,7 +5656,7 @@
           </p:nvCxnSpPr>
           <p:spPr>
             <a:xfrm flipH="1">
-              <a:off x="1513514" y="5309879"/>
+              <a:off x="1942579" y="4485708"/>
               <a:ext cx="629966" cy="0"/>
             </a:xfrm>
             <a:prstGeom prst="straightConnector1">
@@ -6223,7 +5689,7 @@
           </p:nvSpPr>
           <p:spPr>
             <a:xfrm>
-              <a:off x="2533475" y="5911024"/>
+              <a:off x="2962540" y="5086853"/>
               <a:ext cx="729044" cy="250586"/>
             </a:xfrm>
             <a:prstGeom prst="flowChartTerminator">
@@ -6253,14 +5719,14 @@
             <a:p>
               <a:pPr algn="ctr"/>
               <a:r>
-                <a:rPr lang="sv-SE" sz="1200" dirty="0" smtClean="0">
+                <a:rPr lang="sv-SE" sz="1200" smtClean="0">
                   <a:solidFill>
                     <a:schemeClr val="tx1"/>
                   </a:solidFill>
                 </a:rPr>
                 <a:t>End</a:t>
               </a:r>
-              <a:endParaRPr lang="sv-SE" sz="1200" dirty="0">
+              <a:endParaRPr lang="sv-SE" sz="1200">
                 <a:solidFill>
                   <a:schemeClr val="tx1"/>
                 </a:solidFill>
@@ -6279,7 +5745,7 @@
           </p:nvCxnSpPr>
           <p:spPr>
             <a:xfrm flipH="1">
-              <a:off x="2897997" y="5631594"/>
+              <a:off x="3327062" y="4807423"/>
               <a:ext cx="9902" cy="279430"/>
             </a:xfrm>
             <a:prstGeom prst="straightConnector1">
@@ -6304,7 +5770,225 @@
             </a:fontRef>
           </p:style>
         </p:cxnSp>
+        <p:sp>
+          <p:nvSpPr>
+            <p:cNvPr id="9" name="textruta 8"/>
+            <p:cNvSpPr txBox="1"/>
+            <p:nvPr/>
+          </p:nvSpPr>
+          <p:spPr>
+            <a:xfrm>
+              <a:off x="687976" y="1079863"/>
+              <a:ext cx="5103223" cy="4598126"/>
+            </a:xfrm>
+            <a:prstGeom prst="rect">
+              <a:avLst/>
+            </a:prstGeom>
+            <a:noFill/>
+            <a:ln>
+              <a:solidFill>
+                <a:schemeClr val="accent1">
+                  <a:shade val="50000"/>
+                </a:schemeClr>
+              </a:solidFill>
+            </a:ln>
+          </p:spPr>
+          <p:txBody>
+            <a:bodyPr wrap="square" rtlCol="0">
+              <a:noAutofit/>
+            </a:bodyPr>
+            <a:lstStyle/>
+            <a:p>
+              <a:r>
+                <a:rPr lang="sv-SE" b="1" u="sng">
+                  <a:solidFill>
+                    <a:srgbClr val="000000"/>
+                  </a:solidFill>
+                  <a:latin typeface="Consolas" panose="020B0609020204030204" pitchFamily="49" charset="0"/>
+                </a:rPr>
+                <a:t>createSdLines</a:t>
+              </a:r>
+            </a:p>
+          </p:txBody>
+        </p:sp>
       </p:grpSp>
+      <p:cxnSp>
+        <p:nvCxnSpPr>
+          <p:cNvPr id="41" name="Rak pilkoppling 40"/>
+          <p:cNvCxnSpPr>
+            <a:stCxn id="38" idx="2"/>
+          </p:cNvCxnSpPr>
+          <p:nvPr/>
+        </p:nvCxnSpPr>
+        <p:spPr>
+          <a:xfrm>
+            <a:off x="3354379" y="5673565"/>
+            <a:ext cx="0" cy="465945"/>
+          </a:xfrm>
+          <a:prstGeom prst="straightConnector1">
+            <a:avLst/>
+          </a:prstGeom>
+          <a:ln>
+            <a:tailEnd type="triangle"/>
+          </a:ln>
+        </p:spPr>
+        <p:style>
+          <a:lnRef idx="1">
+            <a:schemeClr val="accent1"/>
+          </a:lnRef>
+          <a:fillRef idx="0">
+            <a:schemeClr val="accent1"/>
+          </a:fillRef>
+          <a:effectRef idx="0">
+            <a:schemeClr val="accent1"/>
+          </a:effectRef>
+          <a:fontRef idx="minor">
+            <a:schemeClr val="tx1"/>
+          </a:fontRef>
+        </p:style>
+      </p:cxnSp>
+      <p:cxnSp>
+        <p:nvCxnSpPr>
+          <p:cNvPr id="57" name="Rak pilkoppling 56"/>
+          <p:cNvCxnSpPr>
+            <a:stCxn id="60" idx="2"/>
+            <a:endCxn id="56" idx="0"/>
+          </p:cNvCxnSpPr>
+          <p:nvPr/>
+        </p:nvCxnSpPr>
+        <p:spPr>
+          <a:xfrm flipH="1">
+            <a:off x="3344478" y="8946452"/>
+            <a:ext cx="9902" cy="279430"/>
+          </a:xfrm>
+          <a:prstGeom prst="straightConnector1">
+            <a:avLst/>
+          </a:prstGeom>
+          <a:ln>
+            <a:tailEnd type="triangle"/>
+          </a:ln>
+        </p:spPr>
+        <p:style>
+          <a:lnRef idx="1">
+            <a:schemeClr val="accent1"/>
+          </a:lnRef>
+          <a:fillRef idx="0">
+            <a:schemeClr val="accent1"/>
+          </a:fillRef>
+          <a:effectRef idx="0">
+            <a:schemeClr val="accent1"/>
+          </a:effectRef>
+          <a:fontRef idx="minor">
+            <a:schemeClr val="tx1"/>
+          </a:fontRef>
+        </p:style>
+      </p:cxnSp>
+      <p:sp>
+        <p:nvSpPr>
+          <p:cNvPr id="38" name="Flödesschema: Begränsare 37"/>
+          <p:cNvSpPr/>
+          <p:nvPr/>
+        </p:nvSpPr>
+        <p:spPr>
+          <a:xfrm>
+            <a:off x="2989857" y="5422979"/>
+            <a:ext cx="729044" cy="250586"/>
+          </a:xfrm>
+          <a:prstGeom prst="flowChartTerminator">
+            <a:avLst/>
+          </a:prstGeom>
+          <a:noFill/>
+        </p:spPr>
+        <p:style>
+          <a:lnRef idx="2">
+            <a:schemeClr val="accent1">
+              <a:shade val="50000"/>
+            </a:schemeClr>
+          </a:lnRef>
+          <a:fillRef idx="1">
+            <a:schemeClr val="accent1"/>
+          </a:fillRef>
+          <a:effectRef idx="0">
+            <a:schemeClr val="accent1"/>
+          </a:effectRef>
+          <a:fontRef idx="minor">
+            <a:schemeClr val="lt1"/>
+          </a:fontRef>
+        </p:style>
+        <p:txBody>
+          <a:bodyPr rtlCol="0" anchor="ctr"/>
+          <a:lstStyle/>
+          <a:p>
+            <a:pPr algn="ctr"/>
+            <a:r>
+              <a:rPr lang="sv-SE" sz="1200" smtClean="0">
+                <a:solidFill>
+                  <a:schemeClr val="tx1"/>
+                </a:solidFill>
+              </a:rPr>
+              <a:t>Start</a:t>
+            </a:r>
+            <a:endParaRPr lang="sv-SE" sz="1200">
+              <a:solidFill>
+                <a:schemeClr val="tx1"/>
+              </a:solidFill>
+            </a:endParaRPr>
+          </a:p>
+        </p:txBody>
+      </p:sp>
+      <p:sp>
+        <p:nvSpPr>
+          <p:cNvPr id="56" name="Flödesschema: Begränsare 55"/>
+          <p:cNvSpPr/>
+          <p:nvPr/>
+        </p:nvSpPr>
+        <p:spPr>
+          <a:xfrm>
+            <a:off x="2979956" y="9225882"/>
+            <a:ext cx="729044" cy="250586"/>
+          </a:xfrm>
+          <a:prstGeom prst="flowChartTerminator">
+            <a:avLst/>
+          </a:prstGeom>
+          <a:noFill/>
+        </p:spPr>
+        <p:style>
+          <a:lnRef idx="2">
+            <a:schemeClr val="accent1">
+              <a:shade val="50000"/>
+            </a:schemeClr>
+          </a:lnRef>
+          <a:fillRef idx="1">
+            <a:schemeClr val="accent1"/>
+          </a:fillRef>
+          <a:effectRef idx="0">
+            <a:schemeClr val="accent1"/>
+          </a:effectRef>
+          <a:fontRef idx="minor">
+            <a:schemeClr val="lt1"/>
+          </a:fontRef>
+        </p:style>
+        <p:txBody>
+          <a:bodyPr rtlCol="0" anchor="ctr"/>
+          <a:lstStyle/>
+          <a:p>
+            <a:pPr algn="ctr"/>
+            <a:r>
+              <a:rPr lang="sv-SE" sz="1200" smtClean="0">
+                <a:solidFill>
+                  <a:schemeClr val="tx1"/>
+                </a:solidFill>
+              </a:rPr>
+              <a:t>End</a:t>
+            </a:r>
+            <a:endParaRPr lang="sv-SE" sz="1200">
+              <a:solidFill>
+                <a:schemeClr val="tx1"/>
+              </a:solidFill>
+            </a:endParaRPr>
+          </a:p>
+        </p:txBody>
+      </p:sp>
     </p:spTree>
     <p:extLst>
       <p:ext uri="{BB962C8B-B14F-4D97-AF65-F5344CB8AC3E}">

</xml_diff>